<commit_message>
Adding documentation and format
Why?
Document variables used from ENAHO

How?
Comments in text and in the first two slides
</commit_message>
<xml_diff>
--- a/COSTA-RICA---RBM-Impact-Indicators-from-ENAHO.pptx
+++ b/COSTA-RICA---RBM-Impact-Indicators-from-ENAHO.pptx
@@ -2908,7 +2908,7 @@
             </a:pPr>
             <a:r>
               <a:rPr/>
-              <a:t>11 November 2022</a:t>
+              <a:t>21 November 2022</a:t>
             </a:r>
           </a:p>
         </p:txBody>
@@ -3002,7 +3002,7 @@
             </a:r>
             <a:r>
               <a:rPr/>
-              <a:t> de 2018,las Oficinas Nacionales de Estadística son las mejor posicionadas para producir datos de alta calidad sobre el desplazamiento forzado.</a:t>
+              <a:t> de 2018,las Oficinas Nacionales de Estadística son las mejores posicionadas para producir datos de alta calidad sobre el desplazamiento forzado.</a:t>
             </a:r>
           </a:p>
           <a:p>
@@ -3020,7 +3020,7 @@
             </a:pPr>
             <a:r>
               <a:rPr/>
-              <a:t>El ACNUR dispone de un conjunto de indicadores básicos. En Costa Rica, la encuesta nacional de hogares incluye a las personas desplazadas por la fuerza y el ACNUR puede utilizar las estadísticas oficiales para calcular sus propios indicadores</a:t>
+              <a:t>El ACNUR dispone de un conjunto de indicadores básicos. En Costa Rica, la Encuesta Nacional de Hogares incluye a las personas desplazadas por la fuerza y el ACNUR puede utilizar las estadísticas oficiales para calcular sus propios indicadores.</a:t>
             </a:r>
           </a:p>
         </p:txBody>
@@ -3715,8 +3715,8 @@
           </p:nvSpPr>
           <p:spPr>
             <a:xfrm>
-              <a:off x="5633257" y="3519280"/>
-              <a:ext cx="445393" cy="106042"/>
+              <a:off x="5657183" y="3515857"/>
+              <a:ext cx="397540" cy="105768"/>
             </a:xfrm>
             <a:prstGeom prst="rect">
               <a:avLst/>
@@ -3745,8 +3745,8 @@
                       <a:alpha val="100000"/>
                     </a:srgbClr>
                   </a:solidFill>
-                  <a:latin typeface="DejaVu Sans"/>
-                  <a:cs typeface="DejaVu Sans"/>
+                  <a:latin typeface="Arial"/>
+                  <a:cs typeface="Arial"/>
                 </a:rPr>
                 <a:t>25.8%</a:t>
               </a:r>
@@ -3761,8 +3761,8 @@
           </p:nvSpPr>
           <p:spPr>
             <a:xfrm>
-              <a:off x="6249323" y="3187101"/>
-              <a:ext cx="445393" cy="106042"/>
+              <a:off x="6273249" y="3189685"/>
+              <a:ext cx="397540" cy="105768"/>
             </a:xfrm>
             <a:prstGeom prst="rect">
               <a:avLst/>
@@ -3791,8 +3791,8 @@
                       <a:alpha val="100000"/>
                     </a:srgbClr>
                   </a:solidFill>
-                  <a:latin typeface="DejaVu Sans"/>
-                  <a:cs typeface="DejaVu Sans"/>
+                  <a:latin typeface="Arial"/>
+                  <a:cs typeface="Arial"/>
                 </a:rPr>
                 <a:t>34.0%</a:t>
               </a:r>
@@ -3807,8 +3807,8 @@
           </p:nvSpPr>
           <p:spPr>
             <a:xfrm>
-              <a:off x="10566938" y="4064316"/>
-              <a:ext cx="445393" cy="106042"/>
+              <a:off x="10590864" y="4060893"/>
+              <a:ext cx="397540" cy="105768"/>
             </a:xfrm>
             <a:prstGeom prst="rect">
               <a:avLst/>
@@ -3837,8 +3837,8 @@
                       <a:alpha val="100000"/>
                     </a:srgbClr>
                   </a:solidFill>
-                  <a:latin typeface="DejaVu Sans"/>
-                  <a:cs typeface="DejaVu Sans"/>
+                  <a:latin typeface="Arial"/>
+                  <a:cs typeface="Arial"/>
                 </a:rPr>
                 <a:t>91.9%</a:t>
               </a:r>
@@ -3853,8 +3853,8 @@
           </p:nvSpPr>
           <p:spPr>
             <a:xfrm>
-              <a:off x="10169189" y="3732136"/>
-              <a:ext cx="445393" cy="106042"/>
+              <a:off x="10193115" y="3734720"/>
+              <a:ext cx="397540" cy="105768"/>
             </a:xfrm>
             <a:prstGeom prst="rect">
               <a:avLst/>
@@ -3883,8 +3883,8 @@
                       <a:alpha val="100000"/>
                     </a:srgbClr>
                   </a:solidFill>
-                  <a:latin typeface="DejaVu Sans"/>
-                  <a:cs typeface="DejaVu Sans"/>
+                  <a:latin typeface="Arial"/>
+                  <a:cs typeface="Arial"/>
                 </a:rPr>
                 <a:t>86.5%</a:t>
               </a:r>
@@ -3899,8 +3899,8 @@
           </p:nvSpPr>
           <p:spPr>
             <a:xfrm>
-              <a:off x="10956996" y="4609351"/>
-              <a:ext cx="445393" cy="106042"/>
+              <a:off x="10980922" y="4605928"/>
+              <a:ext cx="397540" cy="105768"/>
             </a:xfrm>
             <a:prstGeom prst="rect">
               <a:avLst/>
@@ -3929,8 +3929,8 @@
                       <a:alpha val="100000"/>
                     </a:srgbClr>
                   </a:solidFill>
-                  <a:latin typeface="DejaVu Sans"/>
-                  <a:cs typeface="DejaVu Sans"/>
+                  <a:latin typeface="Arial"/>
+                  <a:cs typeface="Arial"/>
                 </a:rPr>
                 <a:t>97.1%</a:t>
               </a:r>
@@ -3945,8 +3945,8 @@
           </p:nvSpPr>
           <p:spPr>
             <a:xfrm>
-              <a:off x="8305826" y="4277171"/>
-              <a:ext cx="445393" cy="106042"/>
+              <a:off x="8329753" y="4279755"/>
+              <a:ext cx="397540" cy="105768"/>
             </a:xfrm>
             <a:prstGeom prst="rect">
               <a:avLst/>
@@ -3975,8 +3975,8 @@
                       <a:alpha val="100000"/>
                     </a:srgbClr>
                   </a:solidFill>
-                  <a:latin typeface="DejaVu Sans"/>
-                  <a:cs typeface="DejaVu Sans"/>
+                  <a:latin typeface="Arial"/>
+                  <a:cs typeface="Arial"/>
                 </a:rPr>
                 <a:t>61.6%</a:t>
               </a:r>
@@ -4572,8 +4572,8 @@
           </p:nvSpPr>
           <p:spPr>
             <a:xfrm>
-              <a:off x="3723608" y="2760819"/>
-              <a:ext cx="85915" cy="80507"/>
+              <a:off x="3727579" y="2764413"/>
+              <a:ext cx="77974" cy="75989"/>
             </a:xfrm>
             <a:prstGeom prst="rect">
               <a:avLst/>
@@ -4602,8 +4602,8 @@
                       <a:alpha val="100000"/>
                     </a:srgbClr>
                   </a:solidFill>
-                  <a:latin typeface="DejaVu Sans"/>
-                  <a:cs typeface="DejaVu Sans"/>
+                  <a:latin typeface="Arial"/>
+                  <a:cs typeface="Arial"/>
                 </a:rPr>
                 <a:t>a</a:t>
               </a:r>
@@ -4653,8 +4653,8 @@
           </p:nvSpPr>
           <p:spPr>
             <a:xfrm>
-              <a:off x="5048007" y="2760819"/>
-              <a:ext cx="85915" cy="80507"/>
+              <a:off x="5051978" y="2764413"/>
+              <a:ext cx="77974" cy="75989"/>
             </a:xfrm>
             <a:prstGeom prst="rect">
               <a:avLst/>
@@ -4683,8 +4683,8 @@
                       <a:alpha val="100000"/>
                     </a:srgbClr>
                   </a:solidFill>
-                  <a:latin typeface="DejaVu Sans"/>
-                  <a:cs typeface="DejaVu Sans"/>
+                  <a:latin typeface="Arial"/>
+                  <a:cs typeface="Arial"/>
                 </a:rPr>
                 <a:t>a</a:t>
               </a:r>
@@ -5433,8 +5433,8 @@
           </p:nvSpPr>
           <p:spPr>
             <a:xfrm>
-              <a:off x="10604374" y="3667926"/>
-              <a:ext cx="445393" cy="106042"/>
+              <a:off x="10628300" y="3664503"/>
+              <a:ext cx="397540" cy="105768"/>
             </a:xfrm>
             <a:prstGeom prst="rect">
               <a:avLst/>
@@ -5463,8 +5463,8 @@
                       <a:alpha val="100000"/>
                     </a:srgbClr>
                   </a:solidFill>
-                  <a:latin typeface="DejaVu Sans"/>
-                  <a:cs typeface="DejaVu Sans"/>
+                  <a:latin typeface="Arial"/>
+                  <a:cs typeface="Arial"/>
                 </a:rPr>
                 <a:t>92.8%</a:t>
               </a:r>
@@ -5479,8 +5479,8 @@
           </p:nvSpPr>
           <p:spPr>
             <a:xfrm>
-              <a:off x="9873538" y="3335747"/>
-              <a:ext cx="445393" cy="106042"/>
+              <a:off x="9897464" y="3338331"/>
+              <a:ext cx="397540" cy="105768"/>
             </a:xfrm>
             <a:prstGeom prst="rect">
               <a:avLst/>
@@ -5509,8 +5509,8 @@
                       <a:alpha val="100000"/>
                     </a:srgbClr>
                   </a:solidFill>
-                  <a:latin typeface="DejaVu Sans"/>
-                  <a:cs typeface="DejaVu Sans"/>
+                  <a:latin typeface="Arial"/>
+                  <a:cs typeface="Arial"/>
                 </a:rPr>
                 <a:t>83.4%</a:t>
               </a:r>
@@ -5525,8 +5525,8 @@
           </p:nvSpPr>
           <p:spPr>
             <a:xfrm>
-              <a:off x="9664535" y="4460705"/>
-              <a:ext cx="445393" cy="106042"/>
+              <a:off x="9688461" y="4457282"/>
+              <a:ext cx="397540" cy="105768"/>
             </a:xfrm>
             <a:prstGeom prst="rect">
               <a:avLst/>
@@ -5555,8 +5555,8 @@
                       <a:alpha val="100000"/>
                     </a:srgbClr>
                   </a:solidFill>
-                  <a:latin typeface="DejaVu Sans"/>
-                  <a:cs typeface="DejaVu Sans"/>
+                  <a:latin typeface="Arial"/>
+                  <a:cs typeface="Arial"/>
                 </a:rPr>
                 <a:t>80.7%</a:t>
               </a:r>
@@ -5571,8 +5571,8 @@
           </p:nvSpPr>
           <p:spPr>
             <a:xfrm>
-              <a:off x="8610986" y="4128525"/>
-              <a:ext cx="445393" cy="106042"/>
+              <a:off x="8634912" y="4131109"/>
+              <a:ext cx="397540" cy="105768"/>
             </a:xfrm>
             <a:prstGeom prst="rect">
               <a:avLst/>
@@ -5601,8 +5601,8 @@
                       <a:alpha val="100000"/>
                     </a:srgbClr>
                   </a:solidFill>
-                  <a:latin typeface="DejaVu Sans"/>
-                  <a:cs typeface="DejaVu Sans"/>
+                  <a:latin typeface="Arial"/>
+                  <a:cs typeface="Arial"/>
                 </a:rPr>
                 <a:t>67.0%</a:t>
               </a:r>
@@ -6060,8 +6060,8 @@
           </p:nvSpPr>
           <p:spPr>
             <a:xfrm>
-              <a:off x="3426936" y="2760819"/>
-              <a:ext cx="85915" cy="80507"/>
+              <a:off x="3430907" y="2764413"/>
+              <a:ext cx="77974" cy="75989"/>
             </a:xfrm>
             <a:prstGeom prst="rect">
               <a:avLst/>
@@ -6090,8 +6090,8 @@
                       <a:alpha val="100000"/>
                     </a:srgbClr>
                   </a:solidFill>
-                  <a:latin typeface="DejaVu Sans"/>
-                  <a:cs typeface="DejaVu Sans"/>
+                  <a:latin typeface="Arial"/>
+                  <a:cs typeface="Arial"/>
                 </a:rPr>
                 <a:t>a</a:t>
               </a:r>
@@ -6141,8 +6141,8 @@
           </p:nvSpPr>
           <p:spPr>
             <a:xfrm>
-              <a:off x="4751335" y="2760819"/>
-              <a:ext cx="85915" cy="80507"/>
+              <a:off x="4755306" y="2764413"/>
+              <a:ext cx="77974" cy="75989"/>
             </a:xfrm>
             <a:prstGeom prst="rect">
               <a:avLst/>
@@ -6171,8 +6171,8 @@
                       <a:alpha val="100000"/>
                     </a:srgbClr>
                   </a:solidFill>
-                  <a:latin typeface="DejaVu Sans"/>
-                  <a:cs typeface="DejaVu Sans"/>
+                  <a:latin typeface="Arial"/>
+                  <a:cs typeface="Arial"/>
                 </a:rPr>
                 <a:t>a</a:t>
               </a:r>
@@ -7034,8 +7034,8 @@
           </p:nvSpPr>
           <p:spPr>
             <a:xfrm>
-              <a:off x="10879879" y="3251629"/>
-              <a:ext cx="445393" cy="106042"/>
+              <a:off x="10903805" y="3248207"/>
+              <a:ext cx="397540" cy="105768"/>
             </a:xfrm>
             <a:prstGeom prst="rect">
               <a:avLst/>
@@ -7064,8 +7064,8 @@
                       <a:alpha val="100000"/>
                     </a:srgbClr>
                   </a:solidFill>
-                  <a:latin typeface="DejaVu Sans"/>
-                  <a:cs typeface="DejaVu Sans"/>
+                  <a:latin typeface="Arial"/>
+                  <a:cs typeface="Arial"/>
                 </a:rPr>
                 <a:t>95.7%</a:t>
               </a:r>
@@ -7080,8 +7080,8 @@
           </p:nvSpPr>
           <p:spPr>
             <a:xfrm>
-              <a:off x="10719293" y="2919450"/>
-              <a:ext cx="445393" cy="106042"/>
+              <a:off x="10743220" y="2922034"/>
+              <a:ext cx="397540" cy="105768"/>
             </a:xfrm>
             <a:prstGeom prst="rect">
               <a:avLst/>
@@ -7110,8 +7110,8 @@
                       <a:alpha val="100000"/>
                     </a:srgbClr>
                   </a:solidFill>
-                  <a:latin typeface="DejaVu Sans"/>
-                  <a:cs typeface="DejaVu Sans"/>
+                  <a:latin typeface="Arial"/>
+                  <a:cs typeface="Arial"/>
                 </a:rPr>
                 <a:t>93.5%</a:t>
               </a:r>
@@ -7126,8 +7126,8 @@
           </p:nvSpPr>
           <p:spPr>
             <a:xfrm>
-              <a:off x="5575011" y="4547585"/>
-              <a:ext cx="445393" cy="106042"/>
+              <a:off x="5598937" y="4544162"/>
+              <a:ext cx="397540" cy="105768"/>
             </a:xfrm>
             <a:prstGeom prst="rect">
               <a:avLst/>
@@ -7156,8 +7156,8 @@
                       <a:alpha val="100000"/>
                     </a:srgbClr>
                   </a:solidFill>
-                  <a:latin typeface="DejaVu Sans"/>
-                  <a:cs typeface="DejaVu Sans"/>
+                  <a:latin typeface="Arial"/>
+                  <a:cs typeface="Arial"/>
                 </a:rPr>
                 <a:t>22.1%</a:t>
               </a:r>
@@ -7172,8 +7172,8 @@
           </p:nvSpPr>
           <p:spPr>
             <a:xfrm>
-              <a:off x="6082258" y="4215406"/>
-              <a:ext cx="445393" cy="106042"/>
+              <a:off x="6106184" y="4217990"/>
+              <a:ext cx="397540" cy="105768"/>
             </a:xfrm>
             <a:prstGeom prst="rect">
               <a:avLst/>
@@ -7202,8 +7202,8 @@
                       <a:alpha val="100000"/>
                     </a:srgbClr>
                   </a:solidFill>
-                  <a:latin typeface="DejaVu Sans"/>
-                  <a:cs typeface="DejaVu Sans"/>
+                  <a:latin typeface="Arial"/>
+                  <a:cs typeface="Arial"/>
                 </a:rPr>
                 <a:t>29.2%</a:t>
               </a:r>
@@ -7218,8 +7218,8 @@
           </p:nvSpPr>
           <p:spPr>
             <a:xfrm>
-              <a:off x="10609856" y="3899607"/>
-              <a:ext cx="445393" cy="106042"/>
+              <a:off x="10633782" y="3896184"/>
+              <a:ext cx="397540" cy="105768"/>
             </a:xfrm>
             <a:prstGeom prst="rect">
               <a:avLst/>
@@ -7248,8 +7248,8 @@
                       <a:alpha val="100000"/>
                     </a:srgbClr>
                   </a:solidFill>
-                  <a:latin typeface="DejaVu Sans"/>
-                  <a:cs typeface="DejaVu Sans"/>
+                  <a:latin typeface="Arial"/>
+                  <a:cs typeface="Arial"/>
                 </a:rPr>
                 <a:t>92.0%</a:t>
               </a:r>
@@ -7264,8 +7264,8 @@
           </p:nvSpPr>
           <p:spPr>
             <a:xfrm>
-              <a:off x="9944269" y="3567428"/>
-              <a:ext cx="445393" cy="106042"/>
+              <a:off x="9968195" y="3570012"/>
+              <a:ext cx="397540" cy="105768"/>
             </a:xfrm>
             <a:prstGeom prst="rect">
               <a:avLst/>
@@ -7294,8 +7294,8 @@
                       <a:alpha val="100000"/>
                     </a:srgbClr>
                   </a:solidFill>
-                  <a:latin typeface="DejaVu Sans"/>
-                  <a:cs typeface="DejaVu Sans"/>
+                  <a:latin typeface="Arial"/>
+                  <a:cs typeface="Arial"/>
                 </a:rPr>
                 <a:t>82.8%</a:t>
               </a:r>
@@ -7983,8 +7983,8 @@
           </p:nvSpPr>
           <p:spPr>
             <a:xfrm>
-              <a:off x="4008258" y="2431403"/>
-              <a:ext cx="85915" cy="80507"/>
+              <a:off x="4012228" y="2434997"/>
+              <a:ext cx="77974" cy="75989"/>
             </a:xfrm>
             <a:prstGeom prst="rect">
               <a:avLst/>
@@ -8013,8 +8013,8 @@
                       <a:alpha val="100000"/>
                     </a:srgbClr>
                   </a:solidFill>
-                  <a:latin typeface="DejaVu Sans"/>
-                  <a:cs typeface="DejaVu Sans"/>
+                  <a:latin typeface="Arial"/>
+                  <a:cs typeface="Arial"/>
                 </a:rPr>
                 <a:t>a</a:t>
               </a:r>
@@ -8064,8 +8064,8 @@
           </p:nvSpPr>
           <p:spPr>
             <a:xfrm>
-              <a:off x="5332657" y="2431403"/>
-              <a:ext cx="85915" cy="80507"/>
+              <a:off x="5336627" y="2434997"/>
+              <a:ext cx="77974" cy="75989"/>
             </a:xfrm>
             <a:prstGeom prst="rect">
               <a:avLst/>
@@ -8094,8 +8094,8 @@
                       <a:alpha val="100000"/>
                     </a:srgbClr>
                   </a:solidFill>
-                  <a:latin typeface="DejaVu Sans"/>
-                  <a:cs typeface="DejaVu Sans"/>
+                  <a:latin typeface="Arial"/>
+                  <a:cs typeface="Arial"/>
                 </a:rPr>
                 <a:t>a</a:t>
               </a:r>

</xml_diff>

<commit_message>
Correcting 13.3 PoCs unemployed
why?
Error spoted in the indicator calculation. Denominator included all working age population  and not only employed+unemployed (workforce available)

how?
Creating variable CondAct1 and CondAct2 for both Nic and Crc and calculation indicator CondAct2/(CondAct1 + CondAct2)
</commit_message>
<xml_diff>
--- a/COSTA-RICA---RBM-Impact-Indicators-from-ENAHO.pptx
+++ b/COSTA-RICA---RBM-Impact-Indicators-from-ENAHO.pptx
@@ -2908,7 +2908,7 @@
             </a:pPr>
             <a:r>
               <a:rPr/>
-              <a:t>21 November 2022</a:t>
+              <a:t>22 November 2022</a:t>
             </a:r>
           </a:p>
         </p:txBody>
@@ -6894,7 +6894,7 @@
           </p:nvSpPr>
           <p:spPr>
             <a:xfrm>
-              <a:off x="5772882" y="4424384"/>
+              <a:off x="4962686" y="4424384"/>
               <a:ext cx="49651" cy="49651"/>
             </a:xfrm>
             <a:prstGeom prst="ellipse">
@@ -6929,7 +6929,7 @@
           </p:nvSpPr>
           <p:spPr>
             <a:xfrm>
-              <a:off x="6280128" y="4424384"/>
+              <a:off x="4955235" y="4424384"/>
               <a:ext cx="49651" cy="49651"/>
             </a:xfrm>
             <a:prstGeom prst="ellipse">
@@ -7126,7 +7126,7 @@
           </p:nvSpPr>
           <p:spPr>
             <a:xfrm>
-              <a:off x="5598937" y="4544162"/>
+              <a:off x="4788742" y="4544162"/>
               <a:ext cx="397540" cy="105768"/>
             </a:xfrm>
             <a:prstGeom prst="rect">
@@ -7159,7 +7159,7 @@
                   <a:latin typeface="Arial"/>
                   <a:cs typeface="Arial"/>
                 </a:rPr>
-                <a:t>22.1%</a:t>
+                <a:t>10.9%</a:t>
               </a:r>
             </a:p>
           </p:txBody>
@@ -7172,7 +7172,7 @@
           </p:nvSpPr>
           <p:spPr>
             <a:xfrm>
-              <a:off x="6106184" y="4217990"/>
+              <a:off x="4781290" y="4217990"/>
               <a:ext cx="397540" cy="105768"/>
             </a:xfrm>
             <a:prstGeom prst="rect">
@@ -7205,7 +7205,7 @@
                   <a:latin typeface="Arial"/>
                   <a:cs typeface="Arial"/>
                 </a:rPr>
-                <a:t>29.2%</a:t>
+                <a:t>10.8%</a:t>
               </a:r>
             </a:p>
           </p:txBody>

</xml_diff>

<commit_message>
Adding coefficient of variation to indicators and plot, generating indicators with 2022 data and formatting data
how: using as_survey and survey_prop function to calculate indicators and coeficient of variation, cloning RMD calculation for 2021 data using 2022 data, using grkstyle::grk_style_file() function

why: better understanding of data representativity, report for 2022 actuals and 2023 baselines, to clean code
</commit_message>
<xml_diff>
--- a/COSTA-RICA---RBM-Impact-Indicators-from-ENAHO.pptx
+++ b/COSTA-RICA---RBM-Impact-Indicators-from-ENAHO.pptx
@@ -2908,7 +2908,7 @@
             </a:pPr>
             <a:r>
               <a:rPr/>
-              <a:t>06 December 2022</a:t>
+              <a:t>28 December 2022</a:t>
             </a:r>
           </a:p>
         </p:txBody>
@@ -3512,13 +3512,13 @@
               <a:avLst/>
             </a:prstGeom>
             <a:solidFill>
-              <a:srgbClr val="7F7F7F">
+              <a:srgbClr val="666666">
                 <a:alpha val="100000"/>
               </a:srgbClr>
             </a:solidFill>
             <a:ln w="9000" cap="rnd">
               <a:solidFill>
-                <a:srgbClr val="7F7F7F">
+                <a:srgbClr val="666666">
                   <a:alpha val="100000"/>
                 </a:srgbClr>
               </a:solidFill>
@@ -3582,13 +3582,13 @@
               <a:avLst/>
             </a:prstGeom>
             <a:solidFill>
-              <a:srgbClr val="7F7F7F">
+              <a:srgbClr val="666666">
                 <a:alpha val="100000"/>
               </a:srgbClr>
             </a:solidFill>
             <a:ln w="9000" cap="rnd">
               <a:solidFill>
-                <a:srgbClr val="7F7F7F">
+                <a:srgbClr val="666666">
                   <a:alpha val="100000"/>
                 </a:srgbClr>
               </a:solidFill>
@@ -3645,20 +3645,20 @@
           </p:nvSpPr>
           <p:spPr>
             <a:xfrm>
-              <a:off x="11154867" y="4486149"/>
+              <a:off x="10319167" y="4486149"/>
               <a:ext cx="49651" cy="49651"/>
             </a:xfrm>
             <a:prstGeom prst="ellipse">
               <a:avLst/>
             </a:prstGeom>
             <a:solidFill>
-              <a:srgbClr val="7F7F7F">
+              <a:srgbClr val="666666">
                 <a:alpha val="100000"/>
               </a:srgbClr>
             </a:solidFill>
             <a:ln w="9000" cap="rnd">
               <a:solidFill>
-                <a:srgbClr val="7F7F7F">
+                <a:srgbClr val="666666">
                   <a:alpha val="100000"/>
                 </a:srgbClr>
               </a:solidFill>
@@ -3709,7 +3709,727 @@
         </p:sp>
         <p:sp>
           <p:nvSpPr>
-            <p:cNvPr id="17" name="tx17"/>
+            <p:cNvPr id="17" name="pl17"/>
+            <p:cNvSpPr/>
+            <p:nvPr/>
+          </p:nvSpPr>
+          <p:spPr>
+            <a:xfrm>
+              <a:off x="6037547" y="3366401"/>
+              <a:ext cx="0" cy="109007"/>
+            </a:xfrm>
+            <a:custGeom>
+              <a:avLst/>
+              <a:pathLst>
+                <a:path w="0" h="109007">
+                  <a:moveTo>
+                    <a:pt x="0" y="109007"/>
+                  </a:moveTo>
+                  <a:lnTo>
+                    <a:pt x="0" y="0"/>
+                  </a:lnTo>
+                </a:path>
+              </a:pathLst>
+            </a:custGeom>
+            <a:ln w="13550" cap="flat">
+              <a:solidFill>
+                <a:srgbClr val="666666">
+                  <a:alpha val="100000"/>
+                </a:srgbClr>
+              </a:solidFill>
+              <a:prstDash val="solid"/>
+              <a:round/>
+            </a:ln>
+          </p:spPr>
+          <p:txBody>
+            <a:bodyPr/>
+            <a:lstStyle/>
+            <a:p/>
+          </p:txBody>
+        </p:sp>
+        <p:sp>
+          <p:nvSpPr>
+            <p:cNvPr id="18" name="pl18"/>
+            <p:cNvSpPr/>
+            <p:nvPr/>
+          </p:nvSpPr>
+          <p:spPr>
+            <a:xfrm>
+              <a:off x="5674360" y="3420905"/>
+              <a:ext cx="363186" cy="0"/>
+            </a:xfrm>
+            <a:custGeom>
+              <a:avLst/>
+              <a:pathLst>
+                <a:path w="363186" h="0">
+                  <a:moveTo>
+                    <a:pt x="363186" y="0"/>
+                  </a:moveTo>
+                  <a:lnTo>
+                    <a:pt x="0" y="0"/>
+                  </a:lnTo>
+                </a:path>
+              </a:pathLst>
+            </a:custGeom>
+            <a:ln w="13550" cap="flat">
+              <a:solidFill>
+                <a:srgbClr val="666666">
+                  <a:alpha val="100000"/>
+                </a:srgbClr>
+              </a:solidFill>
+              <a:prstDash val="solid"/>
+              <a:round/>
+            </a:ln>
+          </p:spPr>
+          <p:txBody>
+            <a:bodyPr/>
+            <a:lstStyle/>
+            <a:p/>
+          </p:txBody>
+        </p:sp>
+        <p:sp>
+          <p:nvSpPr>
+            <p:cNvPr id="19" name="pl19"/>
+            <p:cNvSpPr/>
+            <p:nvPr/>
+          </p:nvSpPr>
+          <p:spPr>
+            <a:xfrm>
+              <a:off x="5674360" y="3366401"/>
+              <a:ext cx="0" cy="109007"/>
+            </a:xfrm>
+            <a:custGeom>
+              <a:avLst/>
+              <a:pathLst>
+                <a:path w="0" h="109007">
+                  <a:moveTo>
+                    <a:pt x="0" y="109007"/>
+                  </a:moveTo>
+                  <a:lnTo>
+                    <a:pt x="0" y="0"/>
+                  </a:lnTo>
+                </a:path>
+              </a:pathLst>
+            </a:custGeom>
+            <a:ln w="13550" cap="flat">
+              <a:solidFill>
+                <a:srgbClr val="666666">
+                  <a:alpha val="100000"/>
+                </a:srgbClr>
+              </a:solidFill>
+              <a:prstDash val="solid"/>
+              <a:round/>
+            </a:ln>
+          </p:spPr>
+          <p:txBody>
+            <a:bodyPr/>
+            <a:lstStyle/>
+            <a:p/>
+          </p:txBody>
+        </p:sp>
+        <p:sp>
+          <p:nvSpPr>
+            <p:cNvPr id="20" name="pl20"/>
+            <p:cNvSpPr/>
+            <p:nvPr/>
+          </p:nvSpPr>
+          <p:spPr>
+            <a:xfrm>
+              <a:off x="6866841" y="3366401"/>
+              <a:ext cx="0" cy="109007"/>
+            </a:xfrm>
+            <a:custGeom>
+              <a:avLst/>
+              <a:pathLst>
+                <a:path w="0" h="109007">
+                  <a:moveTo>
+                    <a:pt x="0" y="109007"/>
+                  </a:moveTo>
+                  <a:lnTo>
+                    <a:pt x="0" y="0"/>
+                  </a:lnTo>
+                </a:path>
+              </a:pathLst>
+            </a:custGeom>
+            <a:ln w="13550" cap="flat">
+              <a:solidFill>
+                <a:srgbClr val="0072BC">
+                  <a:alpha val="100000"/>
+                </a:srgbClr>
+              </a:solidFill>
+              <a:prstDash val="solid"/>
+              <a:round/>
+            </a:ln>
+          </p:spPr>
+          <p:txBody>
+            <a:bodyPr/>
+            <a:lstStyle/>
+            <a:p/>
+          </p:txBody>
+        </p:sp>
+        <p:sp>
+          <p:nvSpPr>
+            <p:cNvPr id="21" name="pl21"/>
+            <p:cNvSpPr/>
+            <p:nvPr/>
+          </p:nvSpPr>
+          <p:spPr>
+            <a:xfrm>
+              <a:off x="6077198" y="3420905"/>
+              <a:ext cx="789643" cy="0"/>
+            </a:xfrm>
+            <a:custGeom>
+              <a:avLst/>
+              <a:pathLst>
+                <a:path w="789643" h="0">
+                  <a:moveTo>
+                    <a:pt x="789643" y="0"/>
+                  </a:moveTo>
+                  <a:lnTo>
+                    <a:pt x="0" y="0"/>
+                  </a:lnTo>
+                </a:path>
+              </a:pathLst>
+            </a:custGeom>
+            <a:ln w="13550" cap="flat">
+              <a:solidFill>
+                <a:srgbClr val="0072BC">
+                  <a:alpha val="100000"/>
+                </a:srgbClr>
+              </a:solidFill>
+              <a:prstDash val="solid"/>
+              <a:round/>
+            </a:ln>
+          </p:spPr>
+          <p:txBody>
+            <a:bodyPr/>
+            <a:lstStyle/>
+            <a:p/>
+          </p:txBody>
+        </p:sp>
+        <p:sp>
+          <p:nvSpPr>
+            <p:cNvPr id="22" name="pl22"/>
+            <p:cNvSpPr/>
+            <p:nvPr/>
+          </p:nvSpPr>
+          <p:spPr>
+            <a:xfrm>
+              <a:off x="6077198" y="3366401"/>
+              <a:ext cx="0" cy="109007"/>
+            </a:xfrm>
+            <a:custGeom>
+              <a:avLst/>
+              <a:pathLst>
+                <a:path w="0" h="109007">
+                  <a:moveTo>
+                    <a:pt x="0" y="109007"/>
+                  </a:moveTo>
+                  <a:lnTo>
+                    <a:pt x="0" y="0"/>
+                  </a:lnTo>
+                </a:path>
+              </a:pathLst>
+            </a:custGeom>
+            <a:ln w="13550" cap="flat">
+              <a:solidFill>
+                <a:srgbClr val="0072BC">
+                  <a:alpha val="100000"/>
+                </a:srgbClr>
+              </a:solidFill>
+              <a:prstDash val="solid"/>
+              <a:round/>
+            </a:ln>
+          </p:spPr>
+          <p:txBody>
+            <a:bodyPr/>
+            <a:lstStyle/>
+            <a:p/>
+          </p:txBody>
+        </p:sp>
+        <p:sp>
+          <p:nvSpPr>
+            <p:cNvPr id="23" name="pl23"/>
+            <p:cNvSpPr/>
+            <p:nvPr/>
+          </p:nvSpPr>
+          <p:spPr>
+            <a:xfrm>
+              <a:off x="10828229" y="3911437"/>
+              <a:ext cx="0" cy="109007"/>
+            </a:xfrm>
+            <a:custGeom>
+              <a:avLst/>
+              <a:pathLst>
+                <a:path w="0" h="109007">
+                  <a:moveTo>
+                    <a:pt x="0" y="109007"/>
+                  </a:moveTo>
+                  <a:lnTo>
+                    <a:pt x="0" y="0"/>
+                  </a:lnTo>
+                </a:path>
+              </a:pathLst>
+            </a:custGeom>
+            <a:ln w="13550" cap="flat">
+              <a:solidFill>
+                <a:srgbClr val="666666">
+                  <a:alpha val="100000"/>
+                </a:srgbClr>
+              </a:solidFill>
+              <a:prstDash val="solid"/>
+              <a:round/>
+            </a:ln>
+          </p:spPr>
+          <p:txBody>
+            <a:bodyPr/>
+            <a:lstStyle/>
+            <a:p/>
+          </p:txBody>
+        </p:sp>
+        <p:sp>
+          <p:nvSpPr>
+            <p:cNvPr id="24" name="pl24"/>
+            <p:cNvSpPr/>
+            <p:nvPr/>
+          </p:nvSpPr>
+          <p:spPr>
+            <a:xfrm>
+              <a:off x="10751041" y="3965940"/>
+              <a:ext cx="77187" cy="0"/>
+            </a:xfrm>
+            <a:custGeom>
+              <a:avLst/>
+              <a:pathLst>
+                <a:path w="77187" h="0">
+                  <a:moveTo>
+                    <a:pt x="77187" y="0"/>
+                  </a:moveTo>
+                  <a:lnTo>
+                    <a:pt x="0" y="0"/>
+                  </a:lnTo>
+                </a:path>
+              </a:pathLst>
+            </a:custGeom>
+            <a:ln w="13550" cap="flat">
+              <a:solidFill>
+                <a:srgbClr val="666666">
+                  <a:alpha val="100000"/>
+                </a:srgbClr>
+              </a:solidFill>
+              <a:prstDash val="solid"/>
+              <a:round/>
+            </a:ln>
+          </p:spPr>
+          <p:txBody>
+            <a:bodyPr/>
+            <a:lstStyle/>
+            <a:p/>
+          </p:txBody>
+        </p:sp>
+        <p:sp>
+          <p:nvSpPr>
+            <p:cNvPr id="25" name="pl25"/>
+            <p:cNvSpPr/>
+            <p:nvPr/>
+          </p:nvSpPr>
+          <p:spPr>
+            <a:xfrm>
+              <a:off x="10751041" y="3911437"/>
+              <a:ext cx="0" cy="109007"/>
+            </a:xfrm>
+            <a:custGeom>
+              <a:avLst/>
+              <a:pathLst>
+                <a:path w="0" h="109007">
+                  <a:moveTo>
+                    <a:pt x="0" y="109007"/>
+                  </a:moveTo>
+                  <a:lnTo>
+                    <a:pt x="0" y="0"/>
+                  </a:lnTo>
+                </a:path>
+              </a:pathLst>
+            </a:custGeom>
+            <a:ln w="13550" cap="flat">
+              <a:solidFill>
+                <a:srgbClr val="666666">
+                  <a:alpha val="100000"/>
+                </a:srgbClr>
+              </a:solidFill>
+              <a:prstDash val="solid"/>
+              <a:round/>
+            </a:ln>
+          </p:spPr>
+          <p:txBody>
+            <a:bodyPr/>
+            <a:lstStyle/>
+            <a:p/>
+          </p:txBody>
+        </p:sp>
+        <p:sp>
+          <p:nvSpPr>
+            <p:cNvPr id="26" name="pl26"/>
+            <p:cNvSpPr/>
+            <p:nvPr/>
+          </p:nvSpPr>
+          <p:spPr>
+            <a:xfrm>
+              <a:off x="10523556" y="3911437"/>
+              <a:ext cx="0" cy="109007"/>
+            </a:xfrm>
+            <a:custGeom>
+              <a:avLst/>
+              <a:pathLst>
+                <a:path w="0" h="109007">
+                  <a:moveTo>
+                    <a:pt x="0" y="109007"/>
+                  </a:moveTo>
+                  <a:lnTo>
+                    <a:pt x="0" y="0"/>
+                  </a:lnTo>
+                </a:path>
+              </a:pathLst>
+            </a:custGeom>
+            <a:ln w="13550" cap="flat">
+              <a:solidFill>
+                <a:srgbClr val="0072BC">
+                  <a:alpha val="100000"/>
+                </a:srgbClr>
+              </a:solidFill>
+              <a:prstDash val="solid"/>
+              <a:round/>
+            </a:ln>
+          </p:spPr>
+          <p:txBody>
+            <a:bodyPr/>
+            <a:lstStyle/>
+            <a:p/>
+          </p:txBody>
+        </p:sp>
+        <p:sp>
+          <p:nvSpPr>
+            <p:cNvPr id="27" name="pl27"/>
+            <p:cNvSpPr/>
+            <p:nvPr/>
+          </p:nvSpPr>
+          <p:spPr>
+            <a:xfrm>
+              <a:off x="10260215" y="3965940"/>
+              <a:ext cx="263340" cy="0"/>
+            </a:xfrm>
+            <a:custGeom>
+              <a:avLst/>
+              <a:pathLst>
+                <a:path w="263340" h="0">
+                  <a:moveTo>
+                    <a:pt x="263340" y="0"/>
+                  </a:moveTo>
+                  <a:lnTo>
+                    <a:pt x="0" y="0"/>
+                  </a:lnTo>
+                </a:path>
+              </a:pathLst>
+            </a:custGeom>
+            <a:ln w="13550" cap="flat">
+              <a:solidFill>
+                <a:srgbClr val="0072BC">
+                  <a:alpha val="100000"/>
+                </a:srgbClr>
+              </a:solidFill>
+              <a:prstDash val="solid"/>
+              <a:round/>
+            </a:ln>
+          </p:spPr>
+          <p:txBody>
+            <a:bodyPr/>
+            <a:lstStyle/>
+            <a:p/>
+          </p:txBody>
+        </p:sp>
+        <p:sp>
+          <p:nvSpPr>
+            <p:cNvPr id="28" name="pl28"/>
+            <p:cNvSpPr/>
+            <p:nvPr/>
+          </p:nvSpPr>
+          <p:spPr>
+            <a:xfrm>
+              <a:off x="10260215" y="3911437"/>
+              <a:ext cx="0" cy="109007"/>
+            </a:xfrm>
+            <a:custGeom>
+              <a:avLst/>
+              <a:pathLst>
+                <a:path w="0" h="109007">
+                  <a:moveTo>
+                    <a:pt x="0" y="109007"/>
+                  </a:moveTo>
+                  <a:lnTo>
+                    <a:pt x="0" y="0"/>
+                  </a:lnTo>
+                </a:path>
+              </a:pathLst>
+            </a:custGeom>
+            <a:ln w="13550" cap="flat">
+              <a:solidFill>
+                <a:srgbClr val="0072BC">
+                  <a:alpha val="100000"/>
+                </a:srgbClr>
+              </a:solidFill>
+              <a:prstDash val="solid"/>
+              <a:round/>
+            </a:ln>
+          </p:spPr>
+          <p:txBody>
+            <a:bodyPr/>
+            <a:lstStyle/>
+            <a:p/>
+          </p:txBody>
+        </p:sp>
+        <p:sp>
+          <p:nvSpPr>
+            <p:cNvPr id="29" name="pl29"/>
+            <p:cNvSpPr/>
+            <p:nvPr/>
+          </p:nvSpPr>
+          <p:spPr>
+            <a:xfrm>
+              <a:off x="10371052" y="4456472"/>
+              <a:ext cx="0" cy="109007"/>
+            </a:xfrm>
+            <a:custGeom>
+              <a:avLst/>
+              <a:pathLst>
+                <a:path w="0" h="109007">
+                  <a:moveTo>
+                    <a:pt x="0" y="109007"/>
+                  </a:moveTo>
+                  <a:lnTo>
+                    <a:pt x="0" y="0"/>
+                  </a:lnTo>
+                </a:path>
+              </a:pathLst>
+            </a:custGeom>
+            <a:ln w="13550" cap="flat">
+              <a:solidFill>
+                <a:srgbClr val="666666">
+                  <a:alpha val="100000"/>
+                </a:srgbClr>
+              </a:solidFill>
+              <a:prstDash val="solid"/>
+              <a:round/>
+            </a:ln>
+          </p:spPr>
+          <p:txBody>
+            <a:bodyPr/>
+            <a:lstStyle/>
+            <a:p/>
+          </p:txBody>
+        </p:sp>
+        <p:sp>
+          <p:nvSpPr>
+            <p:cNvPr id="30" name="pl30"/>
+            <p:cNvSpPr/>
+            <p:nvPr/>
+          </p:nvSpPr>
+          <p:spPr>
+            <a:xfrm>
+              <a:off x="10316933" y="4510975"/>
+              <a:ext cx="54119" cy="0"/>
+            </a:xfrm>
+            <a:custGeom>
+              <a:avLst/>
+              <a:pathLst>
+                <a:path w="54119" h="0">
+                  <a:moveTo>
+                    <a:pt x="54119" y="0"/>
+                  </a:moveTo>
+                  <a:lnTo>
+                    <a:pt x="0" y="0"/>
+                  </a:lnTo>
+                </a:path>
+              </a:pathLst>
+            </a:custGeom>
+            <a:ln w="13550" cap="flat">
+              <a:solidFill>
+                <a:srgbClr val="666666">
+                  <a:alpha val="100000"/>
+                </a:srgbClr>
+              </a:solidFill>
+              <a:prstDash val="solid"/>
+              <a:round/>
+            </a:ln>
+          </p:spPr>
+          <p:txBody>
+            <a:bodyPr/>
+            <a:lstStyle/>
+            <a:p/>
+          </p:txBody>
+        </p:sp>
+        <p:sp>
+          <p:nvSpPr>
+            <p:cNvPr id="31" name="pl31"/>
+            <p:cNvSpPr/>
+            <p:nvPr/>
+          </p:nvSpPr>
+          <p:spPr>
+            <a:xfrm>
+              <a:off x="10316933" y="4456472"/>
+              <a:ext cx="0" cy="109007"/>
+            </a:xfrm>
+            <a:custGeom>
+              <a:avLst/>
+              <a:pathLst>
+                <a:path w="0" h="109007">
+                  <a:moveTo>
+                    <a:pt x="0" y="109007"/>
+                  </a:moveTo>
+                  <a:lnTo>
+                    <a:pt x="0" y="0"/>
+                  </a:lnTo>
+                </a:path>
+              </a:pathLst>
+            </a:custGeom>
+            <a:ln w="13550" cap="flat">
+              <a:solidFill>
+                <a:srgbClr val="666666">
+                  <a:alpha val="100000"/>
+                </a:srgbClr>
+              </a:solidFill>
+              <a:prstDash val="solid"/>
+              <a:round/>
+            </a:ln>
+          </p:spPr>
+          <p:txBody>
+            <a:bodyPr/>
+            <a:lstStyle/>
+            <a:p/>
+          </p:txBody>
+        </p:sp>
+        <p:sp>
+          <p:nvSpPr>
+            <p:cNvPr id="32" name="pl32"/>
+            <p:cNvSpPr/>
+            <p:nvPr/>
+          </p:nvSpPr>
+          <p:spPr>
+            <a:xfrm>
+              <a:off x="8698203" y="4456472"/>
+              <a:ext cx="0" cy="109007"/>
+            </a:xfrm>
+            <a:custGeom>
+              <a:avLst/>
+              <a:pathLst>
+                <a:path w="0" h="109007">
+                  <a:moveTo>
+                    <a:pt x="0" y="109007"/>
+                  </a:moveTo>
+                  <a:lnTo>
+                    <a:pt x="0" y="0"/>
+                  </a:lnTo>
+                </a:path>
+              </a:pathLst>
+            </a:custGeom>
+            <a:ln w="13550" cap="flat">
+              <a:solidFill>
+                <a:srgbClr val="0072BC">
+                  <a:alpha val="100000"/>
+                </a:srgbClr>
+              </a:solidFill>
+              <a:prstDash val="solid"/>
+              <a:round/>
+            </a:ln>
+          </p:spPr>
+          <p:txBody>
+            <a:bodyPr/>
+            <a:lstStyle/>
+            <a:p/>
+          </p:txBody>
+        </p:sp>
+        <p:sp>
+          <p:nvSpPr>
+            <p:cNvPr id="33" name="pl33"/>
+            <p:cNvSpPr/>
+            <p:nvPr/>
+          </p:nvSpPr>
+          <p:spPr>
+            <a:xfrm>
+              <a:off x="8358843" y="4510975"/>
+              <a:ext cx="339360" cy="0"/>
+            </a:xfrm>
+            <a:custGeom>
+              <a:avLst/>
+              <a:pathLst>
+                <a:path w="339360" h="0">
+                  <a:moveTo>
+                    <a:pt x="339360" y="0"/>
+                  </a:moveTo>
+                  <a:lnTo>
+                    <a:pt x="0" y="0"/>
+                  </a:lnTo>
+                </a:path>
+              </a:pathLst>
+            </a:custGeom>
+            <a:ln w="13550" cap="flat">
+              <a:solidFill>
+                <a:srgbClr val="0072BC">
+                  <a:alpha val="100000"/>
+                </a:srgbClr>
+              </a:solidFill>
+              <a:prstDash val="solid"/>
+              <a:round/>
+            </a:ln>
+          </p:spPr>
+          <p:txBody>
+            <a:bodyPr/>
+            <a:lstStyle/>
+            <a:p/>
+          </p:txBody>
+        </p:sp>
+        <p:sp>
+          <p:nvSpPr>
+            <p:cNvPr id="34" name="pl34"/>
+            <p:cNvSpPr/>
+            <p:nvPr/>
+          </p:nvSpPr>
+          <p:spPr>
+            <a:xfrm>
+              <a:off x="8358843" y="4456472"/>
+              <a:ext cx="0" cy="109007"/>
+            </a:xfrm>
+            <a:custGeom>
+              <a:avLst/>
+              <a:pathLst>
+                <a:path w="0" h="109007">
+                  <a:moveTo>
+                    <a:pt x="0" y="109007"/>
+                  </a:moveTo>
+                  <a:lnTo>
+                    <a:pt x="0" y="0"/>
+                  </a:lnTo>
+                </a:path>
+              </a:pathLst>
+            </a:custGeom>
+            <a:ln w="13550" cap="flat">
+              <a:solidFill>
+                <a:srgbClr val="0072BC">
+                  <a:alpha val="100000"/>
+                </a:srgbClr>
+              </a:solidFill>
+              <a:prstDash val="solid"/>
+              <a:round/>
+            </a:ln>
+          </p:spPr>
+          <p:txBody>
+            <a:bodyPr/>
+            <a:lstStyle/>
+            <a:p/>
+          </p:txBody>
+        </p:sp>
+        <p:sp>
+          <p:nvSpPr>
+            <p:cNvPr id="35" name="tx35"/>
             <p:cNvSpPr/>
             <p:nvPr/>
           </p:nvSpPr>
@@ -3741,7 +4461,7 @@
               <a:r>
                 <a:rPr sz="1103">
                   <a:solidFill>
-                    <a:srgbClr val="7F7F7F">
+                    <a:srgbClr val="666666">
                       <a:alpha val="100000"/>
                     </a:srgbClr>
                   </a:solidFill>
@@ -3755,7 +4475,7 @@
         </p:sp>
         <p:sp>
           <p:nvSpPr>
-            <p:cNvPr id="18" name="tx18"/>
+            <p:cNvPr id="36" name="tx36"/>
             <p:cNvSpPr/>
             <p:nvPr/>
           </p:nvSpPr>
@@ -3801,7 +4521,7 @@
         </p:sp>
         <p:sp>
           <p:nvSpPr>
-            <p:cNvPr id="19" name="tx19"/>
+            <p:cNvPr id="37" name="tx37"/>
             <p:cNvSpPr/>
             <p:nvPr/>
           </p:nvSpPr>
@@ -3833,7 +4553,7 @@
               <a:r>
                 <a:rPr sz="1103">
                   <a:solidFill>
-                    <a:srgbClr val="7F7F7F">
+                    <a:srgbClr val="666666">
                       <a:alpha val="100000"/>
                     </a:srgbClr>
                   </a:solidFill>
@@ -3847,7 +4567,7 @@
         </p:sp>
         <p:sp>
           <p:nvSpPr>
-            <p:cNvPr id="20" name="tx20"/>
+            <p:cNvPr id="38" name="tx38"/>
             <p:cNvSpPr/>
             <p:nvPr/>
           </p:nvSpPr>
@@ -3893,13 +4613,13 @@
         </p:sp>
         <p:sp>
           <p:nvSpPr>
-            <p:cNvPr id="21" name="tx21"/>
-            <p:cNvSpPr/>
-            <p:nvPr/>
-          </p:nvSpPr>
-          <p:spPr>
-            <a:xfrm>
-              <a:off x="10980922" y="4605928"/>
+            <p:cNvPr id="39" name="tx39"/>
+            <p:cNvSpPr/>
+            <p:nvPr/>
+          </p:nvSpPr>
+          <p:spPr>
+            <a:xfrm>
+              <a:off x="10145222" y="4605928"/>
               <a:ext cx="397540" cy="105768"/>
             </a:xfrm>
             <a:prstGeom prst="rect">
@@ -3925,21 +4645,21 @@
               <a:r>
                 <a:rPr sz="1103">
                   <a:solidFill>
-                    <a:srgbClr val="7F7F7F">
+                    <a:srgbClr val="666666">
                       <a:alpha val="100000"/>
                     </a:srgbClr>
                   </a:solidFill>
                   <a:latin typeface="Arial"/>
                   <a:cs typeface="Arial"/>
                 </a:rPr>
-                <a:t>97.1%</a:t>
+                <a:t>85.9%</a:t>
               </a:r>
             </a:p>
           </p:txBody>
         </p:sp>
         <p:sp>
           <p:nvSpPr>
-            <p:cNvPr id="22" name="tx22"/>
+            <p:cNvPr id="40" name="tx40"/>
             <p:cNvSpPr/>
             <p:nvPr/>
           </p:nvSpPr>
@@ -3985,7 +4705,7 @@
         </p:sp>
         <p:sp>
           <p:nvSpPr>
-            <p:cNvPr id="23" name="tx23"/>
+            <p:cNvPr id="41" name="tx41"/>
             <p:cNvSpPr/>
             <p:nvPr/>
           </p:nvSpPr>
@@ -4031,7 +4751,7 @@
         </p:sp>
         <p:sp>
           <p:nvSpPr>
-            <p:cNvPr id="24" name="tx24"/>
+            <p:cNvPr id="42" name="tx42"/>
             <p:cNvSpPr/>
             <p:nvPr/>
           </p:nvSpPr>
@@ -4077,7 +4797,7 @@
         </p:sp>
         <p:sp>
           <p:nvSpPr>
-            <p:cNvPr id="25" name="tx25"/>
+            <p:cNvPr id="43" name="tx43"/>
             <p:cNvSpPr/>
             <p:nvPr/>
           </p:nvSpPr>
@@ -4123,7 +4843,7 @@
         </p:sp>
         <p:sp>
           <p:nvSpPr>
-            <p:cNvPr id="26" name="tx26"/>
+            <p:cNvPr id="44" name="tx44"/>
             <p:cNvSpPr/>
             <p:nvPr/>
           </p:nvSpPr>
@@ -4169,7 +4889,7 @@
         </p:sp>
         <p:sp>
           <p:nvSpPr>
-            <p:cNvPr id="27" name="tx27"/>
+            <p:cNvPr id="45" name="tx45"/>
             <p:cNvSpPr/>
             <p:nvPr/>
           </p:nvSpPr>
@@ -4215,7 +4935,7 @@
         </p:sp>
         <p:sp>
           <p:nvSpPr>
-            <p:cNvPr id="28" name="tx28"/>
+            <p:cNvPr id="46" name="tx46"/>
             <p:cNvSpPr/>
             <p:nvPr/>
           </p:nvSpPr>
@@ -4261,7 +4981,7 @@
         </p:sp>
         <p:sp>
           <p:nvSpPr>
-            <p:cNvPr id="29" name="tx29"/>
+            <p:cNvPr id="47" name="tx47"/>
             <p:cNvSpPr/>
             <p:nvPr/>
           </p:nvSpPr>
@@ -4307,7 +5027,7 @@
         </p:sp>
         <p:sp>
           <p:nvSpPr>
-            <p:cNvPr id="30" name="pl30"/>
+            <p:cNvPr id="48" name="pl48"/>
             <p:cNvSpPr/>
             <p:nvPr/>
           </p:nvSpPr>
@@ -4347,7 +5067,7 @@
         </p:sp>
         <p:sp>
           <p:nvSpPr>
-            <p:cNvPr id="31" name="tx31"/>
+            <p:cNvPr id="49" name="tx49"/>
             <p:cNvSpPr/>
             <p:nvPr/>
           </p:nvSpPr>
@@ -4393,7 +5113,7 @@
         </p:sp>
         <p:sp>
           <p:nvSpPr>
-            <p:cNvPr id="32" name="tx32"/>
+            <p:cNvPr id="50" name="tx50"/>
             <p:cNvSpPr/>
             <p:nvPr/>
           </p:nvSpPr>
@@ -4439,7 +5159,7 @@
         </p:sp>
         <p:sp>
           <p:nvSpPr>
-            <p:cNvPr id="33" name="tx33"/>
+            <p:cNvPr id="51" name="tx51"/>
             <p:cNvSpPr/>
             <p:nvPr/>
           </p:nvSpPr>
@@ -4485,7 +5205,7 @@
         </p:sp>
         <p:sp>
           <p:nvSpPr>
-            <p:cNvPr id="34" name="tx34"/>
+            <p:cNvPr id="52" name="tx52"/>
             <p:cNvSpPr/>
             <p:nvPr/>
           </p:nvSpPr>
@@ -4531,13 +5251,134 @@
         </p:sp>
         <p:sp>
           <p:nvSpPr>
-            <p:cNvPr id="35" name="pt35"/>
+            <p:cNvPr id="53" name="pt53"/>
             <p:cNvSpPr/>
             <p:nvPr/>
           </p:nvSpPr>
           <p:spPr>
             <a:xfrm>
               <a:off x="3741740" y="2765397"/>
+              <a:ext cx="49651" cy="49651"/>
+            </a:xfrm>
+            <a:prstGeom prst="ellipse">
+              <a:avLst/>
+            </a:prstGeom>
+            <a:solidFill>
+              <a:srgbClr val="666666">
+                <a:alpha val="100000"/>
+              </a:srgbClr>
+            </a:solidFill>
+            <a:ln w="9000" cap="rnd">
+              <a:solidFill>
+                <a:srgbClr val="666666">
+                  <a:alpha val="100000"/>
+                </a:srgbClr>
+              </a:solidFill>
+              <a:prstDash val="solid"/>
+              <a:round/>
+            </a:ln>
+          </p:spPr>
+          <p:txBody>
+            <a:bodyPr/>
+            <a:lstStyle/>
+            <a:p/>
+          </p:txBody>
+        </p:sp>
+        <p:sp>
+          <p:nvSpPr>
+            <p:cNvPr id="54" name="pl54"/>
+            <p:cNvSpPr/>
+            <p:nvPr/>
+          </p:nvSpPr>
+          <p:spPr>
+            <a:xfrm>
+              <a:off x="3675468" y="2790222"/>
+              <a:ext cx="182196" cy="0"/>
+            </a:xfrm>
+            <a:custGeom>
+              <a:avLst/>
+              <a:pathLst>
+                <a:path w="182196" h="0">
+                  <a:moveTo>
+                    <a:pt x="0" y="0"/>
+                  </a:moveTo>
+                  <a:lnTo>
+                    <a:pt x="182196" y="0"/>
+                  </a:lnTo>
+                </a:path>
+              </a:pathLst>
+            </a:custGeom>
+            <a:ln w="13550" cap="flat">
+              <a:solidFill>
+                <a:srgbClr val="666666">
+                  <a:alpha val="100000"/>
+                </a:srgbClr>
+              </a:solidFill>
+              <a:prstDash val="solid"/>
+              <a:round/>
+            </a:ln>
+          </p:spPr>
+          <p:txBody>
+            <a:bodyPr/>
+            <a:lstStyle/>
+            <a:p/>
+          </p:txBody>
+        </p:sp>
+        <p:sp>
+          <p:nvSpPr>
+            <p:cNvPr id="55" name="tx55"/>
+            <p:cNvSpPr/>
+            <p:nvPr/>
+          </p:nvSpPr>
+          <p:spPr>
+            <a:xfrm>
+              <a:off x="3727579" y="2764413"/>
+              <a:ext cx="77974" cy="75989"/>
+            </a:xfrm>
+            <a:prstGeom prst="rect">
+              <a:avLst/>
+            </a:prstGeom>
+            <a:noFill/>
+          </p:spPr>
+          <p:txBody>
+            <a:bodyPr lIns="0" rIns="0" tIns="0" bIns="0" anchorCtr="1" anchor="ctr" wrap="none"/>
+            <a:lstStyle/>
+            <a:p>
+              <a:pPr algn="l" marL="0" marR="0" indent="0">
+                <a:lnSpc>
+                  <a:spcPts val="1103"/>
+                </a:lnSpc>
+                <a:spcBef>
+                  <a:spcPts val="0"/>
+                </a:spcBef>
+                <a:spcAft>
+                  <a:spcPts val="0"/>
+                </a:spcAft>
+              </a:pPr>
+              <a:r>
+                <a:rPr sz="1103">
+                  <a:solidFill>
+                    <a:srgbClr val="666666">
+                      <a:alpha val="100000"/>
+                    </a:srgbClr>
+                  </a:solidFill>
+                  <a:latin typeface="Arial"/>
+                  <a:cs typeface="Arial"/>
+                </a:rPr>
+                <a:t>a</a:t>
+              </a:r>
+            </a:p>
+          </p:txBody>
+        </p:sp>
+        <p:sp>
+          <p:nvSpPr>
+            <p:cNvPr id="56" name="pt56"/>
+            <p:cNvSpPr/>
+            <p:nvPr/>
+          </p:nvSpPr>
+          <p:spPr>
+            <a:xfrm>
+              <a:off x="5066139" y="2765397"/>
               <a:ext cx="49651" cy="49651"/>
             </a:xfrm>
             <a:prstGeom prst="ellipse">
@@ -4566,13 +5407,53 @@
         </p:sp>
         <p:sp>
           <p:nvSpPr>
-            <p:cNvPr id="36" name="tx36"/>
-            <p:cNvSpPr/>
-            <p:nvPr/>
-          </p:nvSpPr>
-          <p:spPr>
-            <a:xfrm>
-              <a:off x="3727579" y="2764413"/>
+            <p:cNvPr id="57" name="pl57"/>
+            <p:cNvSpPr/>
+            <p:nvPr/>
+          </p:nvSpPr>
+          <p:spPr>
+            <a:xfrm>
+              <a:off x="4999867" y="2790222"/>
+              <a:ext cx="182196" cy="0"/>
+            </a:xfrm>
+            <a:custGeom>
+              <a:avLst/>
+              <a:pathLst>
+                <a:path w="182196" h="0">
+                  <a:moveTo>
+                    <a:pt x="0" y="0"/>
+                  </a:moveTo>
+                  <a:lnTo>
+                    <a:pt x="182196" y="0"/>
+                  </a:lnTo>
+                </a:path>
+              </a:pathLst>
+            </a:custGeom>
+            <a:ln w="13550" cap="flat">
+              <a:solidFill>
+                <a:srgbClr val="0072BC">
+                  <a:alpha val="100000"/>
+                </a:srgbClr>
+              </a:solidFill>
+              <a:prstDash val="solid"/>
+              <a:round/>
+            </a:ln>
+          </p:spPr>
+          <p:txBody>
+            <a:bodyPr/>
+            <a:lstStyle/>
+            <a:p/>
+          </p:txBody>
+        </p:sp>
+        <p:sp>
+          <p:nvSpPr>
+            <p:cNvPr id="58" name="tx58"/>
+            <p:cNvSpPr/>
+            <p:nvPr/>
+          </p:nvSpPr>
+          <p:spPr>
+            <a:xfrm>
+              <a:off x="5051978" y="2764413"/>
               <a:ext cx="77974" cy="75989"/>
             </a:xfrm>
             <a:prstGeom prst="rect">
@@ -4612,13 +5493,59 @@
         </p:sp>
         <p:sp>
           <p:nvSpPr>
-            <p:cNvPr id="37" name="tx37"/>
-            <p:cNvSpPr/>
-            <p:nvPr/>
-          </p:nvSpPr>
-          <p:spPr>
-            <a:xfrm>
-              <a:off x="3975333" y="2696454"/>
+            <p:cNvPr id="59" name="tx59"/>
+            <p:cNvSpPr/>
+            <p:nvPr/>
+          </p:nvSpPr>
+          <p:spPr>
+            <a:xfrm>
+              <a:off x="3975333" y="2726003"/>
+              <a:ext cx="906864" cy="124883"/>
+            </a:xfrm>
+            <a:prstGeom prst="rect">
+              <a:avLst/>
+            </a:prstGeom>
+            <a:noFill/>
+          </p:spPr>
+          <p:txBody>
+            <a:bodyPr lIns="0" rIns="0" tIns="0" bIns="0" anchorCtr="1" anchor="ctr" wrap="none"/>
+            <a:lstStyle/>
+            <a:p>
+              <a:pPr algn="l" marL="0" marR="0" indent="0">
+                <a:lnSpc>
+                  <a:spcPts val="1333"/>
+                </a:lnSpc>
+                <a:spcBef>
+                  <a:spcPts val="0"/>
+                </a:spcBef>
+                <a:spcAft>
+                  <a:spcPts val="0"/>
+                </a:spcAft>
+              </a:pPr>
+              <a:r>
+                <a:rPr sz="1333">
+                  <a:solidFill>
+                    <a:srgbClr val="191919">
+                      <a:alpha val="100000"/>
+                    </a:srgbClr>
+                  </a:solidFill>
+                  <a:latin typeface="Lato"/>
+                  <a:cs typeface="Lato"/>
+                </a:rPr>
+                <a:t>CostaRicans</a:t>
+              </a:r>
+            </a:p>
+          </p:txBody>
+        </p:sp>
+        <p:sp>
+          <p:nvSpPr>
+            <p:cNvPr id="60" name="tx60"/>
+            <p:cNvSpPr/>
+            <p:nvPr/>
+          </p:nvSpPr>
+          <p:spPr>
+            <a:xfrm>
+              <a:off x="5299732" y="2696454"/>
               <a:ext cx="915161" cy="154432"/>
             </a:xfrm>
             <a:prstGeom prst="rect">
@@ -4658,7 +5585,7 @@
         </p:sp>
         <p:sp>
           <p:nvSpPr>
-            <p:cNvPr id="38" name="tx38"/>
+            <p:cNvPr id="61" name="tx61"/>
             <p:cNvSpPr/>
             <p:nvPr/>
           </p:nvSpPr>
@@ -4704,7 +5631,7 @@
         </p:sp>
         <p:sp>
           <p:nvSpPr>
-            <p:cNvPr id="39" name="tx39"/>
+            <p:cNvPr id="62" name="tx62"/>
             <p:cNvSpPr/>
             <p:nvPr/>
           </p:nvSpPr>
@@ -4750,7 +5677,7 @@
         </p:sp>
         <p:sp>
           <p:nvSpPr>
-            <p:cNvPr id="40" name="tx40"/>
+            <p:cNvPr id="63" name="tx63"/>
             <p:cNvSpPr/>
             <p:nvPr/>
           </p:nvSpPr>
@@ -4796,7 +5723,7 @@
         </p:sp>
         <p:sp>
           <p:nvSpPr>
-            <p:cNvPr id="41" name="tx41"/>
+            <p:cNvPr id="64" name="tx64"/>
             <p:cNvSpPr/>
             <p:nvPr/>
           </p:nvSpPr>
@@ -5166,20 +6093,20 @@
           </p:nvSpPr>
           <p:spPr>
             <a:xfrm>
-              <a:off x="10802245" y="3544725"/>
+              <a:off x="9602104" y="3544725"/>
               <a:ext cx="49651" cy="49651"/>
             </a:xfrm>
             <a:prstGeom prst="ellipse">
               <a:avLst/>
             </a:prstGeom>
             <a:solidFill>
-              <a:srgbClr val="7F7F7F">
+              <a:srgbClr val="666666">
                 <a:alpha val="100000"/>
               </a:srgbClr>
             </a:solidFill>
             <a:ln w="9000" cap="rnd">
               <a:solidFill>
-                <a:srgbClr val="7F7F7F">
+                <a:srgbClr val="666666">
                   <a:alpha val="100000"/>
                 </a:srgbClr>
               </a:solidFill>
@@ -5201,7 +6128,7 @@
           </p:nvSpPr>
           <p:spPr>
             <a:xfrm>
-              <a:off x="10071409" y="3544725"/>
+              <a:off x="8935982" y="3544725"/>
               <a:ext cx="49651" cy="49651"/>
             </a:xfrm>
             <a:prstGeom prst="ellipse">
@@ -5236,20 +6163,20 @@
           </p:nvSpPr>
           <p:spPr>
             <a:xfrm>
-              <a:off x="9862406" y="4337503"/>
+              <a:off x="8858099" y="4337503"/>
               <a:ext cx="49651" cy="49651"/>
             </a:xfrm>
             <a:prstGeom prst="ellipse">
               <a:avLst/>
             </a:prstGeom>
             <a:solidFill>
-              <a:srgbClr val="7F7F7F">
+              <a:srgbClr val="666666">
                 <a:alpha val="100000"/>
               </a:srgbClr>
             </a:solidFill>
             <a:ln w="9000" cap="rnd">
               <a:solidFill>
-                <a:srgbClr val="7F7F7F">
+                <a:srgbClr val="666666">
                   <a:alpha val="100000"/>
                 </a:srgbClr>
               </a:solidFill>
@@ -5271,7 +6198,7 @@
           </p:nvSpPr>
           <p:spPr>
             <a:xfrm>
-              <a:off x="8808856" y="4337503"/>
+              <a:off x="8042348" y="4337503"/>
               <a:ext cx="49651" cy="49651"/>
             </a:xfrm>
             <a:prstGeom prst="ellipse">
@@ -5300,13 +6227,493 @@
         </p:sp>
         <p:sp>
           <p:nvSpPr>
-            <p:cNvPr id="14" name="tx14"/>
-            <p:cNvSpPr/>
-            <p:nvPr/>
-          </p:nvSpPr>
-          <p:spPr>
-            <a:xfrm>
-              <a:off x="10628300" y="3664503"/>
+            <p:cNvPr id="14" name="pl14"/>
+            <p:cNvSpPr/>
+            <p:nvPr/>
+          </p:nvSpPr>
+          <p:spPr>
+            <a:xfrm>
+              <a:off x="9708028" y="3490273"/>
+              <a:ext cx="0" cy="158555"/>
+            </a:xfrm>
+            <a:custGeom>
+              <a:avLst/>
+              <a:pathLst>
+                <a:path w="0" h="158555">
+                  <a:moveTo>
+                    <a:pt x="0" y="158555"/>
+                  </a:moveTo>
+                  <a:lnTo>
+                    <a:pt x="0" y="0"/>
+                  </a:lnTo>
+                </a:path>
+              </a:pathLst>
+            </a:custGeom>
+            <a:ln w="13550" cap="flat">
+              <a:solidFill>
+                <a:srgbClr val="666666">
+                  <a:alpha val="100000"/>
+                </a:srgbClr>
+              </a:solidFill>
+              <a:prstDash val="solid"/>
+              <a:round/>
+            </a:ln>
+          </p:spPr>
+          <p:txBody>
+            <a:bodyPr/>
+            <a:lstStyle/>
+            <a:p/>
+          </p:txBody>
+        </p:sp>
+        <p:sp>
+          <p:nvSpPr>
+            <p:cNvPr id="15" name="pl15"/>
+            <p:cNvSpPr/>
+            <p:nvPr/>
+          </p:nvSpPr>
+          <p:spPr>
+            <a:xfrm>
+              <a:off x="9545832" y="3569551"/>
+              <a:ext cx="162195" cy="0"/>
+            </a:xfrm>
+            <a:custGeom>
+              <a:avLst/>
+              <a:pathLst>
+                <a:path w="162195" h="0">
+                  <a:moveTo>
+                    <a:pt x="162195" y="0"/>
+                  </a:moveTo>
+                  <a:lnTo>
+                    <a:pt x="0" y="0"/>
+                  </a:lnTo>
+                </a:path>
+              </a:pathLst>
+            </a:custGeom>
+            <a:ln w="13550" cap="flat">
+              <a:solidFill>
+                <a:srgbClr val="666666">
+                  <a:alpha val="100000"/>
+                </a:srgbClr>
+              </a:solidFill>
+              <a:prstDash val="solid"/>
+              <a:round/>
+            </a:ln>
+          </p:spPr>
+          <p:txBody>
+            <a:bodyPr/>
+            <a:lstStyle/>
+            <a:p/>
+          </p:txBody>
+        </p:sp>
+        <p:sp>
+          <p:nvSpPr>
+            <p:cNvPr id="16" name="pl16"/>
+            <p:cNvSpPr/>
+            <p:nvPr/>
+          </p:nvSpPr>
+          <p:spPr>
+            <a:xfrm>
+              <a:off x="9545832" y="3490273"/>
+              <a:ext cx="0" cy="158555"/>
+            </a:xfrm>
+            <a:custGeom>
+              <a:avLst/>
+              <a:pathLst>
+                <a:path w="0" h="158555">
+                  <a:moveTo>
+                    <a:pt x="0" y="158555"/>
+                  </a:moveTo>
+                  <a:lnTo>
+                    <a:pt x="0" y="0"/>
+                  </a:lnTo>
+                </a:path>
+              </a:pathLst>
+            </a:custGeom>
+            <a:ln w="13550" cap="flat">
+              <a:solidFill>
+                <a:srgbClr val="666666">
+                  <a:alpha val="100000"/>
+                </a:srgbClr>
+              </a:solidFill>
+              <a:prstDash val="solid"/>
+              <a:round/>
+            </a:ln>
+          </p:spPr>
+          <p:txBody>
+            <a:bodyPr/>
+            <a:lstStyle/>
+            <a:p/>
+          </p:txBody>
+        </p:sp>
+        <p:sp>
+          <p:nvSpPr>
+            <p:cNvPr id="17" name="pl17"/>
+            <p:cNvSpPr/>
+            <p:nvPr/>
+          </p:nvSpPr>
+          <p:spPr>
+            <a:xfrm>
+              <a:off x="9635660" y="3490273"/>
+              <a:ext cx="0" cy="158555"/>
+            </a:xfrm>
+            <a:custGeom>
+              <a:avLst/>
+              <a:pathLst>
+                <a:path w="0" h="158555">
+                  <a:moveTo>
+                    <a:pt x="0" y="158555"/>
+                  </a:moveTo>
+                  <a:lnTo>
+                    <a:pt x="0" y="0"/>
+                  </a:lnTo>
+                </a:path>
+              </a:pathLst>
+            </a:custGeom>
+            <a:ln w="13550" cap="flat">
+              <a:solidFill>
+                <a:srgbClr val="0072BC">
+                  <a:alpha val="100000"/>
+                </a:srgbClr>
+              </a:solidFill>
+              <a:prstDash val="solid"/>
+              <a:round/>
+            </a:ln>
+          </p:spPr>
+          <p:txBody>
+            <a:bodyPr/>
+            <a:lstStyle/>
+            <a:p/>
+          </p:txBody>
+        </p:sp>
+        <p:sp>
+          <p:nvSpPr>
+            <p:cNvPr id="18" name="pl18"/>
+            <p:cNvSpPr/>
+            <p:nvPr/>
+          </p:nvSpPr>
+          <p:spPr>
+            <a:xfrm>
+              <a:off x="8285955" y="3569551"/>
+              <a:ext cx="1349704" cy="0"/>
+            </a:xfrm>
+            <a:custGeom>
+              <a:avLst/>
+              <a:pathLst>
+                <a:path w="1349704" h="0">
+                  <a:moveTo>
+                    <a:pt x="1349704" y="0"/>
+                  </a:moveTo>
+                  <a:lnTo>
+                    <a:pt x="0" y="0"/>
+                  </a:lnTo>
+                </a:path>
+              </a:pathLst>
+            </a:custGeom>
+            <a:ln w="13550" cap="flat">
+              <a:solidFill>
+                <a:srgbClr val="0072BC">
+                  <a:alpha val="100000"/>
+                </a:srgbClr>
+              </a:solidFill>
+              <a:prstDash val="solid"/>
+              <a:round/>
+            </a:ln>
+          </p:spPr>
+          <p:txBody>
+            <a:bodyPr/>
+            <a:lstStyle/>
+            <a:p/>
+          </p:txBody>
+        </p:sp>
+        <p:sp>
+          <p:nvSpPr>
+            <p:cNvPr id="19" name="pl19"/>
+            <p:cNvSpPr/>
+            <p:nvPr/>
+          </p:nvSpPr>
+          <p:spPr>
+            <a:xfrm>
+              <a:off x="8285955" y="3490273"/>
+              <a:ext cx="0" cy="158555"/>
+            </a:xfrm>
+            <a:custGeom>
+              <a:avLst/>
+              <a:pathLst>
+                <a:path w="0" h="158555">
+                  <a:moveTo>
+                    <a:pt x="0" y="158555"/>
+                  </a:moveTo>
+                  <a:lnTo>
+                    <a:pt x="0" y="0"/>
+                  </a:lnTo>
+                </a:path>
+              </a:pathLst>
+            </a:custGeom>
+            <a:ln w="13550" cap="flat">
+              <a:solidFill>
+                <a:srgbClr val="0072BC">
+                  <a:alpha val="100000"/>
+                </a:srgbClr>
+              </a:solidFill>
+              <a:prstDash val="solid"/>
+              <a:round/>
+            </a:ln>
+          </p:spPr>
+          <p:txBody>
+            <a:bodyPr/>
+            <a:lstStyle/>
+            <a:p/>
+          </p:txBody>
+        </p:sp>
+        <p:sp>
+          <p:nvSpPr>
+            <p:cNvPr id="20" name="pl20"/>
+            <p:cNvSpPr/>
+            <p:nvPr/>
+          </p:nvSpPr>
+          <p:spPr>
+            <a:xfrm>
+              <a:off x="8986196" y="4283052"/>
+              <a:ext cx="0" cy="158555"/>
+            </a:xfrm>
+            <a:custGeom>
+              <a:avLst/>
+              <a:pathLst>
+                <a:path w="0" h="158555">
+                  <a:moveTo>
+                    <a:pt x="0" y="158555"/>
+                  </a:moveTo>
+                  <a:lnTo>
+                    <a:pt x="0" y="0"/>
+                  </a:lnTo>
+                </a:path>
+              </a:pathLst>
+            </a:custGeom>
+            <a:ln w="13550" cap="flat">
+              <a:solidFill>
+                <a:srgbClr val="666666">
+                  <a:alpha val="100000"/>
+                </a:srgbClr>
+              </a:solidFill>
+              <a:prstDash val="solid"/>
+              <a:round/>
+            </a:ln>
+          </p:spPr>
+          <p:txBody>
+            <a:bodyPr/>
+            <a:lstStyle/>
+            <a:p/>
+          </p:txBody>
+        </p:sp>
+        <p:sp>
+          <p:nvSpPr>
+            <p:cNvPr id="21" name="pl21"/>
+            <p:cNvSpPr/>
+            <p:nvPr/>
+          </p:nvSpPr>
+          <p:spPr>
+            <a:xfrm>
+              <a:off x="8779653" y="4362329"/>
+              <a:ext cx="206543" cy="0"/>
+            </a:xfrm>
+            <a:custGeom>
+              <a:avLst/>
+              <a:pathLst>
+                <a:path w="206543" h="0">
+                  <a:moveTo>
+                    <a:pt x="206543" y="0"/>
+                  </a:moveTo>
+                  <a:lnTo>
+                    <a:pt x="0" y="0"/>
+                  </a:lnTo>
+                </a:path>
+              </a:pathLst>
+            </a:custGeom>
+            <a:ln w="13550" cap="flat">
+              <a:solidFill>
+                <a:srgbClr val="666666">
+                  <a:alpha val="100000"/>
+                </a:srgbClr>
+              </a:solidFill>
+              <a:prstDash val="solid"/>
+              <a:round/>
+            </a:ln>
+          </p:spPr>
+          <p:txBody>
+            <a:bodyPr/>
+            <a:lstStyle/>
+            <a:p/>
+          </p:txBody>
+        </p:sp>
+        <p:sp>
+          <p:nvSpPr>
+            <p:cNvPr id="22" name="pl22"/>
+            <p:cNvSpPr/>
+            <p:nvPr/>
+          </p:nvSpPr>
+          <p:spPr>
+            <a:xfrm>
+              <a:off x="8779653" y="4283052"/>
+              <a:ext cx="0" cy="158555"/>
+            </a:xfrm>
+            <a:custGeom>
+              <a:avLst/>
+              <a:pathLst>
+                <a:path w="0" h="158555">
+                  <a:moveTo>
+                    <a:pt x="0" y="158555"/>
+                  </a:moveTo>
+                  <a:lnTo>
+                    <a:pt x="0" y="0"/>
+                  </a:lnTo>
+                </a:path>
+              </a:pathLst>
+            </a:custGeom>
+            <a:ln w="13550" cap="flat">
+              <a:solidFill>
+                <a:srgbClr val="666666">
+                  <a:alpha val="100000"/>
+                </a:srgbClr>
+              </a:solidFill>
+              <a:prstDash val="solid"/>
+              <a:round/>
+            </a:ln>
+          </p:spPr>
+          <p:txBody>
+            <a:bodyPr/>
+            <a:lstStyle/>
+            <a:p/>
+          </p:txBody>
+        </p:sp>
+        <p:sp>
+          <p:nvSpPr>
+            <p:cNvPr id="23" name="pl23"/>
+            <p:cNvSpPr/>
+            <p:nvPr/>
+          </p:nvSpPr>
+          <p:spPr>
+            <a:xfrm>
+              <a:off x="8886560" y="4283052"/>
+              <a:ext cx="0" cy="158555"/>
+            </a:xfrm>
+            <a:custGeom>
+              <a:avLst/>
+              <a:pathLst>
+                <a:path w="0" h="158555">
+                  <a:moveTo>
+                    <a:pt x="0" y="158555"/>
+                  </a:moveTo>
+                  <a:lnTo>
+                    <a:pt x="0" y="0"/>
+                  </a:lnTo>
+                </a:path>
+              </a:pathLst>
+            </a:custGeom>
+            <a:ln w="13550" cap="flat">
+              <a:solidFill>
+                <a:srgbClr val="0072BC">
+                  <a:alpha val="100000"/>
+                </a:srgbClr>
+              </a:solidFill>
+              <a:prstDash val="solid"/>
+              <a:round/>
+            </a:ln>
+          </p:spPr>
+          <p:txBody>
+            <a:bodyPr/>
+            <a:lstStyle/>
+            <a:p/>
+          </p:txBody>
+        </p:sp>
+        <p:sp>
+          <p:nvSpPr>
+            <p:cNvPr id="24" name="pl24"/>
+            <p:cNvSpPr/>
+            <p:nvPr/>
+          </p:nvSpPr>
+          <p:spPr>
+            <a:xfrm>
+              <a:off x="7247788" y="4362329"/>
+              <a:ext cx="1638771" cy="0"/>
+            </a:xfrm>
+            <a:custGeom>
+              <a:avLst/>
+              <a:pathLst>
+                <a:path w="1638771" h="0">
+                  <a:moveTo>
+                    <a:pt x="1638771" y="0"/>
+                  </a:moveTo>
+                  <a:lnTo>
+                    <a:pt x="0" y="0"/>
+                  </a:lnTo>
+                </a:path>
+              </a:pathLst>
+            </a:custGeom>
+            <a:ln w="13550" cap="flat">
+              <a:solidFill>
+                <a:srgbClr val="0072BC">
+                  <a:alpha val="100000"/>
+                </a:srgbClr>
+              </a:solidFill>
+              <a:prstDash val="solid"/>
+              <a:round/>
+            </a:ln>
+          </p:spPr>
+          <p:txBody>
+            <a:bodyPr/>
+            <a:lstStyle/>
+            <a:p/>
+          </p:txBody>
+        </p:sp>
+        <p:sp>
+          <p:nvSpPr>
+            <p:cNvPr id="25" name="pl25"/>
+            <p:cNvSpPr/>
+            <p:nvPr/>
+          </p:nvSpPr>
+          <p:spPr>
+            <a:xfrm>
+              <a:off x="7247788" y="4283052"/>
+              <a:ext cx="0" cy="158555"/>
+            </a:xfrm>
+            <a:custGeom>
+              <a:avLst/>
+              <a:pathLst>
+                <a:path w="0" h="158555">
+                  <a:moveTo>
+                    <a:pt x="0" y="158555"/>
+                  </a:moveTo>
+                  <a:lnTo>
+                    <a:pt x="0" y="0"/>
+                  </a:lnTo>
+                </a:path>
+              </a:pathLst>
+            </a:custGeom>
+            <a:ln w="13550" cap="flat">
+              <a:solidFill>
+                <a:srgbClr val="0072BC">
+                  <a:alpha val="100000"/>
+                </a:srgbClr>
+              </a:solidFill>
+              <a:prstDash val="solid"/>
+              <a:round/>
+            </a:ln>
+          </p:spPr>
+          <p:txBody>
+            <a:bodyPr/>
+            <a:lstStyle/>
+            <a:p/>
+          </p:txBody>
+        </p:sp>
+        <p:sp>
+          <p:nvSpPr>
+            <p:cNvPr id="26" name="tx26"/>
+            <p:cNvSpPr/>
+            <p:nvPr/>
+          </p:nvSpPr>
+          <p:spPr>
+            <a:xfrm>
+              <a:off x="9428160" y="3664503"/>
               <a:ext cx="397540" cy="105768"/>
             </a:xfrm>
             <a:prstGeom prst="rect">
@@ -5332,27 +6739,27 @@
               <a:r>
                 <a:rPr sz="1103">
                   <a:solidFill>
-                    <a:srgbClr val="7F7F7F">
+                    <a:srgbClr val="666666">
                       <a:alpha val="100000"/>
                     </a:srgbClr>
                   </a:solidFill>
                   <a:latin typeface="Arial"/>
                   <a:cs typeface="Arial"/>
                 </a:rPr>
-                <a:t>92.8%</a:t>
+                <a:t>77.3%</a:t>
               </a:r>
             </a:p>
           </p:txBody>
         </p:sp>
         <p:sp>
           <p:nvSpPr>
-            <p:cNvPr id="15" name="tx15"/>
-            <p:cNvSpPr/>
-            <p:nvPr/>
-          </p:nvSpPr>
-          <p:spPr>
-            <a:xfrm>
-              <a:off x="9897464" y="3338331"/>
+            <p:cNvPr id="27" name="tx27"/>
+            <p:cNvSpPr/>
+            <p:nvPr/>
+          </p:nvSpPr>
+          <p:spPr>
+            <a:xfrm>
+              <a:off x="8762037" y="3338331"/>
               <a:ext cx="397540" cy="105768"/>
             </a:xfrm>
             <a:prstGeom prst="rect">
@@ -5385,20 +6792,20 @@
                   <a:latin typeface="Arial"/>
                   <a:cs typeface="Arial"/>
                 </a:rPr>
-                <a:t>83.4%</a:t>
+                <a:t>68.7%</a:t>
               </a:r>
             </a:p>
           </p:txBody>
         </p:sp>
         <p:sp>
           <p:nvSpPr>
-            <p:cNvPr id="16" name="tx16"/>
-            <p:cNvSpPr/>
-            <p:nvPr/>
-          </p:nvSpPr>
-          <p:spPr>
-            <a:xfrm>
-              <a:off x="9688461" y="4457282"/>
+            <p:cNvPr id="28" name="tx28"/>
+            <p:cNvSpPr/>
+            <p:nvPr/>
+          </p:nvSpPr>
+          <p:spPr>
+            <a:xfrm>
+              <a:off x="8684154" y="4457282"/>
               <a:ext cx="397540" cy="105768"/>
             </a:xfrm>
             <a:prstGeom prst="rect">
@@ -5424,27 +6831,27 @@
               <a:r>
                 <a:rPr sz="1103">
                   <a:solidFill>
-                    <a:srgbClr val="7F7F7F">
+                    <a:srgbClr val="666666">
                       <a:alpha val="100000"/>
                     </a:srgbClr>
                   </a:solidFill>
                   <a:latin typeface="Arial"/>
                   <a:cs typeface="Arial"/>
                 </a:rPr>
-                <a:t>80.7%</a:t>
+                <a:t>67.7%</a:t>
               </a:r>
             </a:p>
           </p:txBody>
         </p:sp>
         <p:sp>
           <p:nvSpPr>
-            <p:cNvPr id="17" name="tx17"/>
-            <p:cNvSpPr/>
-            <p:nvPr/>
-          </p:nvSpPr>
-          <p:spPr>
-            <a:xfrm>
-              <a:off x="8634912" y="4131109"/>
+            <p:cNvPr id="29" name="tx29"/>
+            <p:cNvSpPr/>
+            <p:nvPr/>
+          </p:nvSpPr>
+          <p:spPr>
+            <a:xfrm>
+              <a:off x="7868403" y="4131109"/>
               <a:ext cx="397540" cy="105768"/>
             </a:xfrm>
             <a:prstGeom prst="rect">
@@ -5477,14 +6884,14 @@
                   <a:latin typeface="Arial"/>
                   <a:cs typeface="Arial"/>
                 </a:rPr>
-                <a:t>67.0%</a:t>
+                <a:t>57.1%</a:t>
               </a:r>
             </a:p>
           </p:txBody>
         </p:sp>
         <p:sp>
           <p:nvSpPr>
-            <p:cNvPr id="18" name="tx18"/>
+            <p:cNvPr id="30" name="tx30"/>
             <p:cNvSpPr/>
             <p:nvPr/>
           </p:nvSpPr>
@@ -5530,7 +6937,7 @@
         </p:sp>
         <p:sp>
           <p:nvSpPr>
-            <p:cNvPr id="19" name="tx19"/>
+            <p:cNvPr id="31" name="tx31"/>
             <p:cNvSpPr/>
             <p:nvPr/>
           </p:nvSpPr>
@@ -5576,7 +6983,7 @@
         </p:sp>
         <p:sp>
           <p:nvSpPr>
-            <p:cNvPr id="20" name="tx20"/>
+            <p:cNvPr id="32" name="tx32"/>
             <p:cNvSpPr/>
             <p:nvPr/>
           </p:nvSpPr>
@@ -5622,7 +7029,7 @@
         </p:sp>
         <p:sp>
           <p:nvSpPr>
-            <p:cNvPr id="21" name="tx21"/>
+            <p:cNvPr id="33" name="tx33"/>
             <p:cNvSpPr/>
             <p:nvPr/>
           </p:nvSpPr>
@@ -5668,7 +7075,7 @@
         </p:sp>
         <p:sp>
           <p:nvSpPr>
-            <p:cNvPr id="22" name="pl22"/>
+            <p:cNvPr id="34" name="pl34"/>
             <p:cNvSpPr/>
             <p:nvPr/>
           </p:nvSpPr>
@@ -5708,7 +7115,7 @@
         </p:sp>
         <p:sp>
           <p:nvSpPr>
-            <p:cNvPr id="23" name="tx23"/>
+            <p:cNvPr id="35" name="tx35"/>
             <p:cNvSpPr/>
             <p:nvPr/>
           </p:nvSpPr>
@@ -5754,7 +7161,7 @@
         </p:sp>
         <p:sp>
           <p:nvSpPr>
-            <p:cNvPr id="24" name="tx24"/>
+            <p:cNvPr id="36" name="tx36"/>
             <p:cNvSpPr/>
             <p:nvPr/>
           </p:nvSpPr>
@@ -5800,7 +7207,7 @@
         </p:sp>
         <p:sp>
           <p:nvSpPr>
-            <p:cNvPr id="25" name="tx25"/>
+            <p:cNvPr id="37" name="tx37"/>
             <p:cNvSpPr/>
             <p:nvPr/>
           </p:nvSpPr>
@@ -5846,7 +7253,7 @@
         </p:sp>
         <p:sp>
           <p:nvSpPr>
-            <p:cNvPr id="26" name="tx26"/>
+            <p:cNvPr id="38" name="tx38"/>
             <p:cNvSpPr/>
             <p:nvPr/>
           </p:nvSpPr>
@@ -5892,13 +7299,134 @@
         </p:sp>
         <p:sp>
           <p:nvSpPr>
-            <p:cNvPr id="27" name="pt27"/>
+            <p:cNvPr id="39" name="pt39"/>
             <p:cNvSpPr/>
             <p:nvPr/>
           </p:nvSpPr>
           <p:spPr>
             <a:xfrm>
               <a:off x="3445068" y="2765397"/>
+              <a:ext cx="49651" cy="49651"/>
+            </a:xfrm>
+            <a:prstGeom prst="ellipse">
+              <a:avLst/>
+            </a:prstGeom>
+            <a:solidFill>
+              <a:srgbClr val="666666">
+                <a:alpha val="100000"/>
+              </a:srgbClr>
+            </a:solidFill>
+            <a:ln w="9000" cap="rnd">
+              <a:solidFill>
+                <a:srgbClr val="666666">
+                  <a:alpha val="100000"/>
+                </a:srgbClr>
+              </a:solidFill>
+              <a:prstDash val="solid"/>
+              <a:round/>
+            </a:ln>
+          </p:spPr>
+          <p:txBody>
+            <a:bodyPr/>
+            <a:lstStyle/>
+            <a:p/>
+          </p:txBody>
+        </p:sp>
+        <p:sp>
+          <p:nvSpPr>
+            <p:cNvPr id="40" name="pl40"/>
+            <p:cNvSpPr/>
+            <p:nvPr/>
+          </p:nvSpPr>
+          <p:spPr>
+            <a:xfrm>
+              <a:off x="3378796" y="2790222"/>
+              <a:ext cx="182196" cy="0"/>
+            </a:xfrm>
+            <a:custGeom>
+              <a:avLst/>
+              <a:pathLst>
+                <a:path w="182196" h="0">
+                  <a:moveTo>
+                    <a:pt x="0" y="0"/>
+                  </a:moveTo>
+                  <a:lnTo>
+                    <a:pt x="182196" y="0"/>
+                  </a:lnTo>
+                </a:path>
+              </a:pathLst>
+            </a:custGeom>
+            <a:ln w="13550" cap="flat">
+              <a:solidFill>
+                <a:srgbClr val="666666">
+                  <a:alpha val="100000"/>
+                </a:srgbClr>
+              </a:solidFill>
+              <a:prstDash val="solid"/>
+              <a:round/>
+            </a:ln>
+          </p:spPr>
+          <p:txBody>
+            <a:bodyPr/>
+            <a:lstStyle/>
+            <a:p/>
+          </p:txBody>
+        </p:sp>
+        <p:sp>
+          <p:nvSpPr>
+            <p:cNvPr id="41" name="tx41"/>
+            <p:cNvSpPr/>
+            <p:nvPr/>
+          </p:nvSpPr>
+          <p:spPr>
+            <a:xfrm>
+              <a:off x="3430907" y="2764413"/>
+              <a:ext cx="77974" cy="75989"/>
+            </a:xfrm>
+            <a:prstGeom prst="rect">
+              <a:avLst/>
+            </a:prstGeom>
+            <a:noFill/>
+          </p:spPr>
+          <p:txBody>
+            <a:bodyPr lIns="0" rIns="0" tIns="0" bIns="0" anchorCtr="1" anchor="ctr" wrap="none"/>
+            <a:lstStyle/>
+            <a:p>
+              <a:pPr algn="l" marL="0" marR="0" indent="0">
+                <a:lnSpc>
+                  <a:spcPts val="1103"/>
+                </a:lnSpc>
+                <a:spcBef>
+                  <a:spcPts val="0"/>
+                </a:spcBef>
+                <a:spcAft>
+                  <a:spcPts val="0"/>
+                </a:spcAft>
+              </a:pPr>
+              <a:r>
+                <a:rPr sz="1103">
+                  <a:solidFill>
+                    <a:srgbClr val="666666">
+                      <a:alpha val="100000"/>
+                    </a:srgbClr>
+                  </a:solidFill>
+                  <a:latin typeface="Arial"/>
+                  <a:cs typeface="Arial"/>
+                </a:rPr>
+                <a:t>a</a:t>
+              </a:r>
+            </a:p>
+          </p:txBody>
+        </p:sp>
+        <p:sp>
+          <p:nvSpPr>
+            <p:cNvPr id="42" name="pt42"/>
+            <p:cNvSpPr/>
+            <p:nvPr/>
+          </p:nvSpPr>
+          <p:spPr>
+            <a:xfrm>
+              <a:off x="4812817" y="2765397"/>
               <a:ext cx="49651" cy="49651"/>
             </a:xfrm>
             <a:prstGeom prst="ellipse">
@@ -5927,13 +7455,53 @@
         </p:sp>
         <p:sp>
           <p:nvSpPr>
-            <p:cNvPr id="28" name="tx28"/>
-            <p:cNvSpPr/>
-            <p:nvPr/>
-          </p:nvSpPr>
-          <p:spPr>
-            <a:xfrm>
-              <a:off x="3430907" y="2764413"/>
+            <p:cNvPr id="43" name="pl43"/>
+            <p:cNvSpPr/>
+            <p:nvPr/>
+          </p:nvSpPr>
+          <p:spPr>
+            <a:xfrm>
+              <a:off x="4746544" y="2790222"/>
+              <a:ext cx="182196" cy="0"/>
+            </a:xfrm>
+            <a:custGeom>
+              <a:avLst/>
+              <a:pathLst>
+                <a:path w="182196" h="0">
+                  <a:moveTo>
+                    <a:pt x="0" y="0"/>
+                  </a:moveTo>
+                  <a:lnTo>
+                    <a:pt x="182196" y="0"/>
+                  </a:lnTo>
+                </a:path>
+              </a:pathLst>
+            </a:custGeom>
+            <a:ln w="13550" cap="flat">
+              <a:solidFill>
+                <a:srgbClr val="0072BC">
+                  <a:alpha val="100000"/>
+                </a:srgbClr>
+              </a:solidFill>
+              <a:prstDash val="solid"/>
+              <a:round/>
+            </a:ln>
+          </p:spPr>
+          <p:txBody>
+            <a:bodyPr/>
+            <a:lstStyle/>
+            <a:p/>
+          </p:txBody>
+        </p:sp>
+        <p:sp>
+          <p:nvSpPr>
+            <p:cNvPr id="44" name="tx44"/>
+            <p:cNvSpPr/>
+            <p:nvPr/>
+          </p:nvSpPr>
+          <p:spPr>
+            <a:xfrm>
+              <a:off x="4798655" y="2764413"/>
               <a:ext cx="77974" cy="75989"/>
             </a:xfrm>
             <a:prstGeom prst="rect">
@@ -5973,13 +7541,59 @@
         </p:sp>
         <p:sp>
           <p:nvSpPr>
-            <p:cNvPr id="29" name="tx29"/>
-            <p:cNvSpPr/>
-            <p:nvPr/>
-          </p:nvSpPr>
-          <p:spPr>
-            <a:xfrm>
-              <a:off x="3678661" y="2696454"/>
+            <p:cNvPr id="45" name="tx45"/>
+            <p:cNvSpPr/>
+            <p:nvPr/>
+          </p:nvSpPr>
+          <p:spPr>
+            <a:xfrm>
+              <a:off x="3678661" y="2726003"/>
+              <a:ext cx="950213" cy="124883"/>
+            </a:xfrm>
+            <a:prstGeom prst="rect">
+              <a:avLst/>
+            </a:prstGeom>
+            <a:noFill/>
+          </p:spPr>
+          <p:txBody>
+            <a:bodyPr lIns="0" rIns="0" tIns="0" bIns="0" anchorCtr="1" anchor="ctr" wrap="none"/>
+            <a:lstStyle/>
+            <a:p>
+              <a:pPr algn="l" marL="0" marR="0" indent="0">
+                <a:lnSpc>
+                  <a:spcPts val="1333"/>
+                </a:lnSpc>
+                <a:spcBef>
+                  <a:spcPts val="0"/>
+                </a:spcBef>
+                <a:spcAft>
+                  <a:spcPts val="0"/>
+                </a:spcAft>
+              </a:pPr>
+              <a:r>
+                <a:rPr sz="1333">
+                  <a:solidFill>
+                    <a:srgbClr val="191919">
+                      <a:alpha val="100000"/>
+                    </a:srgbClr>
+                  </a:solidFill>
+                  <a:latin typeface="Lato"/>
+                  <a:cs typeface="Lato"/>
+                </a:rPr>
+                <a:t>Costa Ricans</a:t>
+              </a:r>
+            </a:p>
+          </p:txBody>
+        </p:sp>
+        <p:sp>
+          <p:nvSpPr>
+            <p:cNvPr id="46" name="tx46"/>
+            <p:cNvSpPr/>
+            <p:nvPr/>
+          </p:nvSpPr>
+          <p:spPr>
+            <a:xfrm>
+              <a:off x="5046410" y="2696454"/>
               <a:ext cx="915161" cy="154432"/>
             </a:xfrm>
             <a:prstGeom prst="rect">
@@ -6019,7 +7633,7 @@
         </p:sp>
         <p:sp>
           <p:nvSpPr>
-            <p:cNvPr id="30" name="tx30"/>
+            <p:cNvPr id="47" name="tx47"/>
             <p:cNvSpPr/>
             <p:nvPr/>
           </p:nvSpPr>
@@ -6065,7 +7679,7 @@
         </p:sp>
         <p:sp>
           <p:nvSpPr>
-            <p:cNvPr id="31" name="tx31"/>
+            <p:cNvPr id="48" name="tx48"/>
             <p:cNvSpPr/>
             <p:nvPr/>
           </p:nvSpPr>
@@ -6111,7 +7725,7 @@
         </p:sp>
         <p:sp>
           <p:nvSpPr>
-            <p:cNvPr id="32" name="tx32"/>
+            <p:cNvPr id="49" name="tx49"/>
             <p:cNvSpPr/>
             <p:nvPr/>
           </p:nvSpPr>
@@ -6157,7 +7771,7 @@
         </p:sp>
         <p:sp>
           <p:nvSpPr>
-            <p:cNvPr id="33" name="tx33"/>
+            <p:cNvPr id="50" name="tx50"/>
             <p:cNvSpPr/>
             <p:nvPr/>
           </p:nvSpPr>
@@ -6577,13 +8191,13 @@
               <a:avLst/>
             </a:prstGeom>
             <a:solidFill>
-              <a:srgbClr val="7F7F7F">
+              <a:srgbClr val="666666">
                 <a:alpha val="100000"/>
               </a:srgbClr>
             </a:solidFill>
             <a:ln w="9000" cap="rnd">
               <a:solidFill>
-                <a:srgbClr val="7F7F7F">
+                <a:srgbClr val="666666">
                   <a:alpha val="100000"/>
                 </a:srgbClr>
               </a:solidFill>
@@ -6640,20 +8254,20 @@
           </p:nvSpPr>
           <p:spPr>
             <a:xfrm>
-              <a:off x="4962686" y="4424384"/>
+              <a:off x="4983497" y="4424384"/>
               <a:ext cx="49651" cy="49651"/>
             </a:xfrm>
             <a:prstGeom prst="ellipse">
               <a:avLst/>
             </a:prstGeom>
             <a:solidFill>
-              <a:srgbClr val="7F7F7F">
+              <a:srgbClr val="666666">
                 <a:alpha val="100000"/>
               </a:srgbClr>
             </a:solidFill>
             <a:ln w="9000" cap="rnd">
               <a:solidFill>
-                <a:srgbClr val="7F7F7F">
+                <a:srgbClr val="666666">
                   <a:alpha val="100000"/>
                 </a:srgbClr>
               </a:solidFill>
@@ -6717,13 +8331,13 @@
               <a:avLst/>
             </a:prstGeom>
             <a:solidFill>
-              <a:srgbClr val="7F7F7F">
+              <a:srgbClr val="666666">
                 <a:alpha val="100000"/>
               </a:srgbClr>
             </a:solidFill>
             <a:ln w="9000" cap="rnd">
               <a:solidFill>
-                <a:srgbClr val="7F7F7F">
+                <a:srgbClr val="666666">
                   <a:alpha val="100000"/>
                 </a:srgbClr>
               </a:solidFill>
@@ -6774,7 +8388,727 @@
         </p:sp>
         <p:sp>
           <p:nvSpPr>
-            <p:cNvPr id="17" name="tx17"/>
+            <p:cNvPr id="17" name="pl17"/>
+            <p:cNvSpPr/>
+            <p:nvPr/>
+          </p:nvSpPr>
+          <p:spPr>
+            <a:xfrm>
+              <a:off x="11124563" y="3088456"/>
+              <a:ext cx="0" cy="129595"/>
+            </a:xfrm>
+            <a:custGeom>
+              <a:avLst/>
+              <a:pathLst>
+                <a:path w="0" h="129595">
+                  <a:moveTo>
+                    <a:pt x="0" y="129595"/>
+                  </a:moveTo>
+                  <a:lnTo>
+                    <a:pt x="0" y="0"/>
+                  </a:lnTo>
+                </a:path>
+              </a:pathLst>
+            </a:custGeom>
+            <a:ln w="13550" cap="flat">
+              <a:solidFill>
+                <a:srgbClr val="666666">
+                  <a:alpha val="100000"/>
+                </a:srgbClr>
+              </a:solidFill>
+              <a:prstDash val="solid"/>
+              <a:round/>
+            </a:ln>
+          </p:spPr>
+          <p:txBody>
+            <a:bodyPr/>
+            <a:lstStyle/>
+            <a:p/>
+          </p:txBody>
+        </p:sp>
+        <p:sp>
+          <p:nvSpPr>
+            <p:cNvPr id="18" name="pl18"/>
+            <p:cNvSpPr/>
+            <p:nvPr/>
+          </p:nvSpPr>
+          <p:spPr>
+            <a:xfrm>
+              <a:off x="11080588" y="3153254"/>
+              <a:ext cx="43975" cy="0"/>
+            </a:xfrm>
+            <a:custGeom>
+              <a:avLst/>
+              <a:pathLst>
+                <a:path w="43975" h="0">
+                  <a:moveTo>
+                    <a:pt x="43975" y="0"/>
+                  </a:moveTo>
+                  <a:lnTo>
+                    <a:pt x="0" y="0"/>
+                  </a:lnTo>
+                </a:path>
+              </a:pathLst>
+            </a:custGeom>
+            <a:ln w="13550" cap="flat">
+              <a:solidFill>
+                <a:srgbClr val="666666">
+                  <a:alpha val="100000"/>
+                </a:srgbClr>
+              </a:solidFill>
+              <a:prstDash val="solid"/>
+              <a:round/>
+            </a:ln>
+          </p:spPr>
+          <p:txBody>
+            <a:bodyPr/>
+            <a:lstStyle/>
+            <a:p/>
+          </p:txBody>
+        </p:sp>
+        <p:sp>
+          <p:nvSpPr>
+            <p:cNvPr id="19" name="pl19"/>
+            <p:cNvSpPr/>
+            <p:nvPr/>
+          </p:nvSpPr>
+          <p:spPr>
+            <a:xfrm>
+              <a:off x="11080588" y="3088456"/>
+              <a:ext cx="0" cy="129595"/>
+            </a:xfrm>
+            <a:custGeom>
+              <a:avLst/>
+              <a:pathLst>
+                <a:path w="0" h="129595">
+                  <a:moveTo>
+                    <a:pt x="0" y="129595"/>
+                  </a:moveTo>
+                  <a:lnTo>
+                    <a:pt x="0" y="0"/>
+                  </a:lnTo>
+                </a:path>
+              </a:pathLst>
+            </a:custGeom>
+            <a:ln w="13550" cap="flat">
+              <a:solidFill>
+                <a:srgbClr val="666666">
+                  <a:alpha val="100000"/>
+                </a:srgbClr>
+              </a:solidFill>
+              <a:prstDash val="solid"/>
+              <a:round/>
+            </a:ln>
+          </p:spPr>
+          <p:txBody>
+            <a:bodyPr/>
+            <a:lstStyle/>
+            <a:p/>
+          </p:txBody>
+        </p:sp>
+        <p:sp>
+          <p:nvSpPr>
+            <p:cNvPr id="20" name="pl20"/>
+            <p:cNvSpPr/>
+            <p:nvPr/>
+          </p:nvSpPr>
+          <p:spPr>
+            <a:xfrm>
+              <a:off x="11024362" y="3088456"/>
+              <a:ext cx="0" cy="129595"/>
+            </a:xfrm>
+            <a:custGeom>
+              <a:avLst/>
+              <a:pathLst>
+                <a:path w="0" h="129595">
+                  <a:moveTo>
+                    <a:pt x="0" y="129595"/>
+                  </a:moveTo>
+                  <a:lnTo>
+                    <a:pt x="0" y="0"/>
+                  </a:lnTo>
+                </a:path>
+              </a:pathLst>
+            </a:custGeom>
+            <a:ln w="13550" cap="flat">
+              <a:solidFill>
+                <a:srgbClr val="0072BC">
+                  <a:alpha val="100000"/>
+                </a:srgbClr>
+              </a:solidFill>
+              <a:prstDash val="solid"/>
+              <a:round/>
+            </a:ln>
+          </p:spPr>
+          <p:txBody>
+            <a:bodyPr/>
+            <a:lstStyle/>
+            <a:p/>
+          </p:txBody>
+        </p:sp>
+        <p:sp>
+          <p:nvSpPr>
+            <p:cNvPr id="21" name="pl21"/>
+            <p:cNvSpPr/>
+            <p:nvPr/>
+          </p:nvSpPr>
+          <p:spPr>
+            <a:xfrm>
+              <a:off x="10859618" y="3153254"/>
+              <a:ext cx="164743" cy="0"/>
+            </a:xfrm>
+            <a:custGeom>
+              <a:avLst/>
+              <a:pathLst>
+                <a:path w="164743" h="0">
+                  <a:moveTo>
+                    <a:pt x="164743" y="0"/>
+                  </a:moveTo>
+                  <a:lnTo>
+                    <a:pt x="0" y="0"/>
+                  </a:lnTo>
+                </a:path>
+              </a:pathLst>
+            </a:custGeom>
+            <a:ln w="13550" cap="flat">
+              <a:solidFill>
+                <a:srgbClr val="0072BC">
+                  <a:alpha val="100000"/>
+                </a:srgbClr>
+              </a:solidFill>
+              <a:prstDash val="solid"/>
+              <a:round/>
+            </a:ln>
+          </p:spPr>
+          <p:txBody>
+            <a:bodyPr/>
+            <a:lstStyle/>
+            <a:p/>
+          </p:txBody>
+        </p:sp>
+        <p:sp>
+          <p:nvSpPr>
+            <p:cNvPr id="22" name="pl22"/>
+            <p:cNvSpPr/>
+            <p:nvPr/>
+          </p:nvSpPr>
+          <p:spPr>
+            <a:xfrm>
+              <a:off x="10859618" y="3088456"/>
+              <a:ext cx="0" cy="129595"/>
+            </a:xfrm>
+            <a:custGeom>
+              <a:avLst/>
+              <a:pathLst>
+                <a:path w="0" h="129595">
+                  <a:moveTo>
+                    <a:pt x="0" y="129595"/>
+                  </a:moveTo>
+                  <a:lnTo>
+                    <a:pt x="0" y="0"/>
+                  </a:lnTo>
+                </a:path>
+              </a:pathLst>
+            </a:custGeom>
+            <a:ln w="13550" cap="flat">
+              <a:solidFill>
+                <a:srgbClr val="0072BC">
+                  <a:alpha val="100000"/>
+                </a:srgbClr>
+              </a:solidFill>
+              <a:prstDash val="solid"/>
+              <a:round/>
+            </a:ln>
+          </p:spPr>
+          <p:txBody>
+            <a:bodyPr/>
+            <a:lstStyle/>
+            <a:p/>
+          </p:txBody>
+        </p:sp>
+        <p:sp>
+          <p:nvSpPr>
+            <p:cNvPr id="23" name="pl23"/>
+            <p:cNvSpPr/>
+            <p:nvPr/>
+          </p:nvSpPr>
+          <p:spPr>
+            <a:xfrm>
+              <a:off x="5223691" y="4384412"/>
+              <a:ext cx="0" cy="129595"/>
+            </a:xfrm>
+            <a:custGeom>
+              <a:avLst/>
+              <a:pathLst>
+                <a:path w="0" h="129595">
+                  <a:moveTo>
+                    <a:pt x="0" y="129595"/>
+                  </a:moveTo>
+                  <a:lnTo>
+                    <a:pt x="0" y="0"/>
+                  </a:lnTo>
+                </a:path>
+              </a:pathLst>
+            </a:custGeom>
+            <a:ln w="13550" cap="flat">
+              <a:solidFill>
+                <a:srgbClr val="666666">
+                  <a:alpha val="100000"/>
+                </a:srgbClr>
+              </a:solidFill>
+              <a:prstDash val="solid"/>
+              <a:round/>
+            </a:ln>
+          </p:spPr>
+          <p:txBody>
+            <a:bodyPr/>
+            <a:lstStyle/>
+            <a:p/>
+          </p:txBody>
+        </p:sp>
+        <p:sp>
+          <p:nvSpPr>
+            <p:cNvPr id="24" name="pl24"/>
+            <p:cNvSpPr/>
+            <p:nvPr/>
+          </p:nvSpPr>
+          <p:spPr>
+            <a:xfrm>
+              <a:off x="4792955" y="4449210"/>
+              <a:ext cx="430736" cy="0"/>
+            </a:xfrm>
+            <a:custGeom>
+              <a:avLst/>
+              <a:pathLst>
+                <a:path w="430736" h="0">
+                  <a:moveTo>
+                    <a:pt x="430736" y="0"/>
+                  </a:moveTo>
+                  <a:lnTo>
+                    <a:pt x="0" y="0"/>
+                  </a:lnTo>
+                </a:path>
+              </a:pathLst>
+            </a:custGeom>
+            <a:ln w="13550" cap="flat">
+              <a:solidFill>
+                <a:srgbClr val="666666">
+                  <a:alpha val="100000"/>
+                </a:srgbClr>
+              </a:solidFill>
+              <a:prstDash val="solid"/>
+              <a:round/>
+            </a:ln>
+          </p:spPr>
+          <p:txBody>
+            <a:bodyPr/>
+            <a:lstStyle/>
+            <a:p/>
+          </p:txBody>
+        </p:sp>
+        <p:sp>
+          <p:nvSpPr>
+            <p:cNvPr id="25" name="pl25"/>
+            <p:cNvSpPr/>
+            <p:nvPr/>
+          </p:nvSpPr>
+          <p:spPr>
+            <a:xfrm>
+              <a:off x="4792955" y="4384412"/>
+              <a:ext cx="0" cy="129595"/>
+            </a:xfrm>
+            <a:custGeom>
+              <a:avLst/>
+              <a:pathLst>
+                <a:path w="0" h="129595">
+                  <a:moveTo>
+                    <a:pt x="0" y="129595"/>
+                  </a:moveTo>
+                  <a:lnTo>
+                    <a:pt x="0" y="0"/>
+                  </a:lnTo>
+                </a:path>
+              </a:pathLst>
+            </a:custGeom>
+            <a:ln w="13550" cap="flat">
+              <a:solidFill>
+                <a:srgbClr val="666666">
+                  <a:alpha val="100000"/>
+                </a:srgbClr>
+              </a:solidFill>
+              <a:prstDash val="solid"/>
+              <a:round/>
+            </a:ln>
+          </p:spPr>
+          <p:txBody>
+            <a:bodyPr/>
+            <a:lstStyle/>
+            <a:p/>
+          </p:txBody>
+        </p:sp>
+        <p:sp>
+          <p:nvSpPr>
+            <p:cNvPr id="26" name="pl26"/>
+            <p:cNvSpPr/>
+            <p:nvPr/>
+          </p:nvSpPr>
+          <p:spPr>
+            <a:xfrm>
+              <a:off x="5642708" y="4384412"/>
+              <a:ext cx="0" cy="129595"/>
+            </a:xfrm>
+            <a:custGeom>
+              <a:avLst/>
+              <a:pathLst>
+                <a:path w="0" h="129595">
+                  <a:moveTo>
+                    <a:pt x="0" y="129595"/>
+                  </a:moveTo>
+                  <a:lnTo>
+                    <a:pt x="0" y="0"/>
+                  </a:lnTo>
+                </a:path>
+              </a:pathLst>
+            </a:custGeom>
+            <a:ln w="13550" cap="flat">
+              <a:solidFill>
+                <a:srgbClr val="0072BC">
+                  <a:alpha val="100000"/>
+                </a:srgbClr>
+              </a:solidFill>
+              <a:prstDash val="solid"/>
+              <a:round/>
+            </a:ln>
+          </p:spPr>
+          <p:txBody>
+            <a:bodyPr/>
+            <a:lstStyle/>
+            <a:p/>
+          </p:txBody>
+        </p:sp>
+        <p:sp>
+          <p:nvSpPr>
+            <p:cNvPr id="27" name="pl27"/>
+            <p:cNvSpPr/>
+            <p:nvPr/>
+          </p:nvSpPr>
+          <p:spPr>
+            <a:xfrm>
+              <a:off x="4317413" y="4449210"/>
+              <a:ext cx="1325294" cy="0"/>
+            </a:xfrm>
+            <a:custGeom>
+              <a:avLst/>
+              <a:pathLst>
+                <a:path w="1325294" h="0">
+                  <a:moveTo>
+                    <a:pt x="1325294" y="0"/>
+                  </a:moveTo>
+                  <a:lnTo>
+                    <a:pt x="0" y="0"/>
+                  </a:lnTo>
+                </a:path>
+              </a:pathLst>
+            </a:custGeom>
+            <a:ln w="13550" cap="flat">
+              <a:solidFill>
+                <a:srgbClr val="0072BC">
+                  <a:alpha val="100000"/>
+                </a:srgbClr>
+              </a:solidFill>
+              <a:prstDash val="solid"/>
+              <a:round/>
+            </a:ln>
+          </p:spPr>
+          <p:txBody>
+            <a:bodyPr/>
+            <a:lstStyle/>
+            <a:p/>
+          </p:txBody>
+        </p:sp>
+        <p:sp>
+          <p:nvSpPr>
+            <p:cNvPr id="28" name="pl28"/>
+            <p:cNvSpPr/>
+            <p:nvPr/>
+          </p:nvSpPr>
+          <p:spPr>
+            <a:xfrm>
+              <a:off x="4317413" y="4384412"/>
+              <a:ext cx="0" cy="129595"/>
+            </a:xfrm>
+            <a:custGeom>
+              <a:avLst/>
+              <a:pathLst>
+                <a:path w="0" h="129595">
+                  <a:moveTo>
+                    <a:pt x="0" y="129595"/>
+                  </a:moveTo>
+                  <a:lnTo>
+                    <a:pt x="0" y="0"/>
+                  </a:lnTo>
+                </a:path>
+              </a:pathLst>
+            </a:custGeom>
+            <a:ln w="13550" cap="flat">
+              <a:solidFill>
+                <a:srgbClr val="0072BC">
+                  <a:alpha val="100000"/>
+                </a:srgbClr>
+              </a:solidFill>
+              <a:prstDash val="solid"/>
+              <a:round/>
+            </a:ln>
+          </p:spPr>
+          <p:txBody>
+            <a:bodyPr/>
+            <a:lstStyle/>
+            <a:p/>
+          </p:txBody>
+        </p:sp>
+        <p:sp>
+          <p:nvSpPr>
+            <p:cNvPr id="29" name="pl29"/>
+            <p:cNvSpPr/>
+            <p:nvPr/>
+          </p:nvSpPr>
+          <p:spPr>
+            <a:xfrm>
+              <a:off x="10863363" y="3736434"/>
+              <a:ext cx="0" cy="129595"/>
+            </a:xfrm>
+            <a:custGeom>
+              <a:avLst/>
+              <a:pathLst>
+                <a:path w="0" h="129595">
+                  <a:moveTo>
+                    <a:pt x="0" y="129595"/>
+                  </a:moveTo>
+                  <a:lnTo>
+                    <a:pt x="0" y="0"/>
+                  </a:lnTo>
+                </a:path>
+              </a:pathLst>
+            </a:custGeom>
+            <a:ln w="13550" cap="flat">
+              <a:solidFill>
+                <a:srgbClr val="666666">
+                  <a:alpha val="100000"/>
+                </a:srgbClr>
+              </a:solidFill>
+              <a:prstDash val="solid"/>
+              <a:round/>
+            </a:ln>
+          </p:spPr>
+          <p:txBody>
+            <a:bodyPr/>
+            <a:lstStyle/>
+            <a:p/>
+          </p:txBody>
+        </p:sp>
+        <p:sp>
+          <p:nvSpPr>
+            <p:cNvPr id="30" name="pl30"/>
+            <p:cNvSpPr/>
+            <p:nvPr/>
+          </p:nvSpPr>
+          <p:spPr>
+            <a:xfrm>
+              <a:off x="10801742" y="3801232"/>
+              <a:ext cx="61620" cy="0"/>
+            </a:xfrm>
+            <a:custGeom>
+              <a:avLst/>
+              <a:pathLst>
+                <a:path w="61620" h="0">
+                  <a:moveTo>
+                    <a:pt x="61620" y="0"/>
+                  </a:moveTo>
+                  <a:lnTo>
+                    <a:pt x="0" y="0"/>
+                  </a:lnTo>
+                </a:path>
+              </a:pathLst>
+            </a:custGeom>
+            <a:ln w="13550" cap="flat">
+              <a:solidFill>
+                <a:srgbClr val="666666">
+                  <a:alpha val="100000"/>
+                </a:srgbClr>
+              </a:solidFill>
+              <a:prstDash val="solid"/>
+              <a:round/>
+            </a:ln>
+          </p:spPr>
+          <p:txBody>
+            <a:bodyPr/>
+            <a:lstStyle/>
+            <a:p/>
+          </p:txBody>
+        </p:sp>
+        <p:sp>
+          <p:nvSpPr>
+            <p:cNvPr id="31" name="pl31"/>
+            <p:cNvSpPr/>
+            <p:nvPr/>
+          </p:nvSpPr>
+          <p:spPr>
+            <a:xfrm>
+              <a:off x="10801742" y="3736434"/>
+              <a:ext cx="0" cy="129595"/>
+            </a:xfrm>
+            <a:custGeom>
+              <a:avLst/>
+              <a:pathLst>
+                <a:path w="0" h="129595">
+                  <a:moveTo>
+                    <a:pt x="0" y="129595"/>
+                  </a:moveTo>
+                  <a:lnTo>
+                    <a:pt x="0" y="0"/>
+                  </a:lnTo>
+                </a:path>
+              </a:pathLst>
+            </a:custGeom>
+            <a:ln w="13550" cap="flat">
+              <a:solidFill>
+                <a:srgbClr val="666666">
+                  <a:alpha val="100000"/>
+                </a:srgbClr>
+              </a:solidFill>
+              <a:prstDash val="solid"/>
+              <a:round/>
+            </a:ln>
+          </p:spPr>
+          <p:txBody>
+            <a:bodyPr/>
+            <a:lstStyle/>
+            <a:p/>
+          </p:txBody>
+        </p:sp>
+        <p:sp>
+          <p:nvSpPr>
+            <p:cNvPr id="32" name="pl32"/>
+            <p:cNvSpPr/>
+            <p:nvPr/>
+          </p:nvSpPr>
+          <p:spPr>
+            <a:xfrm>
+              <a:off x="10303228" y="3736434"/>
+              <a:ext cx="0" cy="129595"/>
+            </a:xfrm>
+            <a:custGeom>
+              <a:avLst/>
+              <a:pathLst>
+                <a:path w="0" h="129595">
+                  <a:moveTo>
+                    <a:pt x="0" y="129595"/>
+                  </a:moveTo>
+                  <a:lnTo>
+                    <a:pt x="0" y="0"/>
+                  </a:lnTo>
+                </a:path>
+              </a:pathLst>
+            </a:custGeom>
+            <a:ln w="13550" cap="flat">
+              <a:solidFill>
+                <a:srgbClr val="0072BC">
+                  <a:alpha val="100000"/>
+                </a:srgbClr>
+              </a:solidFill>
+              <a:prstDash val="solid"/>
+              <a:round/>
+            </a:ln>
+          </p:spPr>
+          <p:txBody>
+            <a:bodyPr/>
+            <a:lstStyle/>
+            <a:p/>
+          </p:txBody>
+        </p:sp>
+        <p:sp>
+          <p:nvSpPr>
+            <p:cNvPr id="33" name="pl33"/>
+            <p:cNvSpPr/>
+            <p:nvPr/>
+          </p:nvSpPr>
+          <p:spPr>
+            <a:xfrm>
+              <a:off x="10030703" y="3801232"/>
+              <a:ext cx="272525" cy="0"/>
+            </a:xfrm>
+            <a:custGeom>
+              <a:avLst/>
+              <a:pathLst>
+                <a:path w="272525" h="0">
+                  <a:moveTo>
+                    <a:pt x="272525" y="0"/>
+                  </a:moveTo>
+                  <a:lnTo>
+                    <a:pt x="0" y="0"/>
+                  </a:lnTo>
+                </a:path>
+              </a:pathLst>
+            </a:custGeom>
+            <a:ln w="13550" cap="flat">
+              <a:solidFill>
+                <a:srgbClr val="0072BC">
+                  <a:alpha val="100000"/>
+                </a:srgbClr>
+              </a:solidFill>
+              <a:prstDash val="solid"/>
+              <a:round/>
+            </a:ln>
+          </p:spPr>
+          <p:txBody>
+            <a:bodyPr/>
+            <a:lstStyle/>
+            <a:p/>
+          </p:txBody>
+        </p:sp>
+        <p:sp>
+          <p:nvSpPr>
+            <p:cNvPr id="34" name="pl34"/>
+            <p:cNvSpPr/>
+            <p:nvPr/>
+          </p:nvSpPr>
+          <p:spPr>
+            <a:xfrm>
+              <a:off x="10030703" y="3736434"/>
+              <a:ext cx="0" cy="129595"/>
+            </a:xfrm>
+            <a:custGeom>
+              <a:avLst/>
+              <a:pathLst>
+                <a:path w="0" h="129595">
+                  <a:moveTo>
+                    <a:pt x="0" y="129595"/>
+                  </a:moveTo>
+                  <a:lnTo>
+                    <a:pt x="0" y="0"/>
+                  </a:lnTo>
+                </a:path>
+              </a:pathLst>
+            </a:custGeom>
+            <a:ln w="13550" cap="flat">
+              <a:solidFill>
+                <a:srgbClr val="0072BC">
+                  <a:alpha val="100000"/>
+                </a:srgbClr>
+              </a:solidFill>
+              <a:prstDash val="solid"/>
+              <a:round/>
+            </a:ln>
+          </p:spPr>
+          <p:txBody>
+            <a:bodyPr/>
+            <a:lstStyle/>
+            <a:p/>
+          </p:txBody>
+        </p:sp>
+        <p:sp>
+          <p:nvSpPr>
+            <p:cNvPr id="35" name="tx35"/>
             <p:cNvSpPr/>
             <p:nvPr/>
           </p:nvSpPr>
@@ -6806,7 +9140,7 @@
               <a:r>
                 <a:rPr sz="1103">
                   <a:solidFill>
-                    <a:srgbClr val="7F7F7F">
+                    <a:srgbClr val="666666">
                       <a:alpha val="100000"/>
                     </a:srgbClr>
                   </a:solidFill>
@@ -6820,7 +9154,7 @@
         </p:sp>
         <p:sp>
           <p:nvSpPr>
-            <p:cNvPr id="18" name="tx18"/>
+            <p:cNvPr id="36" name="tx36"/>
             <p:cNvSpPr/>
             <p:nvPr/>
           </p:nvSpPr>
@@ -6866,13 +9200,13 @@
         </p:sp>
         <p:sp>
           <p:nvSpPr>
-            <p:cNvPr id="19" name="tx19"/>
-            <p:cNvSpPr/>
-            <p:nvPr/>
-          </p:nvSpPr>
-          <p:spPr>
-            <a:xfrm>
-              <a:off x="4788742" y="4544162"/>
+            <p:cNvPr id="37" name="tx37"/>
+            <p:cNvSpPr/>
+            <p:nvPr/>
+          </p:nvSpPr>
+          <p:spPr>
+            <a:xfrm>
+              <a:off x="4809553" y="4544162"/>
               <a:ext cx="397540" cy="105768"/>
             </a:xfrm>
             <a:prstGeom prst="rect">
@@ -6898,21 +9232,21 @@
               <a:r>
                 <a:rPr sz="1103">
                   <a:solidFill>
-                    <a:srgbClr val="7F7F7F">
+                    <a:srgbClr val="666666">
                       <a:alpha val="100000"/>
                     </a:srgbClr>
                   </a:solidFill>
                   <a:latin typeface="Arial"/>
                   <a:cs typeface="Arial"/>
                 </a:rPr>
-                <a:t>10.9%</a:t>
+                <a:t>11.2%</a:t>
               </a:r>
             </a:p>
           </p:txBody>
         </p:sp>
         <p:sp>
           <p:nvSpPr>
-            <p:cNvPr id="20" name="tx20"/>
+            <p:cNvPr id="38" name="tx38"/>
             <p:cNvSpPr/>
             <p:nvPr/>
           </p:nvSpPr>
@@ -6958,7 +9292,7 @@
         </p:sp>
         <p:sp>
           <p:nvSpPr>
-            <p:cNvPr id="21" name="tx21"/>
+            <p:cNvPr id="39" name="tx39"/>
             <p:cNvSpPr/>
             <p:nvPr/>
           </p:nvSpPr>
@@ -6990,7 +9324,7 @@
               <a:r>
                 <a:rPr sz="1103">
                   <a:solidFill>
-                    <a:srgbClr val="7F7F7F">
+                    <a:srgbClr val="666666">
                       <a:alpha val="100000"/>
                     </a:srgbClr>
                   </a:solidFill>
@@ -7004,7 +9338,7 @@
         </p:sp>
         <p:sp>
           <p:nvSpPr>
-            <p:cNvPr id="22" name="tx22"/>
+            <p:cNvPr id="40" name="tx40"/>
             <p:cNvSpPr/>
             <p:nvPr/>
           </p:nvSpPr>
@@ -7050,7 +9384,7 @@
         </p:sp>
         <p:sp>
           <p:nvSpPr>
-            <p:cNvPr id="23" name="tx23"/>
+            <p:cNvPr id="41" name="tx41"/>
             <p:cNvSpPr/>
             <p:nvPr/>
           </p:nvSpPr>
@@ -7096,7 +9430,7 @@
         </p:sp>
         <p:sp>
           <p:nvSpPr>
-            <p:cNvPr id="24" name="tx24"/>
+            <p:cNvPr id="42" name="tx42"/>
             <p:cNvSpPr/>
             <p:nvPr/>
           </p:nvSpPr>
@@ -7142,7 +9476,7 @@
         </p:sp>
         <p:sp>
           <p:nvSpPr>
-            <p:cNvPr id="25" name="tx25"/>
+            <p:cNvPr id="43" name="tx43"/>
             <p:cNvSpPr/>
             <p:nvPr/>
           </p:nvSpPr>
@@ -7188,7 +9522,7 @@
         </p:sp>
         <p:sp>
           <p:nvSpPr>
-            <p:cNvPr id="26" name="tx26"/>
+            <p:cNvPr id="44" name="tx44"/>
             <p:cNvSpPr/>
             <p:nvPr/>
           </p:nvSpPr>
@@ -7234,7 +9568,7 @@
         </p:sp>
         <p:sp>
           <p:nvSpPr>
-            <p:cNvPr id="27" name="tx27"/>
+            <p:cNvPr id="45" name="tx45"/>
             <p:cNvSpPr/>
             <p:nvPr/>
           </p:nvSpPr>
@@ -7280,7 +9614,7 @@
         </p:sp>
         <p:sp>
           <p:nvSpPr>
-            <p:cNvPr id="28" name="tx28"/>
+            <p:cNvPr id="46" name="tx46"/>
             <p:cNvSpPr/>
             <p:nvPr/>
           </p:nvSpPr>
@@ -7326,7 +9660,7 @@
         </p:sp>
         <p:sp>
           <p:nvSpPr>
-            <p:cNvPr id="29" name="tx29"/>
+            <p:cNvPr id="47" name="tx47"/>
             <p:cNvSpPr/>
             <p:nvPr/>
           </p:nvSpPr>
@@ -7372,7 +9706,7 @@
         </p:sp>
         <p:sp>
           <p:nvSpPr>
-            <p:cNvPr id="30" name="tx30"/>
+            <p:cNvPr id="48" name="tx48"/>
             <p:cNvSpPr/>
             <p:nvPr/>
           </p:nvSpPr>
@@ -7418,7 +9752,7 @@
         </p:sp>
         <p:sp>
           <p:nvSpPr>
-            <p:cNvPr id="31" name="tx31"/>
+            <p:cNvPr id="49" name="tx49"/>
             <p:cNvSpPr/>
             <p:nvPr/>
           </p:nvSpPr>
@@ -7464,7 +9798,7 @@
         </p:sp>
         <p:sp>
           <p:nvSpPr>
-            <p:cNvPr id="32" name="pl32"/>
+            <p:cNvPr id="50" name="pl50"/>
             <p:cNvSpPr/>
             <p:nvPr/>
           </p:nvSpPr>
@@ -7504,7 +9838,7 @@
         </p:sp>
         <p:sp>
           <p:nvSpPr>
-            <p:cNvPr id="33" name="tx33"/>
+            <p:cNvPr id="51" name="tx51"/>
             <p:cNvSpPr/>
             <p:nvPr/>
           </p:nvSpPr>
@@ -7550,7 +9884,7 @@
         </p:sp>
         <p:sp>
           <p:nvSpPr>
-            <p:cNvPr id="34" name="tx34"/>
+            <p:cNvPr id="52" name="tx52"/>
             <p:cNvSpPr/>
             <p:nvPr/>
           </p:nvSpPr>
@@ -7596,7 +9930,7 @@
         </p:sp>
         <p:sp>
           <p:nvSpPr>
-            <p:cNvPr id="35" name="tx35"/>
+            <p:cNvPr id="53" name="tx53"/>
             <p:cNvSpPr/>
             <p:nvPr/>
           </p:nvSpPr>
@@ -7642,7 +9976,7 @@
         </p:sp>
         <p:sp>
           <p:nvSpPr>
-            <p:cNvPr id="36" name="tx36"/>
+            <p:cNvPr id="54" name="tx54"/>
             <p:cNvSpPr/>
             <p:nvPr/>
           </p:nvSpPr>
@@ -7688,13 +10022,134 @@
         </p:sp>
         <p:sp>
           <p:nvSpPr>
-            <p:cNvPr id="37" name="pt37"/>
+            <p:cNvPr id="55" name="pt55"/>
             <p:cNvSpPr/>
             <p:nvPr/>
           </p:nvSpPr>
           <p:spPr>
             <a:xfrm>
               <a:off x="4026390" y="2435980"/>
+              <a:ext cx="49651" cy="49651"/>
+            </a:xfrm>
+            <a:prstGeom prst="ellipse">
+              <a:avLst/>
+            </a:prstGeom>
+            <a:solidFill>
+              <a:srgbClr val="666666">
+                <a:alpha val="100000"/>
+              </a:srgbClr>
+            </a:solidFill>
+            <a:ln w="9000" cap="rnd">
+              <a:solidFill>
+                <a:srgbClr val="666666">
+                  <a:alpha val="100000"/>
+                </a:srgbClr>
+              </a:solidFill>
+              <a:prstDash val="solid"/>
+              <a:round/>
+            </a:ln>
+          </p:spPr>
+          <p:txBody>
+            <a:bodyPr/>
+            <a:lstStyle/>
+            <a:p/>
+          </p:txBody>
+        </p:sp>
+        <p:sp>
+          <p:nvSpPr>
+            <p:cNvPr id="56" name="pl56"/>
+            <p:cNvSpPr/>
+            <p:nvPr/>
+          </p:nvSpPr>
+          <p:spPr>
+            <a:xfrm>
+              <a:off x="3960117" y="2460806"/>
+              <a:ext cx="182196" cy="0"/>
+            </a:xfrm>
+            <a:custGeom>
+              <a:avLst/>
+              <a:pathLst>
+                <a:path w="182196" h="0">
+                  <a:moveTo>
+                    <a:pt x="0" y="0"/>
+                  </a:moveTo>
+                  <a:lnTo>
+                    <a:pt x="182196" y="0"/>
+                  </a:lnTo>
+                </a:path>
+              </a:pathLst>
+            </a:custGeom>
+            <a:ln w="13550" cap="flat">
+              <a:solidFill>
+                <a:srgbClr val="666666">
+                  <a:alpha val="100000"/>
+                </a:srgbClr>
+              </a:solidFill>
+              <a:prstDash val="solid"/>
+              <a:round/>
+            </a:ln>
+          </p:spPr>
+          <p:txBody>
+            <a:bodyPr/>
+            <a:lstStyle/>
+            <a:p/>
+          </p:txBody>
+        </p:sp>
+        <p:sp>
+          <p:nvSpPr>
+            <p:cNvPr id="57" name="tx57"/>
+            <p:cNvSpPr/>
+            <p:nvPr/>
+          </p:nvSpPr>
+          <p:spPr>
+            <a:xfrm>
+              <a:off x="4012228" y="2434997"/>
+              <a:ext cx="77974" cy="75989"/>
+            </a:xfrm>
+            <a:prstGeom prst="rect">
+              <a:avLst/>
+            </a:prstGeom>
+            <a:noFill/>
+          </p:spPr>
+          <p:txBody>
+            <a:bodyPr lIns="0" rIns="0" tIns="0" bIns="0" anchorCtr="1" anchor="ctr" wrap="none"/>
+            <a:lstStyle/>
+            <a:p>
+              <a:pPr algn="l" marL="0" marR="0" indent="0">
+                <a:lnSpc>
+                  <a:spcPts val="1103"/>
+                </a:lnSpc>
+                <a:spcBef>
+                  <a:spcPts val="0"/>
+                </a:spcBef>
+                <a:spcAft>
+                  <a:spcPts val="0"/>
+                </a:spcAft>
+              </a:pPr>
+              <a:r>
+                <a:rPr sz="1103">
+                  <a:solidFill>
+                    <a:srgbClr val="666666">
+                      <a:alpha val="100000"/>
+                    </a:srgbClr>
+                  </a:solidFill>
+                  <a:latin typeface="Arial"/>
+                  <a:cs typeface="Arial"/>
+                </a:rPr>
+                <a:t>a</a:t>
+              </a:r>
+            </a:p>
+          </p:txBody>
+        </p:sp>
+        <p:sp>
+          <p:nvSpPr>
+            <p:cNvPr id="58" name="pt58"/>
+            <p:cNvSpPr/>
+            <p:nvPr/>
+          </p:nvSpPr>
+          <p:spPr>
+            <a:xfrm>
+              <a:off x="5394138" y="2435980"/>
               <a:ext cx="49651" cy="49651"/>
             </a:xfrm>
             <a:prstGeom prst="ellipse">
@@ -7723,13 +10178,53 @@
         </p:sp>
         <p:sp>
           <p:nvSpPr>
-            <p:cNvPr id="38" name="tx38"/>
-            <p:cNvSpPr/>
-            <p:nvPr/>
-          </p:nvSpPr>
-          <p:spPr>
-            <a:xfrm>
-              <a:off x="4012228" y="2434997"/>
+            <p:cNvPr id="59" name="pl59"/>
+            <p:cNvSpPr/>
+            <p:nvPr/>
+          </p:nvSpPr>
+          <p:spPr>
+            <a:xfrm>
+              <a:off x="5327866" y="2460806"/>
+              <a:ext cx="182196" cy="0"/>
+            </a:xfrm>
+            <a:custGeom>
+              <a:avLst/>
+              <a:pathLst>
+                <a:path w="182196" h="0">
+                  <a:moveTo>
+                    <a:pt x="0" y="0"/>
+                  </a:moveTo>
+                  <a:lnTo>
+                    <a:pt x="182196" y="0"/>
+                  </a:lnTo>
+                </a:path>
+              </a:pathLst>
+            </a:custGeom>
+            <a:ln w="13550" cap="flat">
+              <a:solidFill>
+                <a:srgbClr val="0072BC">
+                  <a:alpha val="100000"/>
+                </a:srgbClr>
+              </a:solidFill>
+              <a:prstDash val="solid"/>
+              <a:round/>
+            </a:ln>
+          </p:spPr>
+          <p:txBody>
+            <a:bodyPr/>
+            <a:lstStyle/>
+            <a:p/>
+          </p:txBody>
+        </p:sp>
+        <p:sp>
+          <p:nvSpPr>
+            <p:cNvPr id="60" name="tx60"/>
+            <p:cNvSpPr/>
+            <p:nvPr/>
+          </p:nvSpPr>
+          <p:spPr>
+            <a:xfrm>
+              <a:off x="5379977" y="2434997"/>
               <a:ext cx="77974" cy="75989"/>
             </a:xfrm>
             <a:prstGeom prst="rect">
@@ -7769,13 +10264,59 @@
         </p:sp>
         <p:sp>
           <p:nvSpPr>
-            <p:cNvPr id="39" name="tx39"/>
-            <p:cNvSpPr/>
-            <p:nvPr/>
-          </p:nvSpPr>
-          <p:spPr>
-            <a:xfrm>
-              <a:off x="4259983" y="2367038"/>
+            <p:cNvPr id="61" name="tx61"/>
+            <p:cNvSpPr/>
+            <p:nvPr/>
+          </p:nvSpPr>
+          <p:spPr>
+            <a:xfrm>
+              <a:off x="4259983" y="2396586"/>
+              <a:ext cx="950213" cy="124883"/>
+            </a:xfrm>
+            <a:prstGeom prst="rect">
+              <a:avLst/>
+            </a:prstGeom>
+            <a:noFill/>
+          </p:spPr>
+          <p:txBody>
+            <a:bodyPr lIns="0" rIns="0" tIns="0" bIns="0" anchorCtr="1" anchor="ctr" wrap="none"/>
+            <a:lstStyle/>
+            <a:p>
+              <a:pPr algn="l" marL="0" marR="0" indent="0">
+                <a:lnSpc>
+                  <a:spcPts val="1333"/>
+                </a:lnSpc>
+                <a:spcBef>
+                  <a:spcPts val="0"/>
+                </a:spcBef>
+                <a:spcAft>
+                  <a:spcPts val="0"/>
+                </a:spcAft>
+              </a:pPr>
+              <a:r>
+                <a:rPr sz="1333">
+                  <a:solidFill>
+                    <a:srgbClr val="191919">
+                      <a:alpha val="100000"/>
+                    </a:srgbClr>
+                  </a:solidFill>
+                  <a:latin typeface="Lato"/>
+                  <a:cs typeface="Lato"/>
+                </a:rPr>
+                <a:t>Costa Ricans</a:t>
+              </a:r>
+            </a:p>
+          </p:txBody>
+        </p:sp>
+        <p:sp>
+          <p:nvSpPr>
+            <p:cNvPr id="62" name="tx62"/>
+            <p:cNvSpPr/>
+            <p:nvPr/>
+          </p:nvSpPr>
+          <p:spPr>
+            <a:xfrm>
+              <a:off x="5627731" y="2367038"/>
               <a:ext cx="915161" cy="154432"/>
             </a:xfrm>
             <a:prstGeom prst="rect">
@@ -7815,7 +10356,7 @@
         </p:sp>
         <p:sp>
           <p:nvSpPr>
-            <p:cNvPr id="40" name="tx40"/>
+            <p:cNvPr id="63" name="tx63"/>
             <p:cNvSpPr/>
             <p:nvPr/>
           </p:nvSpPr>
@@ -7861,7 +10402,7 @@
         </p:sp>
         <p:sp>
           <p:nvSpPr>
-            <p:cNvPr id="41" name="tx41"/>
+            <p:cNvPr id="64" name="tx64"/>
             <p:cNvSpPr/>
             <p:nvPr/>
           </p:nvSpPr>
@@ -7907,7 +10448,7 @@
         </p:sp>
         <p:sp>
           <p:nvSpPr>
-            <p:cNvPr id="42" name="tx42"/>
+            <p:cNvPr id="65" name="tx65"/>
             <p:cNvSpPr/>
             <p:nvPr/>
           </p:nvSpPr>

</xml_diff>

<commit_message>
Display confidence interval and purrr reiteration
why:replace standard deviation per confidene interval in plots (CV doesn't add to the point estimate and under the normality assumption, your 95% CI is the point estimate +/- 1.96*SE)
and shorten my code

how: using CI vartype in survey mean and using purr::map_dfr to reiterate indicator calculation.
</commit_message>
<xml_diff>
--- a/COSTA-RICA---RBM-Impact-Indicators-from-ENAHO.pptx
+++ b/COSTA-RICA---RBM-Impact-Indicators-from-ENAHO.pptx
@@ -2827,7 +2827,7 @@
             </a:pPr>
             <a:r>
               <a:rPr/>
-              <a:t>Impact Indicators from ENAHO</a:t>
+              <a:t>Impact &amp; Outcome Indicators from ENAHO</a:t>
             </a:r>
           </a:p>
         </p:txBody>
@@ -2908,7 +2908,7 @@
             </a:pPr>
             <a:r>
               <a:rPr/>
-              <a:t>28 December 2022</a:t>
+              <a:t>03 January 2023</a:t>
             </a:r>
           </a:p>
         </p:txBody>
@@ -3505,7 +3505,112 @@
           </p:nvSpPr>
           <p:spPr>
             <a:xfrm>
-              <a:off x="5831128" y="3396079"/>
+              <a:off x="6481610" y="3396079"/>
+              <a:ext cx="49651" cy="49651"/>
+            </a:xfrm>
+            <a:prstGeom prst="ellipse">
+              <a:avLst/>
+            </a:prstGeom>
+            <a:solidFill>
+              <a:srgbClr val="0072BC">
+                <a:alpha val="100000"/>
+              </a:srgbClr>
+            </a:solidFill>
+            <a:ln w="9000" cap="rnd">
+              <a:solidFill>
+                <a:srgbClr val="0072BC">
+                  <a:alpha val="100000"/>
+                </a:srgbClr>
+              </a:solidFill>
+              <a:prstDash val="solid"/>
+              <a:round/>
+            </a:ln>
+          </p:spPr>
+          <p:txBody>
+            <a:bodyPr/>
+            <a:lstStyle/>
+            <a:p/>
+          </p:txBody>
+        </p:sp>
+        <p:sp>
+          <p:nvSpPr>
+            <p:cNvPr id="12" name="pt12"/>
+            <p:cNvSpPr/>
+            <p:nvPr/>
+          </p:nvSpPr>
+          <p:spPr>
+            <a:xfrm>
+              <a:off x="8503697" y="4486149"/>
+              <a:ext cx="49651" cy="49651"/>
+            </a:xfrm>
+            <a:prstGeom prst="ellipse">
+              <a:avLst/>
+            </a:prstGeom>
+            <a:solidFill>
+              <a:srgbClr val="0072BC">
+                <a:alpha val="100000"/>
+              </a:srgbClr>
+            </a:solidFill>
+            <a:ln w="9000" cap="rnd">
+              <a:solidFill>
+                <a:srgbClr val="0072BC">
+                  <a:alpha val="100000"/>
+                </a:srgbClr>
+              </a:solidFill>
+              <a:prstDash val="solid"/>
+              <a:round/>
+            </a:ln>
+          </p:spPr>
+          <p:txBody>
+            <a:bodyPr/>
+            <a:lstStyle/>
+            <a:p/>
+          </p:txBody>
+        </p:sp>
+        <p:sp>
+          <p:nvSpPr>
+            <p:cNvPr id="13" name="pt13"/>
+            <p:cNvSpPr/>
+            <p:nvPr/>
+          </p:nvSpPr>
+          <p:spPr>
+            <a:xfrm>
+              <a:off x="10367060" y="3941114"/>
+              <a:ext cx="49651" cy="49651"/>
+            </a:xfrm>
+            <a:prstGeom prst="ellipse">
+              <a:avLst/>
+            </a:prstGeom>
+            <a:solidFill>
+              <a:srgbClr val="0072BC">
+                <a:alpha val="100000"/>
+              </a:srgbClr>
+            </a:solidFill>
+            <a:ln w="9000" cap="rnd">
+              <a:solidFill>
+                <a:srgbClr val="0072BC">
+                  <a:alpha val="100000"/>
+                </a:srgbClr>
+              </a:solidFill>
+              <a:prstDash val="solid"/>
+              <a:round/>
+            </a:ln>
+          </p:spPr>
+          <p:txBody>
+            <a:bodyPr/>
+            <a:lstStyle/>
+            <a:p/>
+          </p:txBody>
+        </p:sp>
+        <p:sp>
+          <p:nvSpPr>
+            <p:cNvPr id="14" name="pt14"/>
+            <p:cNvSpPr/>
+            <p:nvPr/>
+          </p:nvSpPr>
+          <p:spPr>
+            <a:xfrm>
+              <a:off x="5832601" y="3396079"/>
               <a:ext cx="49651" cy="49651"/>
             </a:xfrm>
             <a:prstGeom prst="ellipse">
@@ -3534,48 +3639,13 @@
         </p:sp>
         <p:sp>
           <p:nvSpPr>
-            <p:cNvPr id="12" name="pt12"/>
-            <p:cNvSpPr/>
-            <p:nvPr/>
-          </p:nvSpPr>
-          <p:spPr>
-            <a:xfrm>
-              <a:off x="6447193" y="3396079"/>
-              <a:ext cx="49651" cy="49651"/>
-            </a:xfrm>
-            <a:prstGeom prst="ellipse">
-              <a:avLst/>
-            </a:prstGeom>
-            <a:solidFill>
-              <a:srgbClr val="0072BC">
-                <a:alpha val="100000"/>
-              </a:srgbClr>
-            </a:solidFill>
-            <a:ln w="9000" cap="rnd">
-              <a:solidFill>
-                <a:srgbClr val="0072BC">
-                  <a:alpha val="100000"/>
-                </a:srgbClr>
-              </a:solidFill>
-              <a:prstDash val="solid"/>
-              <a:round/>
-            </a:ln>
-          </p:spPr>
-          <p:txBody>
-            <a:bodyPr/>
-            <a:lstStyle/>
-            <a:p/>
-          </p:txBody>
-        </p:sp>
-        <p:sp>
-          <p:nvSpPr>
-            <p:cNvPr id="13" name="pt13"/>
-            <p:cNvSpPr/>
-            <p:nvPr/>
-          </p:nvSpPr>
-          <p:spPr>
-            <a:xfrm>
-              <a:off x="10764809" y="3941114"/>
+            <p:cNvPr id="15" name="pt15"/>
+            <p:cNvSpPr/>
+            <p:nvPr/>
+          </p:nvSpPr>
+          <p:spPr>
+            <a:xfrm>
+              <a:off x="10319167" y="4486149"/>
               <a:ext cx="49651" cy="49651"/>
             </a:xfrm>
             <a:prstGeom prst="ellipse">
@@ -3604,48 +3674,13 @@
         </p:sp>
         <p:sp>
           <p:nvSpPr>
-            <p:cNvPr id="14" name="pt14"/>
-            <p:cNvSpPr/>
-            <p:nvPr/>
-          </p:nvSpPr>
-          <p:spPr>
-            <a:xfrm>
-              <a:off x="10367060" y="3941114"/>
-              <a:ext cx="49651" cy="49651"/>
-            </a:xfrm>
-            <a:prstGeom prst="ellipse">
-              <a:avLst/>
-            </a:prstGeom>
-            <a:solidFill>
-              <a:srgbClr val="0072BC">
-                <a:alpha val="100000"/>
-              </a:srgbClr>
-            </a:solidFill>
-            <a:ln w="9000" cap="rnd">
-              <a:solidFill>
-                <a:srgbClr val="0072BC">
-                  <a:alpha val="100000"/>
-                </a:srgbClr>
-              </a:solidFill>
-              <a:prstDash val="solid"/>
-              <a:round/>
-            </a:ln>
-          </p:spPr>
-          <p:txBody>
-            <a:bodyPr/>
-            <a:lstStyle/>
-            <a:p/>
-          </p:txBody>
-        </p:sp>
-        <p:sp>
-          <p:nvSpPr>
-            <p:cNvPr id="15" name="pt15"/>
-            <p:cNvSpPr/>
-            <p:nvPr/>
-          </p:nvSpPr>
-          <p:spPr>
-            <a:xfrm>
-              <a:off x="10319167" y="4486149"/>
+            <p:cNvPr id="16" name="pt16"/>
+            <p:cNvSpPr/>
+            <p:nvPr/>
+          </p:nvSpPr>
+          <p:spPr>
+            <a:xfrm>
+              <a:off x="10764809" y="3941114"/>
               <a:ext cx="49651" cy="49651"/>
             </a:xfrm>
             <a:prstGeom prst="ellipse">
@@ -3674,24 +3709,29 @@
         </p:sp>
         <p:sp>
           <p:nvSpPr>
-            <p:cNvPr id="16" name="pt16"/>
-            <p:cNvSpPr/>
-            <p:nvPr/>
-          </p:nvSpPr>
-          <p:spPr>
-            <a:xfrm>
-              <a:off x="8503697" y="4486149"/>
-              <a:ext cx="49651" cy="49651"/>
-            </a:xfrm>
-            <a:prstGeom prst="ellipse">
-              <a:avLst/>
-            </a:prstGeom>
-            <a:solidFill>
-              <a:srgbClr val="0072BC">
-                <a:alpha val="100000"/>
-              </a:srgbClr>
-            </a:solidFill>
-            <a:ln w="9000" cap="rnd">
+            <p:cNvPr id="17" name="pl17"/>
+            <p:cNvSpPr/>
+            <p:nvPr/>
+          </p:nvSpPr>
+          <p:spPr>
+            <a:xfrm>
+              <a:off x="6772581" y="3366401"/>
+              <a:ext cx="0" cy="109007"/>
+            </a:xfrm>
+            <a:custGeom>
+              <a:avLst/>
+              <a:pathLst>
+                <a:path w="0" h="109007">
+                  <a:moveTo>
+                    <a:pt x="0" y="109007"/>
+                  </a:moveTo>
+                  <a:lnTo>
+                    <a:pt x="0" y="0"/>
+                  </a:lnTo>
+                </a:path>
+              </a:pathLst>
+            </a:custGeom>
+            <a:ln w="13550" cap="flat">
               <a:solidFill>
                 <a:srgbClr val="0072BC">
                   <a:alpha val="100000"/>
@@ -3709,13 +3749,333 @@
         </p:sp>
         <p:sp>
           <p:nvSpPr>
-            <p:cNvPr id="17" name="pl17"/>
-            <p:cNvSpPr/>
-            <p:nvPr/>
-          </p:nvSpPr>
-          <p:spPr>
-            <a:xfrm>
-              <a:off x="6037547" y="3366401"/>
+            <p:cNvPr id="18" name="pl18"/>
+            <p:cNvSpPr/>
+            <p:nvPr/>
+          </p:nvSpPr>
+          <p:spPr>
+            <a:xfrm>
+              <a:off x="6240291" y="3420905"/>
+              <a:ext cx="532290" cy="0"/>
+            </a:xfrm>
+            <a:custGeom>
+              <a:avLst/>
+              <a:pathLst>
+                <a:path w="532290" h="0">
+                  <a:moveTo>
+                    <a:pt x="532290" y="0"/>
+                  </a:moveTo>
+                  <a:lnTo>
+                    <a:pt x="0" y="0"/>
+                  </a:lnTo>
+                </a:path>
+              </a:pathLst>
+            </a:custGeom>
+            <a:ln w="13550" cap="flat">
+              <a:solidFill>
+                <a:srgbClr val="0072BC">
+                  <a:alpha val="100000"/>
+                </a:srgbClr>
+              </a:solidFill>
+              <a:prstDash val="solid"/>
+              <a:round/>
+            </a:ln>
+          </p:spPr>
+          <p:txBody>
+            <a:bodyPr/>
+            <a:lstStyle/>
+            <a:p/>
+          </p:txBody>
+        </p:sp>
+        <p:sp>
+          <p:nvSpPr>
+            <p:cNvPr id="19" name="pl19"/>
+            <p:cNvSpPr/>
+            <p:nvPr/>
+          </p:nvSpPr>
+          <p:spPr>
+            <a:xfrm>
+              <a:off x="6240291" y="3366401"/>
+              <a:ext cx="0" cy="109007"/>
+            </a:xfrm>
+            <a:custGeom>
+              <a:avLst/>
+              <a:pathLst>
+                <a:path w="0" h="109007">
+                  <a:moveTo>
+                    <a:pt x="0" y="109007"/>
+                  </a:moveTo>
+                  <a:lnTo>
+                    <a:pt x="0" y="0"/>
+                  </a:lnTo>
+                </a:path>
+              </a:pathLst>
+            </a:custGeom>
+            <a:ln w="13550" cap="flat">
+              <a:solidFill>
+                <a:srgbClr val="0072BC">
+                  <a:alpha val="100000"/>
+                </a:srgbClr>
+              </a:solidFill>
+              <a:prstDash val="solid"/>
+              <a:round/>
+            </a:ln>
+          </p:spPr>
+          <p:txBody>
+            <a:bodyPr/>
+            <a:lstStyle/>
+            <a:p/>
+          </p:txBody>
+        </p:sp>
+        <p:sp>
+          <p:nvSpPr>
+            <p:cNvPr id="20" name="pl20"/>
+            <p:cNvSpPr/>
+            <p:nvPr/>
+          </p:nvSpPr>
+          <p:spPr>
+            <a:xfrm>
+              <a:off x="8733740" y="4456472"/>
+              <a:ext cx="0" cy="109007"/>
+            </a:xfrm>
+            <a:custGeom>
+              <a:avLst/>
+              <a:pathLst>
+                <a:path w="0" h="109007">
+                  <a:moveTo>
+                    <a:pt x="0" y="109007"/>
+                  </a:moveTo>
+                  <a:lnTo>
+                    <a:pt x="0" y="0"/>
+                  </a:lnTo>
+                </a:path>
+              </a:pathLst>
+            </a:custGeom>
+            <a:ln w="13550" cap="flat">
+              <a:solidFill>
+                <a:srgbClr val="0072BC">
+                  <a:alpha val="100000"/>
+                </a:srgbClr>
+              </a:solidFill>
+              <a:prstDash val="solid"/>
+              <a:round/>
+            </a:ln>
+          </p:spPr>
+          <p:txBody>
+            <a:bodyPr/>
+            <a:lstStyle/>
+            <a:p/>
+          </p:txBody>
+        </p:sp>
+        <p:sp>
+          <p:nvSpPr>
+            <p:cNvPr id="21" name="pl21"/>
+            <p:cNvSpPr/>
+            <p:nvPr/>
+          </p:nvSpPr>
+          <p:spPr>
+            <a:xfrm>
+              <a:off x="8323306" y="4510975"/>
+              <a:ext cx="410433" cy="0"/>
+            </a:xfrm>
+            <a:custGeom>
+              <a:avLst/>
+              <a:pathLst>
+                <a:path w="410433" h="0">
+                  <a:moveTo>
+                    <a:pt x="410433" y="0"/>
+                  </a:moveTo>
+                  <a:lnTo>
+                    <a:pt x="0" y="0"/>
+                  </a:lnTo>
+                </a:path>
+              </a:pathLst>
+            </a:custGeom>
+            <a:ln w="13550" cap="flat">
+              <a:solidFill>
+                <a:srgbClr val="0072BC">
+                  <a:alpha val="100000"/>
+                </a:srgbClr>
+              </a:solidFill>
+              <a:prstDash val="solid"/>
+              <a:round/>
+            </a:ln>
+          </p:spPr>
+          <p:txBody>
+            <a:bodyPr/>
+            <a:lstStyle/>
+            <a:p/>
+          </p:txBody>
+        </p:sp>
+        <p:sp>
+          <p:nvSpPr>
+            <p:cNvPr id="22" name="pl22"/>
+            <p:cNvSpPr/>
+            <p:nvPr/>
+          </p:nvSpPr>
+          <p:spPr>
+            <a:xfrm>
+              <a:off x="8323306" y="4456472"/>
+              <a:ext cx="0" cy="109007"/>
+            </a:xfrm>
+            <a:custGeom>
+              <a:avLst/>
+              <a:pathLst>
+                <a:path w="0" h="109007">
+                  <a:moveTo>
+                    <a:pt x="0" y="109007"/>
+                  </a:moveTo>
+                  <a:lnTo>
+                    <a:pt x="0" y="0"/>
+                  </a:lnTo>
+                </a:path>
+              </a:pathLst>
+            </a:custGeom>
+            <a:ln w="13550" cap="flat">
+              <a:solidFill>
+                <a:srgbClr val="0072BC">
+                  <a:alpha val="100000"/>
+                </a:srgbClr>
+              </a:solidFill>
+              <a:prstDash val="solid"/>
+              <a:round/>
+            </a:ln>
+          </p:spPr>
+          <p:txBody>
+            <a:bodyPr/>
+            <a:lstStyle/>
+            <a:p/>
+          </p:txBody>
+        </p:sp>
+        <p:sp>
+          <p:nvSpPr>
+            <p:cNvPr id="23" name="pl23"/>
+            <p:cNvSpPr/>
+            <p:nvPr/>
+          </p:nvSpPr>
+          <p:spPr>
+            <a:xfrm>
+              <a:off x="10615675" y="3911437"/>
+              <a:ext cx="0" cy="109007"/>
+            </a:xfrm>
+            <a:custGeom>
+              <a:avLst/>
+              <a:pathLst>
+                <a:path w="0" h="109007">
+                  <a:moveTo>
+                    <a:pt x="0" y="109007"/>
+                  </a:moveTo>
+                  <a:lnTo>
+                    <a:pt x="0" y="0"/>
+                  </a:lnTo>
+                </a:path>
+              </a:pathLst>
+            </a:custGeom>
+            <a:ln w="13550" cap="flat">
+              <a:solidFill>
+                <a:srgbClr val="0072BC">
+                  <a:alpha val="100000"/>
+                </a:srgbClr>
+              </a:solidFill>
+              <a:prstDash val="solid"/>
+              <a:round/>
+            </a:ln>
+          </p:spPr>
+          <p:txBody>
+            <a:bodyPr/>
+            <a:lstStyle/>
+            <a:p/>
+          </p:txBody>
+        </p:sp>
+        <p:sp>
+          <p:nvSpPr>
+            <p:cNvPr id="24" name="pl24"/>
+            <p:cNvSpPr/>
+            <p:nvPr/>
+          </p:nvSpPr>
+          <p:spPr>
+            <a:xfrm>
+              <a:off x="10168096" y="3965940"/>
+              <a:ext cx="447579" cy="0"/>
+            </a:xfrm>
+            <a:custGeom>
+              <a:avLst/>
+              <a:pathLst>
+                <a:path w="447579" h="0">
+                  <a:moveTo>
+                    <a:pt x="447579" y="0"/>
+                  </a:moveTo>
+                  <a:lnTo>
+                    <a:pt x="0" y="0"/>
+                  </a:lnTo>
+                </a:path>
+              </a:pathLst>
+            </a:custGeom>
+            <a:ln w="13550" cap="flat">
+              <a:solidFill>
+                <a:srgbClr val="0072BC">
+                  <a:alpha val="100000"/>
+                </a:srgbClr>
+              </a:solidFill>
+              <a:prstDash val="solid"/>
+              <a:round/>
+            </a:ln>
+          </p:spPr>
+          <p:txBody>
+            <a:bodyPr/>
+            <a:lstStyle/>
+            <a:p/>
+          </p:txBody>
+        </p:sp>
+        <p:sp>
+          <p:nvSpPr>
+            <p:cNvPr id="25" name="pl25"/>
+            <p:cNvSpPr/>
+            <p:nvPr/>
+          </p:nvSpPr>
+          <p:spPr>
+            <a:xfrm>
+              <a:off x="10168096" y="3911437"/>
+              <a:ext cx="0" cy="109007"/>
+            </a:xfrm>
+            <a:custGeom>
+              <a:avLst/>
+              <a:pathLst>
+                <a:path w="0" h="109007">
+                  <a:moveTo>
+                    <a:pt x="0" y="109007"/>
+                  </a:moveTo>
+                  <a:lnTo>
+                    <a:pt x="0" y="0"/>
+                  </a:lnTo>
+                </a:path>
+              </a:pathLst>
+            </a:custGeom>
+            <a:ln w="13550" cap="flat">
+              <a:solidFill>
+                <a:srgbClr val="0072BC">
+                  <a:alpha val="100000"/>
+                </a:srgbClr>
+              </a:solidFill>
+              <a:prstDash val="solid"/>
+              <a:round/>
+            </a:ln>
+          </p:spPr>
+          <p:txBody>
+            <a:bodyPr/>
+            <a:lstStyle/>
+            <a:p/>
+          </p:txBody>
+        </p:sp>
+        <p:sp>
+          <p:nvSpPr>
+            <p:cNvPr id="26" name="pl26"/>
+            <p:cNvSpPr/>
+            <p:nvPr/>
+          </p:nvSpPr>
+          <p:spPr>
+            <a:xfrm>
+              <a:off x="5949311" y="3366401"/>
               <a:ext cx="0" cy="109007"/>
             </a:xfrm>
             <a:custGeom>
@@ -3749,21 +4109,21 @@
         </p:sp>
         <p:sp>
           <p:nvSpPr>
-            <p:cNvPr id="18" name="pl18"/>
-            <p:cNvSpPr/>
-            <p:nvPr/>
-          </p:nvSpPr>
-          <p:spPr>
-            <a:xfrm>
-              <a:off x="5674360" y="3420905"/>
-              <a:ext cx="363186" cy="0"/>
+            <p:cNvPr id="27" name="pl27"/>
+            <p:cNvSpPr/>
+            <p:nvPr/>
+          </p:nvSpPr>
+          <p:spPr>
+            <a:xfrm>
+              <a:off x="5765544" y="3420905"/>
+              <a:ext cx="183766" cy="0"/>
             </a:xfrm>
             <a:custGeom>
               <a:avLst/>
               <a:pathLst>
-                <a:path w="363186" h="0">
+                <a:path w="183766" h="0">
                   <a:moveTo>
-                    <a:pt x="363186" y="0"/>
+                    <a:pt x="183766" y="0"/>
                   </a:moveTo>
                   <a:lnTo>
                     <a:pt x="0" y="0"/>
@@ -3789,13 +4149,13 @@
         </p:sp>
         <p:sp>
           <p:nvSpPr>
-            <p:cNvPr id="19" name="pl19"/>
-            <p:cNvSpPr/>
-            <p:nvPr/>
-          </p:nvSpPr>
-          <p:spPr>
-            <a:xfrm>
-              <a:off x="5674360" y="3366401"/>
+            <p:cNvPr id="28" name="pl28"/>
+            <p:cNvSpPr/>
+            <p:nvPr/>
+          </p:nvSpPr>
+          <p:spPr>
+            <a:xfrm>
+              <a:off x="5765544" y="3366401"/>
               <a:ext cx="0" cy="109007"/>
             </a:xfrm>
             <a:custGeom>
@@ -3829,133 +4189,13 @@
         </p:sp>
         <p:sp>
           <p:nvSpPr>
-            <p:cNvPr id="20" name="pl20"/>
-            <p:cNvSpPr/>
-            <p:nvPr/>
-          </p:nvSpPr>
-          <p:spPr>
-            <a:xfrm>
-              <a:off x="6866841" y="3366401"/>
-              <a:ext cx="0" cy="109007"/>
-            </a:xfrm>
-            <a:custGeom>
-              <a:avLst/>
-              <a:pathLst>
-                <a:path w="0" h="109007">
-                  <a:moveTo>
-                    <a:pt x="0" y="109007"/>
-                  </a:moveTo>
-                  <a:lnTo>
-                    <a:pt x="0" y="0"/>
-                  </a:lnTo>
-                </a:path>
-              </a:pathLst>
-            </a:custGeom>
-            <a:ln w="13550" cap="flat">
-              <a:solidFill>
-                <a:srgbClr val="0072BC">
-                  <a:alpha val="100000"/>
-                </a:srgbClr>
-              </a:solidFill>
-              <a:prstDash val="solid"/>
-              <a:round/>
-            </a:ln>
-          </p:spPr>
-          <p:txBody>
-            <a:bodyPr/>
-            <a:lstStyle/>
-            <a:p/>
-          </p:txBody>
-        </p:sp>
-        <p:sp>
-          <p:nvSpPr>
-            <p:cNvPr id="21" name="pl21"/>
-            <p:cNvSpPr/>
-            <p:nvPr/>
-          </p:nvSpPr>
-          <p:spPr>
-            <a:xfrm>
-              <a:off x="6077198" y="3420905"/>
-              <a:ext cx="789643" cy="0"/>
-            </a:xfrm>
-            <a:custGeom>
-              <a:avLst/>
-              <a:pathLst>
-                <a:path w="789643" h="0">
-                  <a:moveTo>
-                    <a:pt x="789643" y="0"/>
-                  </a:moveTo>
-                  <a:lnTo>
-                    <a:pt x="0" y="0"/>
-                  </a:lnTo>
-                </a:path>
-              </a:pathLst>
-            </a:custGeom>
-            <a:ln w="13550" cap="flat">
-              <a:solidFill>
-                <a:srgbClr val="0072BC">
-                  <a:alpha val="100000"/>
-                </a:srgbClr>
-              </a:solidFill>
-              <a:prstDash val="solid"/>
-              <a:round/>
-            </a:ln>
-          </p:spPr>
-          <p:txBody>
-            <a:bodyPr/>
-            <a:lstStyle/>
-            <a:p/>
-          </p:txBody>
-        </p:sp>
-        <p:sp>
-          <p:nvSpPr>
-            <p:cNvPr id="22" name="pl22"/>
-            <p:cNvSpPr/>
-            <p:nvPr/>
-          </p:nvSpPr>
-          <p:spPr>
-            <a:xfrm>
-              <a:off x="6077198" y="3366401"/>
-              <a:ext cx="0" cy="109007"/>
-            </a:xfrm>
-            <a:custGeom>
-              <a:avLst/>
-              <a:pathLst>
-                <a:path w="0" h="109007">
-                  <a:moveTo>
-                    <a:pt x="0" y="109007"/>
-                  </a:moveTo>
-                  <a:lnTo>
-                    <a:pt x="0" y="0"/>
-                  </a:lnTo>
-                </a:path>
-              </a:pathLst>
-            </a:custGeom>
-            <a:ln w="13550" cap="flat">
-              <a:solidFill>
-                <a:srgbClr val="0072BC">
-                  <a:alpha val="100000"/>
-                </a:srgbClr>
-              </a:solidFill>
-              <a:prstDash val="solid"/>
-              <a:round/>
-            </a:ln>
-          </p:spPr>
-          <p:txBody>
-            <a:bodyPr/>
-            <a:lstStyle/>
-            <a:p/>
-          </p:txBody>
-        </p:sp>
-        <p:sp>
-          <p:nvSpPr>
-            <p:cNvPr id="23" name="pl23"/>
-            <p:cNvSpPr/>
-            <p:nvPr/>
-          </p:nvSpPr>
-          <p:spPr>
-            <a:xfrm>
-              <a:off x="10828229" y="3911437"/>
+            <p:cNvPr id="29" name="pl29"/>
+            <p:cNvSpPr/>
+            <p:nvPr/>
+          </p:nvSpPr>
+          <p:spPr>
+            <a:xfrm>
+              <a:off x="10389596" y="4456472"/>
               <a:ext cx="0" cy="109007"/>
             </a:xfrm>
             <a:custGeom>
@@ -3989,21 +4229,21 @@
         </p:sp>
         <p:sp>
           <p:nvSpPr>
-            <p:cNvPr id="24" name="pl24"/>
-            <p:cNvSpPr/>
-            <p:nvPr/>
-          </p:nvSpPr>
-          <p:spPr>
-            <a:xfrm>
-              <a:off x="10751041" y="3965940"/>
-              <a:ext cx="77187" cy="0"/>
+            <p:cNvPr id="30" name="pl30"/>
+            <p:cNvSpPr/>
+            <p:nvPr/>
+          </p:nvSpPr>
+          <p:spPr>
+            <a:xfrm>
+              <a:off x="10298389" y="4510975"/>
+              <a:ext cx="91207" cy="0"/>
             </a:xfrm>
             <a:custGeom>
               <a:avLst/>
               <a:pathLst>
-                <a:path w="77187" h="0">
+                <a:path w="91207" h="0">
                   <a:moveTo>
-                    <a:pt x="77187" y="0"/>
+                    <a:pt x="91207" y="0"/>
                   </a:moveTo>
                   <a:lnTo>
                     <a:pt x="0" y="0"/>
@@ -4029,13 +4269,13 @@
         </p:sp>
         <p:sp>
           <p:nvSpPr>
-            <p:cNvPr id="25" name="pl25"/>
-            <p:cNvSpPr/>
-            <p:nvPr/>
-          </p:nvSpPr>
-          <p:spPr>
-            <a:xfrm>
-              <a:off x="10751041" y="3911437"/>
+            <p:cNvPr id="31" name="pl31"/>
+            <p:cNvSpPr/>
+            <p:nvPr/>
+          </p:nvSpPr>
+          <p:spPr>
+            <a:xfrm>
+              <a:off x="10298389" y="4456472"/>
               <a:ext cx="0" cy="109007"/>
             </a:xfrm>
             <a:custGeom>
@@ -4069,133 +4309,13 @@
         </p:sp>
         <p:sp>
           <p:nvSpPr>
-            <p:cNvPr id="26" name="pl26"/>
-            <p:cNvSpPr/>
-            <p:nvPr/>
-          </p:nvSpPr>
-          <p:spPr>
-            <a:xfrm>
-              <a:off x="10523556" y="3911437"/>
-              <a:ext cx="0" cy="109007"/>
-            </a:xfrm>
-            <a:custGeom>
-              <a:avLst/>
-              <a:pathLst>
-                <a:path w="0" h="109007">
-                  <a:moveTo>
-                    <a:pt x="0" y="109007"/>
-                  </a:moveTo>
-                  <a:lnTo>
-                    <a:pt x="0" y="0"/>
-                  </a:lnTo>
-                </a:path>
-              </a:pathLst>
-            </a:custGeom>
-            <a:ln w="13550" cap="flat">
-              <a:solidFill>
-                <a:srgbClr val="0072BC">
-                  <a:alpha val="100000"/>
-                </a:srgbClr>
-              </a:solidFill>
-              <a:prstDash val="solid"/>
-              <a:round/>
-            </a:ln>
-          </p:spPr>
-          <p:txBody>
-            <a:bodyPr/>
-            <a:lstStyle/>
-            <a:p/>
-          </p:txBody>
-        </p:sp>
-        <p:sp>
-          <p:nvSpPr>
-            <p:cNvPr id="27" name="pl27"/>
-            <p:cNvSpPr/>
-            <p:nvPr/>
-          </p:nvSpPr>
-          <p:spPr>
-            <a:xfrm>
-              <a:off x="10260215" y="3965940"/>
-              <a:ext cx="263340" cy="0"/>
-            </a:xfrm>
-            <a:custGeom>
-              <a:avLst/>
-              <a:pathLst>
-                <a:path w="263340" h="0">
-                  <a:moveTo>
-                    <a:pt x="263340" y="0"/>
-                  </a:moveTo>
-                  <a:lnTo>
-                    <a:pt x="0" y="0"/>
-                  </a:lnTo>
-                </a:path>
-              </a:pathLst>
-            </a:custGeom>
-            <a:ln w="13550" cap="flat">
-              <a:solidFill>
-                <a:srgbClr val="0072BC">
-                  <a:alpha val="100000"/>
-                </a:srgbClr>
-              </a:solidFill>
-              <a:prstDash val="solid"/>
-              <a:round/>
-            </a:ln>
-          </p:spPr>
-          <p:txBody>
-            <a:bodyPr/>
-            <a:lstStyle/>
-            <a:p/>
-          </p:txBody>
-        </p:sp>
-        <p:sp>
-          <p:nvSpPr>
-            <p:cNvPr id="28" name="pl28"/>
-            <p:cNvSpPr/>
-            <p:nvPr/>
-          </p:nvSpPr>
-          <p:spPr>
-            <a:xfrm>
-              <a:off x="10260215" y="3911437"/>
-              <a:ext cx="0" cy="109007"/>
-            </a:xfrm>
-            <a:custGeom>
-              <a:avLst/>
-              <a:pathLst>
-                <a:path w="0" h="109007">
-                  <a:moveTo>
-                    <a:pt x="0" y="109007"/>
-                  </a:moveTo>
-                  <a:lnTo>
-                    <a:pt x="0" y="0"/>
-                  </a:lnTo>
-                </a:path>
-              </a:pathLst>
-            </a:custGeom>
-            <a:ln w="13550" cap="flat">
-              <a:solidFill>
-                <a:srgbClr val="0072BC">
-                  <a:alpha val="100000"/>
-                </a:srgbClr>
-              </a:solidFill>
-              <a:prstDash val="solid"/>
-              <a:round/>
-            </a:ln>
-          </p:spPr>
-          <p:txBody>
-            <a:bodyPr/>
-            <a:lstStyle/>
-            <a:p/>
-          </p:txBody>
-        </p:sp>
-        <p:sp>
-          <p:nvSpPr>
-            <p:cNvPr id="29" name="pl29"/>
-            <p:cNvSpPr/>
-            <p:nvPr/>
-          </p:nvSpPr>
-          <p:spPr>
-            <a:xfrm>
-              <a:off x="10371052" y="4456472"/>
+            <p:cNvPr id="32" name="pl32"/>
+            <p:cNvSpPr/>
+            <p:nvPr/>
+          </p:nvSpPr>
+          <p:spPr>
+            <a:xfrm>
+              <a:off x="10859197" y="3911437"/>
               <a:ext cx="0" cy="109007"/>
             </a:xfrm>
             <a:custGeom>
@@ -4229,21 +4349,21 @@
         </p:sp>
         <p:sp>
           <p:nvSpPr>
-            <p:cNvPr id="30" name="pl30"/>
-            <p:cNvSpPr/>
-            <p:nvPr/>
-          </p:nvSpPr>
-          <p:spPr>
-            <a:xfrm>
-              <a:off x="10316933" y="4510975"/>
-              <a:ext cx="54119" cy="0"/>
+            <p:cNvPr id="33" name="pl33"/>
+            <p:cNvSpPr/>
+            <p:nvPr/>
+          </p:nvSpPr>
+          <p:spPr>
+            <a:xfrm>
+              <a:off x="10720073" y="3965940"/>
+              <a:ext cx="139124" cy="0"/>
             </a:xfrm>
             <a:custGeom>
               <a:avLst/>
               <a:pathLst>
-                <a:path w="54119" h="0">
+                <a:path w="139124" h="0">
                   <a:moveTo>
-                    <a:pt x="54119" y="0"/>
+                    <a:pt x="139124" y="0"/>
                   </a:moveTo>
                   <a:lnTo>
                     <a:pt x="0" y="0"/>
@@ -4269,13 +4389,13 @@
         </p:sp>
         <p:sp>
           <p:nvSpPr>
-            <p:cNvPr id="31" name="pl31"/>
-            <p:cNvSpPr/>
-            <p:nvPr/>
-          </p:nvSpPr>
-          <p:spPr>
-            <a:xfrm>
-              <a:off x="10316933" y="4456472"/>
+            <p:cNvPr id="34" name="pl34"/>
+            <p:cNvSpPr/>
+            <p:nvPr/>
+          </p:nvSpPr>
+          <p:spPr>
+            <a:xfrm>
+              <a:off x="10720073" y="3911437"/>
               <a:ext cx="0" cy="109007"/>
             </a:xfrm>
             <a:custGeom>
@@ -4309,133 +4429,151 @@
         </p:sp>
         <p:sp>
           <p:nvSpPr>
-            <p:cNvPr id="32" name="pl32"/>
-            <p:cNvSpPr/>
-            <p:nvPr/>
-          </p:nvSpPr>
-          <p:spPr>
-            <a:xfrm>
-              <a:off x="8698203" y="4456472"/>
-              <a:ext cx="0" cy="109007"/>
-            </a:xfrm>
-            <a:custGeom>
-              <a:avLst/>
-              <a:pathLst>
-                <a:path w="0" h="109007">
-                  <a:moveTo>
-                    <a:pt x="0" y="109007"/>
-                  </a:moveTo>
-                  <a:lnTo>
-                    <a:pt x="0" y="0"/>
-                  </a:lnTo>
-                </a:path>
-              </a:pathLst>
-            </a:custGeom>
-            <a:ln w="13550" cap="flat">
-              <a:solidFill>
-                <a:srgbClr val="0072BC">
-                  <a:alpha val="100000"/>
-                </a:srgbClr>
-              </a:solidFill>
-              <a:prstDash val="solid"/>
-              <a:round/>
-            </a:ln>
-          </p:spPr>
-          <p:txBody>
-            <a:bodyPr/>
-            <a:lstStyle/>
-            <a:p/>
-          </p:txBody>
-        </p:sp>
-        <p:sp>
-          <p:nvSpPr>
-            <p:cNvPr id="33" name="pl33"/>
-            <p:cNvSpPr/>
-            <p:nvPr/>
-          </p:nvSpPr>
-          <p:spPr>
-            <a:xfrm>
-              <a:off x="8358843" y="4510975"/>
-              <a:ext cx="339360" cy="0"/>
-            </a:xfrm>
-            <a:custGeom>
-              <a:avLst/>
-              <a:pathLst>
-                <a:path w="339360" h="0">
-                  <a:moveTo>
-                    <a:pt x="339360" y="0"/>
-                  </a:moveTo>
-                  <a:lnTo>
-                    <a:pt x="0" y="0"/>
-                  </a:lnTo>
-                </a:path>
-              </a:pathLst>
-            </a:custGeom>
-            <a:ln w="13550" cap="flat">
-              <a:solidFill>
-                <a:srgbClr val="0072BC">
-                  <a:alpha val="100000"/>
-                </a:srgbClr>
-              </a:solidFill>
-              <a:prstDash val="solid"/>
-              <a:round/>
-            </a:ln>
-          </p:spPr>
-          <p:txBody>
-            <a:bodyPr/>
-            <a:lstStyle/>
-            <a:p/>
-          </p:txBody>
-        </p:sp>
-        <p:sp>
-          <p:nvSpPr>
-            <p:cNvPr id="34" name="pl34"/>
-            <p:cNvSpPr/>
-            <p:nvPr/>
-          </p:nvSpPr>
-          <p:spPr>
-            <a:xfrm>
-              <a:off x="8358843" y="4456472"/>
-              <a:ext cx="0" cy="109007"/>
-            </a:xfrm>
-            <a:custGeom>
-              <a:avLst/>
-              <a:pathLst>
-                <a:path w="0" h="109007">
-                  <a:moveTo>
-                    <a:pt x="0" y="109007"/>
-                  </a:moveTo>
-                  <a:lnTo>
-                    <a:pt x="0" y="0"/>
-                  </a:lnTo>
-                </a:path>
-              </a:pathLst>
-            </a:custGeom>
-            <a:ln w="13550" cap="flat">
-              <a:solidFill>
-                <a:srgbClr val="0072BC">
-                  <a:alpha val="100000"/>
-                </a:srgbClr>
-              </a:solidFill>
-              <a:prstDash val="solid"/>
-              <a:round/>
-            </a:ln>
-          </p:spPr>
-          <p:txBody>
-            <a:bodyPr/>
-            <a:lstStyle/>
-            <a:p/>
-          </p:txBody>
-        </p:sp>
-        <p:sp>
-          <p:nvSpPr>
             <p:cNvPr id="35" name="tx35"/>
             <p:cNvSpPr/>
             <p:nvPr/>
           </p:nvSpPr>
           <p:spPr>
             <a:xfrm>
-              <a:off x="5657183" y="3515857"/>
+              <a:off x="6307665" y="3189685"/>
+              <a:ext cx="397540" cy="105768"/>
+            </a:xfrm>
+            <a:prstGeom prst="rect">
+              <a:avLst/>
+            </a:prstGeom>
+            <a:noFill/>
+          </p:spPr>
+          <p:txBody>
+            <a:bodyPr lIns="0" rIns="0" tIns="0" bIns="0" anchorCtr="1" anchor="ctr" wrap="none"/>
+            <a:lstStyle/>
+            <a:p>
+              <a:pPr algn="l" marL="0" marR="0" indent="0">
+                <a:lnSpc>
+                  <a:spcPts val="1103"/>
+                </a:lnSpc>
+                <a:spcBef>
+                  <a:spcPts val="0"/>
+                </a:spcBef>
+                <a:spcAft>
+                  <a:spcPts val="0"/>
+                </a:spcAft>
+              </a:pPr>
+              <a:r>
+                <a:rPr sz="1103">
+                  <a:solidFill>
+                    <a:srgbClr val="0072BC">
+                      <a:alpha val="100000"/>
+                    </a:srgbClr>
+                  </a:solidFill>
+                  <a:latin typeface="Arial"/>
+                  <a:cs typeface="Arial"/>
+                </a:rPr>
+                <a:t>34.5%</a:t>
+              </a:r>
+            </a:p>
+          </p:txBody>
+        </p:sp>
+        <p:sp>
+          <p:nvSpPr>
+            <p:cNvPr id="36" name="tx36"/>
+            <p:cNvSpPr/>
+            <p:nvPr/>
+          </p:nvSpPr>
+          <p:spPr>
+            <a:xfrm>
+              <a:off x="8329753" y="4279755"/>
+              <a:ext cx="397540" cy="105768"/>
+            </a:xfrm>
+            <a:prstGeom prst="rect">
+              <a:avLst/>
+            </a:prstGeom>
+            <a:noFill/>
+          </p:spPr>
+          <p:txBody>
+            <a:bodyPr lIns="0" rIns="0" tIns="0" bIns="0" anchorCtr="1" anchor="ctr" wrap="none"/>
+            <a:lstStyle/>
+            <a:p>
+              <a:pPr algn="l" marL="0" marR="0" indent="0">
+                <a:lnSpc>
+                  <a:spcPts val="1103"/>
+                </a:lnSpc>
+                <a:spcBef>
+                  <a:spcPts val="0"/>
+                </a:spcBef>
+                <a:spcAft>
+                  <a:spcPts val="0"/>
+                </a:spcAft>
+              </a:pPr>
+              <a:r>
+                <a:rPr sz="1103">
+                  <a:solidFill>
+                    <a:srgbClr val="0072BC">
+                      <a:alpha val="100000"/>
+                    </a:srgbClr>
+                  </a:solidFill>
+                  <a:latin typeface="Arial"/>
+                  <a:cs typeface="Arial"/>
+                </a:rPr>
+                <a:t>61.6%</a:t>
+              </a:r>
+            </a:p>
+          </p:txBody>
+        </p:sp>
+        <p:sp>
+          <p:nvSpPr>
+            <p:cNvPr id="37" name="tx37"/>
+            <p:cNvSpPr/>
+            <p:nvPr/>
+          </p:nvSpPr>
+          <p:spPr>
+            <a:xfrm>
+              <a:off x="10193115" y="3734720"/>
+              <a:ext cx="397540" cy="105768"/>
+            </a:xfrm>
+            <a:prstGeom prst="rect">
+              <a:avLst/>
+            </a:prstGeom>
+            <a:noFill/>
+          </p:spPr>
+          <p:txBody>
+            <a:bodyPr lIns="0" rIns="0" tIns="0" bIns="0" anchorCtr="1" anchor="ctr" wrap="none"/>
+            <a:lstStyle/>
+            <a:p>
+              <a:pPr algn="l" marL="0" marR="0" indent="0">
+                <a:lnSpc>
+                  <a:spcPts val="1103"/>
+                </a:lnSpc>
+                <a:spcBef>
+                  <a:spcPts val="0"/>
+                </a:spcBef>
+                <a:spcAft>
+                  <a:spcPts val="0"/>
+                </a:spcAft>
+              </a:pPr>
+              <a:r>
+                <a:rPr sz="1103">
+                  <a:solidFill>
+                    <a:srgbClr val="0072BC">
+                      <a:alpha val="100000"/>
+                    </a:srgbClr>
+                  </a:solidFill>
+                  <a:latin typeface="Arial"/>
+                  <a:cs typeface="Arial"/>
+                </a:rPr>
+                <a:t>86.5%</a:t>
+              </a:r>
+            </a:p>
+          </p:txBody>
+        </p:sp>
+        <p:sp>
+          <p:nvSpPr>
+            <p:cNvPr id="38" name="tx38"/>
+            <p:cNvSpPr/>
+            <p:nvPr/>
+          </p:nvSpPr>
+          <p:spPr>
+            <a:xfrm>
+              <a:off x="5658657" y="3515857"/>
               <a:ext cx="397540" cy="105768"/>
             </a:xfrm>
             <a:prstGeom prst="rect">
@@ -4475,13 +4613,13 @@
         </p:sp>
         <p:sp>
           <p:nvSpPr>
-            <p:cNvPr id="36" name="tx36"/>
-            <p:cNvSpPr/>
-            <p:nvPr/>
-          </p:nvSpPr>
-          <p:spPr>
-            <a:xfrm>
-              <a:off x="6273249" y="3189685"/>
+            <p:cNvPr id="39" name="tx39"/>
+            <p:cNvSpPr/>
+            <p:nvPr/>
+          </p:nvSpPr>
+          <p:spPr>
+            <a:xfrm>
+              <a:off x="10145222" y="4605928"/>
               <a:ext cx="397540" cy="105768"/>
             </a:xfrm>
             <a:prstGeom prst="rect">
@@ -4507,21 +4645,21 @@
               <a:r>
                 <a:rPr sz="1103">
                   <a:solidFill>
-                    <a:srgbClr val="0072BC">
+                    <a:srgbClr val="666666">
                       <a:alpha val="100000"/>
                     </a:srgbClr>
                   </a:solidFill>
                   <a:latin typeface="Arial"/>
                   <a:cs typeface="Arial"/>
                 </a:rPr>
-                <a:t>34.0%</a:t>
+                <a:t>85.9%</a:t>
               </a:r>
             </a:p>
           </p:txBody>
         </p:sp>
         <p:sp>
           <p:nvSpPr>
-            <p:cNvPr id="37" name="tx37"/>
+            <p:cNvPr id="40" name="tx40"/>
             <p:cNvSpPr/>
             <p:nvPr/>
           </p:nvSpPr>
@@ -4567,144 +4705,6 @@
         </p:sp>
         <p:sp>
           <p:nvSpPr>
-            <p:cNvPr id="38" name="tx38"/>
-            <p:cNvSpPr/>
-            <p:nvPr/>
-          </p:nvSpPr>
-          <p:spPr>
-            <a:xfrm>
-              <a:off x="10193115" y="3734720"/>
-              <a:ext cx="397540" cy="105768"/>
-            </a:xfrm>
-            <a:prstGeom prst="rect">
-              <a:avLst/>
-            </a:prstGeom>
-            <a:noFill/>
-          </p:spPr>
-          <p:txBody>
-            <a:bodyPr lIns="0" rIns="0" tIns="0" bIns="0" anchorCtr="1" anchor="ctr" wrap="none"/>
-            <a:lstStyle/>
-            <a:p>
-              <a:pPr algn="l" marL="0" marR="0" indent="0">
-                <a:lnSpc>
-                  <a:spcPts val="1103"/>
-                </a:lnSpc>
-                <a:spcBef>
-                  <a:spcPts val="0"/>
-                </a:spcBef>
-                <a:spcAft>
-                  <a:spcPts val="0"/>
-                </a:spcAft>
-              </a:pPr>
-              <a:r>
-                <a:rPr sz="1103">
-                  <a:solidFill>
-                    <a:srgbClr val="0072BC">
-                      <a:alpha val="100000"/>
-                    </a:srgbClr>
-                  </a:solidFill>
-                  <a:latin typeface="Arial"/>
-                  <a:cs typeface="Arial"/>
-                </a:rPr>
-                <a:t>86.5%</a:t>
-              </a:r>
-            </a:p>
-          </p:txBody>
-        </p:sp>
-        <p:sp>
-          <p:nvSpPr>
-            <p:cNvPr id="39" name="tx39"/>
-            <p:cNvSpPr/>
-            <p:nvPr/>
-          </p:nvSpPr>
-          <p:spPr>
-            <a:xfrm>
-              <a:off x="10145222" y="4605928"/>
-              <a:ext cx="397540" cy="105768"/>
-            </a:xfrm>
-            <a:prstGeom prst="rect">
-              <a:avLst/>
-            </a:prstGeom>
-            <a:noFill/>
-          </p:spPr>
-          <p:txBody>
-            <a:bodyPr lIns="0" rIns="0" tIns="0" bIns="0" anchorCtr="1" anchor="ctr" wrap="none"/>
-            <a:lstStyle/>
-            <a:p>
-              <a:pPr algn="l" marL="0" marR="0" indent="0">
-                <a:lnSpc>
-                  <a:spcPts val="1103"/>
-                </a:lnSpc>
-                <a:spcBef>
-                  <a:spcPts val="0"/>
-                </a:spcBef>
-                <a:spcAft>
-                  <a:spcPts val="0"/>
-                </a:spcAft>
-              </a:pPr>
-              <a:r>
-                <a:rPr sz="1103">
-                  <a:solidFill>
-                    <a:srgbClr val="666666">
-                      <a:alpha val="100000"/>
-                    </a:srgbClr>
-                  </a:solidFill>
-                  <a:latin typeface="Arial"/>
-                  <a:cs typeface="Arial"/>
-                </a:rPr>
-                <a:t>85.9%</a:t>
-              </a:r>
-            </a:p>
-          </p:txBody>
-        </p:sp>
-        <p:sp>
-          <p:nvSpPr>
-            <p:cNvPr id="40" name="tx40"/>
-            <p:cNvSpPr/>
-            <p:nvPr/>
-          </p:nvSpPr>
-          <p:spPr>
-            <a:xfrm>
-              <a:off x="8329753" y="4279755"/>
-              <a:ext cx="397540" cy="105768"/>
-            </a:xfrm>
-            <a:prstGeom prst="rect">
-              <a:avLst/>
-            </a:prstGeom>
-            <a:noFill/>
-          </p:spPr>
-          <p:txBody>
-            <a:bodyPr lIns="0" rIns="0" tIns="0" bIns="0" anchorCtr="1" anchor="ctr" wrap="none"/>
-            <a:lstStyle/>
-            <a:p>
-              <a:pPr algn="l" marL="0" marR="0" indent="0">
-                <a:lnSpc>
-                  <a:spcPts val="1103"/>
-                </a:lnSpc>
-                <a:spcBef>
-                  <a:spcPts val="0"/>
-                </a:spcBef>
-                <a:spcAft>
-                  <a:spcPts val="0"/>
-                </a:spcAft>
-              </a:pPr>
-              <a:r>
-                <a:rPr sz="1103">
-                  <a:solidFill>
-                    <a:srgbClr val="0072BC">
-                      <a:alpha val="100000"/>
-                    </a:srgbClr>
-                  </a:solidFill>
-                  <a:latin typeface="Arial"/>
-                  <a:cs typeface="Arial"/>
-                </a:rPr>
-                <a:t>61.6%</a:t>
-              </a:r>
-            </a:p>
-          </p:txBody>
-        </p:sp>
-        <p:sp>
-          <p:nvSpPr>
             <p:cNvPr id="41" name="tx41"/>
             <p:cNvSpPr/>
             <p:nvPr/>
@@ -4895,8 +4895,8 @@
           </p:nvSpPr>
           <p:spPr>
             <a:xfrm>
-              <a:off x="1303843" y="4083415"/>
-              <a:ext cx="2164333" cy="126068"/>
+              <a:off x="1343806" y="4083415"/>
+              <a:ext cx="2124371" cy="126068"/>
             </a:xfrm>
             <a:prstGeom prst="rect">
               <a:avLst/>
@@ -4928,7 +4928,7 @@
                   <a:latin typeface="Lato"/>
                   <a:cs typeface="Lato"/>
                 </a:rPr>
-                <a:t>with access to basic facilities.</a:t>
+                <a:t>with access to basic facilities</a:t>
               </a:r>
             </a:p>
           </p:txBody>
@@ -6093,7 +6093,77 @@
           </p:nvSpPr>
           <p:spPr>
             <a:xfrm>
-              <a:off x="9602104" y="3544725"/>
+              <a:off x="10071409" y="3544725"/>
+              <a:ext cx="49651" cy="49651"/>
+            </a:xfrm>
+            <a:prstGeom prst="ellipse">
+              <a:avLst/>
+            </a:prstGeom>
+            <a:solidFill>
+              <a:srgbClr val="0072BC">
+                <a:alpha val="100000"/>
+              </a:srgbClr>
+            </a:solidFill>
+            <a:ln w="9000" cap="rnd">
+              <a:solidFill>
+                <a:srgbClr val="0072BC">
+                  <a:alpha val="100000"/>
+                </a:srgbClr>
+              </a:solidFill>
+              <a:prstDash val="solid"/>
+              <a:round/>
+            </a:ln>
+          </p:spPr>
+          <p:txBody>
+            <a:bodyPr/>
+            <a:lstStyle/>
+            <a:p/>
+          </p:txBody>
+        </p:sp>
+        <p:sp>
+          <p:nvSpPr>
+            <p:cNvPr id="11" name="pt11"/>
+            <p:cNvSpPr/>
+            <p:nvPr/>
+          </p:nvSpPr>
+          <p:spPr>
+            <a:xfrm>
+              <a:off x="8808856" y="4337503"/>
+              <a:ext cx="49651" cy="49651"/>
+            </a:xfrm>
+            <a:prstGeom prst="ellipse">
+              <a:avLst/>
+            </a:prstGeom>
+            <a:solidFill>
+              <a:srgbClr val="0072BC">
+                <a:alpha val="100000"/>
+              </a:srgbClr>
+            </a:solidFill>
+            <a:ln w="9000" cap="rnd">
+              <a:solidFill>
+                <a:srgbClr val="0072BC">
+                  <a:alpha val="100000"/>
+                </a:srgbClr>
+              </a:solidFill>
+              <a:prstDash val="solid"/>
+              <a:round/>
+            </a:ln>
+          </p:spPr>
+          <p:txBody>
+            <a:bodyPr/>
+            <a:lstStyle/>
+            <a:p/>
+          </p:txBody>
+        </p:sp>
+        <p:sp>
+          <p:nvSpPr>
+            <p:cNvPr id="12" name="pt12"/>
+            <p:cNvSpPr/>
+            <p:nvPr/>
+          </p:nvSpPr>
+          <p:spPr>
+            <a:xfrm>
+              <a:off x="10802245" y="3544725"/>
               <a:ext cx="49651" cy="49651"/>
             </a:xfrm>
             <a:prstGeom prst="ellipse">
@@ -6122,48 +6192,13 @@
         </p:sp>
         <p:sp>
           <p:nvSpPr>
-            <p:cNvPr id="11" name="pt11"/>
-            <p:cNvSpPr/>
-            <p:nvPr/>
-          </p:nvSpPr>
-          <p:spPr>
-            <a:xfrm>
-              <a:off x="8935982" y="3544725"/>
-              <a:ext cx="49651" cy="49651"/>
-            </a:xfrm>
-            <a:prstGeom prst="ellipse">
-              <a:avLst/>
-            </a:prstGeom>
-            <a:solidFill>
-              <a:srgbClr val="0072BC">
-                <a:alpha val="100000"/>
-              </a:srgbClr>
-            </a:solidFill>
-            <a:ln w="9000" cap="rnd">
-              <a:solidFill>
-                <a:srgbClr val="0072BC">
-                  <a:alpha val="100000"/>
-                </a:srgbClr>
-              </a:solidFill>
-              <a:prstDash val="solid"/>
-              <a:round/>
-            </a:ln>
-          </p:spPr>
-          <p:txBody>
-            <a:bodyPr/>
-            <a:lstStyle/>
-            <a:p/>
-          </p:txBody>
-        </p:sp>
-        <p:sp>
-          <p:nvSpPr>
-            <p:cNvPr id="12" name="pt12"/>
-            <p:cNvSpPr/>
-            <p:nvPr/>
-          </p:nvSpPr>
-          <p:spPr>
-            <a:xfrm>
-              <a:off x="8858099" y="4337503"/>
+            <p:cNvPr id="13" name="pt13"/>
+            <p:cNvSpPr/>
+            <p:nvPr/>
+          </p:nvSpPr>
+          <p:spPr>
+            <a:xfrm>
+              <a:off x="9862406" y="4337503"/>
               <a:ext cx="49651" cy="49651"/>
             </a:xfrm>
             <a:prstGeom prst="ellipse">
@@ -6192,24 +6227,29 @@
         </p:sp>
         <p:sp>
           <p:nvSpPr>
-            <p:cNvPr id="13" name="pt13"/>
-            <p:cNvSpPr/>
-            <p:nvPr/>
-          </p:nvSpPr>
-          <p:spPr>
-            <a:xfrm>
-              <a:off x="8042348" y="4337503"/>
-              <a:ext cx="49651" cy="49651"/>
-            </a:xfrm>
-            <a:prstGeom prst="ellipse">
-              <a:avLst/>
-            </a:prstGeom>
-            <a:solidFill>
-              <a:srgbClr val="0072BC">
-                <a:alpha val="100000"/>
-              </a:srgbClr>
-            </a:solidFill>
-            <a:ln w="9000" cap="rnd">
+            <p:cNvPr id="14" name="pl14"/>
+            <p:cNvSpPr/>
+            <p:nvPr/>
+          </p:nvSpPr>
+          <p:spPr>
+            <a:xfrm>
+              <a:off x="10856246" y="3490273"/>
+              <a:ext cx="0" cy="158555"/>
+            </a:xfrm>
+            <a:custGeom>
+              <a:avLst/>
+              <a:pathLst>
+                <a:path w="0" h="158555">
+                  <a:moveTo>
+                    <a:pt x="0" y="158555"/>
+                  </a:moveTo>
+                  <a:lnTo>
+                    <a:pt x="0" y="0"/>
+                  </a:lnTo>
+                </a:path>
+              </a:pathLst>
+            </a:custGeom>
+            <a:ln w="13550" cap="flat">
               <a:solidFill>
                 <a:srgbClr val="0072BC">
                   <a:alpha val="100000"/>
@@ -6227,13 +6267,213 @@
         </p:sp>
         <p:sp>
           <p:nvSpPr>
-            <p:cNvPr id="14" name="pl14"/>
-            <p:cNvSpPr/>
-            <p:nvPr/>
-          </p:nvSpPr>
-          <p:spPr>
-            <a:xfrm>
-              <a:off x="9708028" y="3490273"/>
+            <p:cNvPr id="15" name="pl15"/>
+            <p:cNvSpPr/>
+            <p:nvPr/>
+          </p:nvSpPr>
+          <p:spPr>
+            <a:xfrm>
+              <a:off x="9336223" y="3569551"/>
+              <a:ext cx="1520023" cy="0"/>
+            </a:xfrm>
+            <a:custGeom>
+              <a:avLst/>
+              <a:pathLst>
+                <a:path w="1520023" h="0">
+                  <a:moveTo>
+                    <a:pt x="1520023" y="0"/>
+                  </a:moveTo>
+                  <a:lnTo>
+                    <a:pt x="0" y="0"/>
+                  </a:lnTo>
+                </a:path>
+              </a:pathLst>
+            </a:custGeom>
+            <a:ln w="13550" cap="flat">
+              <a:solidFill>
+                <a:srgbClr val="0072BC">
+                  <a:alpha val="100000"/>
+                </a:srgbClr>
+              </a:solidFill>
+              <a:prstDash val="solid"/>
+              <a:round/>
+            </a:ln>
+          </p:spPr>
+          <p:txBody>
+            <a:bodyPr/>
+            <a:lstStyle/>
+            <a:p/>
+          </p:txBody>
+        </p:sp>
+        <p:sp>
+          <p:nvSpPr>
+            <p:cNvPr id="16" name="pl16"/>
+            <p:cNvSpPr/>
+            <p:nvPr/>
+          </p:nvSpPr>
+          <p:spPr>
+            <a:xfrm>
+              <a:off x="9336223" y="3490273"/>
+              <a:ext cx="0" cy="158555"/>
+            </a:xfrm>
+            <a:custGeom>
+              <a:avLst/>
+              <a:pathLst>
+                <a:path w="0" h="158555">
+                  <a:moveTo>
+                    <a:pt x="0" y="158555"/>
+                  </a:moveTo>
+                  <a:lnTo>
+                    <a:pt x="0" y="0"/>
+                  </a:lnTo>
+                </a:path>
+              </a:pathLst>
+            </a:custGeom>
+            <a:ln w="13550" cap="flat">
+              <a:solidFill>
+                <a:srgbClr val="0072BC">
+                  <a:alpha val="100000"/>
+                </a:srgbClr>
+              </a:solidFill>
+              <a:prstDash val="solid"/>
+              <a:round/>
+            </a:ln>
+          </p:spPr>
+          <p:txBody>
+            <a:bodyPr/>
+            <a:lstStyle/>
+            <a:p/>
+          </p:txBody>
+        </p:sp>
+        <p:sp>
+          <p:nvSpPr>
+            <p:cNvPr id="17" name="pl17"/>
+            <p:cNvSpPr/>
+            <p:nvPr/>
+          </p:nvSpPr>
+          <p:spPr>
+            <a:xfrm>
+              <a:off x="9637195" y="4283052"/>
+              <a:ext cx="0" cy="158555"/>
+            </a:xfrm>
+            <a:custGeom>
+              <a:avLst/>
+              <a:pathLst>
+                <a:path w="0" h="158555">
+                  <a:moveTo>
+                    <a:pt x="0" y="158555"/>
+                  </a:moveTo>
+                  <a:lnTo>
+                    <a:pt x="0" y="0"/>
+                  </a:lnTo>
+                </a:path>
+              </a:pathLst>
+            </a:custGeom>
+            <a:ln w="13550" cap="flat">
+              <a:solidFill>
+                <a:srgbClr val="0072BC">
+                  <a:alpha val="100000"/>
+                </a:srgbClr>
+              </a:solidFill>
+              <a:prstDash val="solid"/>
+              <a:round/>
+            </a:ln>
+          </p:spPr>
+          <p:txBody>
+            <a:bodyPr/>
+            <a:lstStyle/>
+            <a:p/>
+          </p:txBody>
+        </p:sp>
+        <p:sp>
+          <p:nvSpPr>
+            <p:cNvPr id="18" name="pl18"/>
+            <p:cNvSpPr/>
+            <p:nvPr/>
+          </p:nvSpPr>
+          <p:spPr>
+            <a:xfrm>
+              <a:off x="8030170" y="4362329"/>
+              <a:ext cx="1607025" cy="0"/>
+            </a:xfrm>
+            <a:custGeom>
+              <a:avLst/>
+              <a:pathLst>
+                <a:path w="1607025" h="0">
+                  <a:moveTo>
+                    <a:pt x="1607025" y="0"/>
+                  </a:moveTo>
+                  <a:lnTo>
+                    <a:pt x="0" y="0"/>
+                  </a:lnTo>
+                </a:path>
+              </a:pathLst>
+            </a:custGeom>
+            <a:ln w="13550" cap="flat">
+              <a:solidFill>
+                <a:srgbClr val="0072BC">
+                  <a:alpha val="100000"/>
+                </a:srgbClr>
+              </a:solidFill>
+              <a:prstDash val="solid"/>
+              <a:round/>
+            </a:ln>
+          </p:spPr>
+          <p:txBody>
+            <a:bodyPr/>
+            <a:lstStyle/>
+            <a:p/>
+          </p:txBody>
+        </p:sp>
+        <p:sp>
+          <p:nvSpPr>
+            <p:cNvPr id="19" name="pl19"/>
+            <p:cNvSpPr/>
+            <p:nvPr/>
+          </p:nvSpPr>
+          <p:spPr>
+            <a:xfrm>
+              <a:off x="8030170" y="4283052"/>
+              <a:ext cx="0" cy="158555"/>
+            </a:xfrm>
+            <a:custGeom>
+              <a:avLst/>
+              <a:pathLst>
+                <a:path w="0" h="158555">
+                  <a:moveTo>
+                    <a:pt x="0" y="158555"/>
+                  </a:moveTo>
+                  <a:lnTo>
+                    <a:pt x="0" y="0"/>
+                  </a:lnTo>
+                </a:path>
+              </a:pathLst>
+            </a:custGeom>
+            <a:ln w="13550" cap="flat">
+              <a:solidFill>
+                <a:srgbClr val="0072BC">
+                  <a:alpha val="100000"/>
+                </a:srgbClr>
+              </a:solidFill>
+              <a:prstDash val="solid"/>
+              <a:round/>
+            </a:ln>
+          </p:spPr>
+          <p:txBody>
+            <a:bodyPr/>
+            <a:lstStyle/>
+            <a:p/>
+          </p:txBody>
+        </p:sp>
+        <p:sp>
+          <p:nvSpPr>
+            <p:cNvPr id="20" name="pl20"/>
+            <p:cNvSpPr/>
+            <p:nvPr/>
+          </p:nvSpPr>
+          <p:spPr>
+            <a:xfrm>
+              <a:off x="10904313" y="3490273"/>
               <a:ext cx="0" cy="158555"/>
             </a:xfrm>
             <a:custGeom>
@@ -6267,21 +6507,21 @@
         </p:sp>
         <p:sp>
           <p:nvSpPr>
-            <p:cNvPr id="15" name="pl15"/>
-            <p:cNvSpPr/>
-            <p:nvPr/>
-          </p:nvSpPr>
-          <p:spPr>
-            <a:xfrm>
-              <a:off x="9545832" y="3569551"/>
-              <a:ext cx="162195" cy="0"/>
+            <p:cNvPr id="21" name="pl21"/>
+            <p:cNvSpPr/>
+            <p:nvPr/>
+          </p:nvSpPr>
+          <p:spPr>
+            <a:xfrm>
+              <a:off x="10749828" y="3569551"/>
+              <a:ext cx="154484" cy="0"/>
             </a:xfrm>
             <a:custGeom>
               <a:avLst/>
               <a:pathLst>
-                <a:path w="162195" h="0">
+                <a:path w="154484" h="0">
                   <a:moveTo>
-                    <a:pt x="162195" y="0"/>
+                    <a:pt x="154484" y="0"/>
                   </a:moveTo>
                   <a:lnTo>
                     <a:pt x="0" y="0"/>
@@ -6307,13 +6547,13 @@
         </p:sp>
         <p:sp>
           <p:nvSpPr>
-            <p:cNvPr id="16" name="pl16"/>
-            <p:cNvSpPr/>
-            <p:nvPr/>
-          </p:nvSpPr>
-          <p:spPr>
-            <a:xfrm>
-              <a:off x="9545832" y="3490273"/>
+            <p:cNvPr id="22" name="pl22"/>
+            <p:cNvSpPr/>
+            <p:nvPr/>
+          </p:nvSpPr>
+          <p:spPr>
+            <a:xfrm>
+              <a:off x="10749828" y="3490273"/>
               <a:ext cx="0" cy="158555"/>
             </a:xfrm>
             <a:custGeom>
@@ -6347,133 +6587,13 @@
         </p:sp>
         <p:sp>
           <p:nvSpPr>
-            <p:cNvPr id="17" name="pl17"/>
-            <p:cNvSpPr/>
-            <p:nvPr/>
-          </p:nvSpPr>
-          <p:spPr>
-            <a:xfrm>
-              <a:off x="9635660" y="3490273"/>
-              <a:ext cx="0" cy="158555"/>
-            </a:xfrm>
-            <a:custGeom>
-              <a:avLst/>
-              <a:pathLst>
-                <a:path w="0" h="158555">
-                  <a:moveTo>
-                    <a:pt x="0" y="158555"/>
-                  </a:moveTo>
-                  <a:lnTo>
-                    <a:pt x="0" y="0"/>
-                  </a:lnTo>
-                </a:path>
-              </a:pathLst>
-            </a:custGeom>
-            <a:ln w="13550" cap="flat">
-              <a:solidFill>
-                <a:srgbClr val="0072BC">
-                  <a:alpha val="100000"/>
-                </a:srgbClr>
-              </a:solidFill>
-              <a:prstDash val="solid"/>
-              <a:round/>
-            </a:ln>
-          </p:spPr>
-          <p:txBody>
-            <a:bodyPr/>
-            <a:lstStyle/>
-            <a:p/>
-          </p:txBody>
-        </p:sp>
-        <p:sp>
-          <p:nvSpPr>
-            <p:cNvPr id="18" name="pl18"/>
-            <p:cNvSpPr/>
-            <p:nvPr/>
-          </p:nvSpPr>
-          <p:spPr>
-            <a:xfrm>
-              <a:off x="8285955" y="3569551"/>
-              <a:ext cx="1349704" cy="0"/>
-            </a:xfrm>
-            <a:custGeom>
-              <a:avLst/>
-              <a:pathLst>
-                <a:path w="1349704" h="0">
-                  <a:moveTo>
-                    <a:pt x="1349704" y="0"/>
-                  </a:moveTo>
-                  <a:lnTo>
-                    <a:pt x="0" y="0"/>
-                  </a:lnTo>
-                </a:path>
-              </a:pathLst>
-            </a:custGeom>
-            <a:ln w="13550" cap="flat">
-              <a:solidFill>
-                <a:srgbClr val="0072BC">
-                  <a:alpha val="100000"/>
-                </a:srgbClr>
-              </a:solidFill>
-              <a:prstDash val="solid"/>
-              <a:round/>
-            </a:ln>
-          </p:spPr>
-          <p:txBody>
-            <a:bodyPr/>
-            <a:lstStyle/>
-            <a:p/>
-          </p:txBody>
-        </p:sp>
-        <p:sp>
-          <p:nvSpPr>
-            <p:cNvPr id="19" name="pl19"/>
-            <p:cNvSpPr/>
-            <p:nvPr/>
-          </p:nvSpPr>
-          <p:spPr>
-            <a:xfrm>
-              <a:off x="8285955" y="3490273"/>
-              <a:ext cx="0" cy="158555"/>
-            </a:xfrm>
-            <a:custGeom>
-              <a:avLst/>
-              <a:pathLst>
-                <a:path w="0" h="158555">
-                  <a:moveTo>
-                    <a:pt x="0" y="158555"/>
-                  </a:moveTo>
-                  <a:lnTo>
-                    <a:pt x="0" y="0"/>
-                  </a:lnTo>
-                </a:path>
-              </a:pathLst>
-            </a:custGeom>
-            <a:ln w="13550" cap="flat">
-              <a:solidFill>
-                <a:srgbClr val="0072BC">
-                  <a:alpha val="100000"/>
-                </a:srgbClr>
-              </a:solidFill>
-              <a:prstDash val="solid"/>
-              <a:round/>
-            </a:ln>
-          </p:spPr>
-          <p:txBody>
-            <a:bodyPr/>
-            <a:lstStyle/>
-            <a:p/>
-          </p:txBody>
-        </p:sp>
-        <p:sp>
-          <p:nvSpPr>
-            <p:cNvPr id="20" name="pl20"/>
-            <p:cNvSpPr/>
-            <p:nvPr/>
-          </p:nvSpPr>
-          <p:spPr>
-            <a:xfrm>
-              <a:off x="8986196" y="4283052"/>
+            <p:cNvPr id="23" name="pl23"/>
+            <p:cNvSpPr/>
+            <p:nvPr/>
+          </p:nvSpPr>
+          <p:spPr>
+            <a:xfrm>
+              <a:off x="10002793" y="4283052"/>
               <a:ext cx="0" cy="158555"/>
             </a:xfrm>
             <a:custGeom>
@@ -6507,21 +6627,21 @@
         </p:sp>
         <p:sp>
           <p:nvSpPr>
-            <p:cNvPr id="21" name="pl21"/>
-            <p:cNvSpPr/>
-            <p:nvPr/>
-          </p:nvSpPr>
-          <p:spPr>
-            <a:xfrm>
-              <a:off x="8779653" y="4362329"/>
-              <a:ext cx="206543" cy="0"/>
+            <p:cNvPr id="24" name="pl24"/>
+            <p:cNvSpPr/>
+            <p:nvPr/>
+          </p:nvSpPr>
+          <p:spPr>
+            <a:xfrm>
+              <a:off x="9771670" y="4362329"/>
+              <a:ext cx="231123" cy="0"/>
             </a:xfrm>
             <a:custGeom>
               <a:avLst/>
               <a:pathLst>
-                <a:path w="206543" h="0">
+                <a:path w="231123" h="0">
                   <a:moveTo>
-                    <a:pt x="206543" y="0"/>
+                    <a:pt x="231123" y="0"/>
                   </a:moveTo>
                   <a:lnTo>
                     <a:pt x="0" y="0"/>
@@ -6547,13 +6667,13 @@
         </p:sp>
         <p:sp>
           <p:nvSpPr>
-            <p:cNvPr id="22" name="pl22"/>
-            <p:cNvSpPr/>
-            <p:nvPr/>
-          </p:nvSpPr>
-          <p:spPr>
-            <a:xfrm>
-              <a:off x="8779653" y="4283052"/>
+            <p:cNvPr id="25" name="pl25"/>
+            <p:cNvSpPr/>
+            <p:nvPr/>
+          </p:nvSpPr>
+          <p:spPr>
+            <a:xfrm>
+              <a:off x="9771670" y="4283052"/>
               <a:ext cx="0" cy="158555"/>
             </a:xfrm>
             <a:custGeom>
@@ -6587,133 +6707,105 @@
         </p:sp>
         <p:sp>
           <p:nvSpPr>
-            <p:cNvPr id="23" name="pl23"/>
-            <p:cNvSpPr/>
-            <p:nvPr/>
-          </p:nvSpPr>
-          <p:spPr>
-            <a:xfrm>
-              <a:off x="8886560" y="4283052"/>
-              <a:ext cx="0" cy="158555"/>
-            </a:xfrm>
-            <a:custGeom>
-              <a:avLst/>
-              <a:pathLst>
-                <a:path w="0" h="158555">
-                  <a:moveTo>
-                    <a:pt x="0" y="158555"/>
-                  </a:moveTo>
-                  <a:lnTo>
-                    <a:pt x="0" y="0"/>
-                  </a:lnTo>
-                </a:path>
-              </a:pathLst>
-            </a:custGeom>
-            <a:ln w="13550" cap="flat">
-              <a:solidFill>
-                <a:srgbClr val="0072BC">
-                  <a:alpha val="100000"/>
-                </a:srgbClr>
-              </a:solidFill>
-              <a:prstDash val="solid"/>
-              <a:round/>
-            </a:ln>
-          </p:spPr>
-          <p:txBody>
-            <a:bodyPr/>
-            <a:lstStyle/>
-            <a:p/>
-          </p:txBody>
-        </p:sp>
-        <p:sp>
-          <p:nvSpPr>
-            <p:cNvPr id="24" name="pl24"/>
-            <p:cNvSpPr/>
-            <p:nvPr/>
-          </p:nvSpPr>
-          <p:spPr>
-            <a:xfrm>
-              <a:off x="7247788" y="4362329"/>
-              <a:ext cx="1638771" cy="0"/>
-            </a:xfrm>
-            <a:custGeom>
-              <a:avLst/>
-              <a:pathLst>
-                <a:path w="1638771" h="0">
-                  <a:moveTo>
-                    <a:pt x="1638771" y="0"/>
-                  </a:moveTo>
-                  <a:lnTo>
-                    <a:pt x="0" y="0"/>
-                  </a:lnTo>
-                </a:path>
-              </a:pathLst>
-            </a:custGeom>
-            <a:ln w="13550" cap="flat">
-              <a:solidFill>
-                <a:srgbClr val="0072BC">
-                  <a:alpha val="100000"/>
-                </a:srgbClr>
-              </a:solidFill>
-              <a:prstDash val="solid"/>
-              <a:round/>
-            </a:ln>
-          </p:spPr>
-          <p:txBody>
-            <a:bodyPr/>
-            <a:lstStyle/>
-            <a:p/>
-          </p:txBody>
-        </p:sp>
-        <p:sp>
-          <p:nvSpPr>
-            <p:cNvPr id="25" name="pl25"/>
-            <p:cNvSpPr/>
-            <p:nvPr/>
-          </p:nvSpPr>
-          <p:spPr>
-            <a:xfrm>
-              <a:off x="7247788" y="4283052"/>
-              <a:ext cx="0" cy="158555"/>
-            </a:xfrm>
-            <a:custGeom>
-              <a:avLst/>
-              <a:pathLst>
-                <a:path w="0" h="158555">
-                  <a:moveTo>
-                    <a:pt x="0" y="158555"/>
-                  </a:moveTo>
-                  <a:lnTo>
-                    <a:pt x="0" y="0"/>
-                  </a:lnTo>
-                </a:path>
-              </a:pathLst>
-            </a:custGeom>
-            <a:ln w="13550" cap="flat">
-              <a:solidFill>
-                <a:srgbClr val="0072BC">
-                  <a:alpha val="100000"/>
-                </a:srgbClr>
-              </a:solidFill>
-              <a:prstDash val="solid"/>
-              <a:round/>
-            </a:ln>
-          </p:spPr>
-          <p:txBody>
-            <a:bodyPr/>
-            <a:lstStyle/>
-            <a:p/>
-          </p:txBody>
-        </p:sp>
-        <p:sp>
-          <p:nvSpPr>
             <p:cNvPr id="26" name="tx26"/>
             <p:cNvSpPr/>
             <p:nvPr/>
           </p:nvSpPr>
           <p:spPr>
             <a:xfrm>
-              <a:off x="9428160" y="3664503"/>
+              <a:off x="9897464" y="3338331"/>
+              <a:ext cx="397540" cy="105768"/>
+            </a:xfrm>
+            <a:prstGeom prst="rect">
+              <a:avLst/>
+            </a:prstGeom>
+            <a:noFill/>
+          </p:spPr>
+          <p:txBody>
+            <a:bodyPr lIns="0" rIns="0" tIns="0" bIns="0" anchorCtr="1" anchor="ctr" wrap="none"/>
+            <a:lstStyle/>
+            <a:p>
+              <a:pPr algn="l" marL="0" marR="0" indent="0">
+                <a:lnSpc>
+                  <a:spcPts val="1103"/>
+                </a:lnSpc>
+                <a:spcBef>
+                  <a:spcPts val="0"/>
+                </a:spcBef>
+                <a:spcAft>
+                  <a:spcPts val="0"/>
+                </a:spcAft>
+              </a:pPr>
+              <a:r>
+                <a:rPr sz="1103">
+                  <a:solidFill>
+                    <a:srgbClr val="0072BC">
+                      <a:alpha val="100000"/>
+                    </a:srgbClr>
+                  </a:solidFill>
+                  <a:latin typeface="Arial"/>
+                  <a:cs typeface="Arial"/>
+                </a:rPr>
+                <a:t>83.4%</a:t>
+              </a:r>
+            </a:p>
+          </p:txBody>
+        </p:sp>
+        <p:sp>
+          <p:nvSpPr>
+            <p:cNvPr id="27" name="tx27"/>
+            <p:cNvSpPr/>
+            <p:nvPr/>
+          </p:nvSpPr>
+          <p:spPr>
+            <a:xfrm>
+              <a:off x="8634912" y="4131109"/>
+              <a:ext cx="397540" cy="105768"/>
+            </a:xfrm>
+            <a:prstGeom prst="rect">
+              <a:avLst/>
+            </a:prstGeom>
+            <a:noFill/>
+          </p:spPr>
+          <p:txBody>
+            <a:bodyPr lIns="0" rIns="0" tIns="0" bIns="0" anchorCtr="1" anchor="ctr" wrap="none"/>
+            <a:lstStyle/>
+            <a:p>
+              <a:pPr algn="l" marL="0" marR="0" indent="0">
+                <a:lnSpc>
+                  <a:spcPts val="1103"/>
+                </a:lnSpc>
+                <a:spcBef>
+                  <a:spcPts val="0"/>
+                </a:spcBef>
+                <a:spcAft>
+                  <a:spcPts val="0"/>
+                </a:spcAft>
+              </a:pPr>
+              <a:r>
+                <a:rPr sz="1103">
+                  <a:solidFill>
+                    <a:srgbClr val="0072BC">
+                      <a:alpha val="100000"/>
+                    </a:srgbClr>
+                  </a:solidFill>
+                  <a:latin typeface="Arial"/>
+                  <a:cs typeface="Arial"/>
+                </a:rPr>
+                <a:t>67.0%</a:t>
+              </a:r>
+            </a:p>
+          </p:txBody>
+        </p:sp>
+        <p:sp>
+          <p:nvSpPr>
+            <p:cNvPr id="28" name="tx28"/>
+            <p:cNvSpPr/>
+            <p:nvPr/>
+          </p:nvSpPr>
+          <p:spPr>
+            <a:xfrm>
+              <a:off x="10628300" y="3664503"/>
               <a:ext cx="397540" cy="105768"/>
             </a:xfrm>
             <a:prstGeom prst="rect">
@@ -6746,66 +6838,20 @@
                   <a:latin typeface="Arial"/>
                   <a:cs typeface="Arial"/>
                 </a:rPr>
-                <a:t>77.3%</a:t>
+                <a:t>92.8%</a:t>
               </a:r>
             </a:p>
           </p:txBody>
         </p:sp>
         <p:sp>
           <p:nvSpPr>
-            <p:cNvPr id="27" name="tx27"/>
-            <p:cNvSpPr/>
-            <p:nvPr/>
-          </p:nvSpPr>
-          <p:spPr>
-            <a:xfrm>
-              <a:off x="8762037" y="3338331"/>
-              <a:ext cx="397540" cy="105768"/>
-            </a:xfrm>
-            <a:prstGeom prst="rect">
-              <a:avLst/>
-            </a:prstGeom>
-            <a:noFill/>
-          </p:spPr>
-          <p:txBody>
-            <a:bodyPr lIns="0" rIns="0" tIns="0" bIns="0" anchorCtr="1" anchor="ctr" wrap="none"/>
-            <a:lstStyle/>
-            <a:p>
-              <a:pPr algn="l" marL="0" marR="0" indent="0">
-                <a:lnSpc>
-                  <a:spcPts val="1103"/>
-                </a:lnSpc>
-                <a:spcBef>
-                  <a:spcPts val="0"/>
-                </a:spcBef>
-                <a:spcAft>
-                  <a:spcPts val="0"/>
-                </a:spcAft>
-              </a:pPr>
-              <a:r>
-                <a:rPr sz="1103">
-                  <a:solidFill>
-                    <a:srgbClr val="0072BC">
-                      <a:alpha val="100000"/>
-                    </a:srgbClr>
-                  </a:solidFill>
-                  <a:latin typeface="Arial"/>
-                  <a:cs typeface="Arial"/>
-                </a:rPr>
-                <a:t>68.7%</a:t>
-              </a:r>
-            </a:p>
-          </p:txBody>
-        </p:sp>
-        <p:sp>
-          <p:nvSpPr>
-            <p:cNvPr id="28" name="tx28"/>
-            <p:cNvSpPr/>
-            <p:nvPr/>
-          </p:nvSpPr>
-          <p:spPr>
-            <a:xfrm>
-              <a:off x="8684154" y="4457282"/>
+            <p:cNvPr id="29" name="tx29"/>
+            <p:cNvSpPr/>
+            <p:nvPr/>
+          </p:nvSpPr>
+          <p:spPr>
+            <a:xfrm>
+              <a:off x="9688461" y="4457282"/>
               <a:ext cx="397540" cy="105768"/>
             </a:xfrm>
             <a:prstGeom prst="rect">
@@ -6838,53 +6884,7 @@
                   <a:latin typeface="Arial"/>
                   <a:cs typeface="Arial"/>
                 </a:rPr>
-                <a:t>67.7%</a:t>
-              </a:r>
-            </a:p>
-          </p:txBody>
-        </p:sp>
-        <p:sp>
-          <p:nvSpPr>
-            <p:cNvPr id="29" name="tx29"/>
-            <p:cNvSpPr/>
-            <p:nvPr/>
-          </p:nvSpPr>
-          <p:spPr>
-            <a:xfrm>
-              <a:off x="7868403" y="4131109"/>
-              <a:ext cx="397540" cy="105768"/>
-            </a:xfrm>
-            <a:prstGeom prst="rect">
-              <a:avLst/>
-            </a:prstGeom>
-            <a:noFill/>
-          </p:spPr>
-          <p:txBody>
-            <a:bodyPr lIns="0" rIns="0" tIns="0" bIns="0" anchorCtr="1" anchor="ctr" wrap="none"/>
-            <a:lstStyle/>
-            <a:p>
-              <a:pPr algn="l" marL="0" marR="0" indent="0">
-                <a:lnSpc>
-                  <a:spcPts val="1103"/>
-                </a:lnSpc>
-                <a:spcBef>
-                  <a:spcPts val="0"/>
-                </a:spcBef>
-                <a:spcAft>
-                  <a:spcPts val="0"/>
-                </a:spcAft>
-              </a:pPr>
-              <a:r>
-                <a:rPr sz="1103">
-                  <a:solidFill>
-                    <a:srgbClr val="0072BC">
-                      <a:alpha val="100000"/>
-                    </a:srgbClr>
-                  </a:solidFill>
-                  <a:latin typeface="Arial"/>
-                  <a:cs typeface="Arial"/>
-                </a:rPr>
-                <a:t>57.1%</a:t>
+                <a:t>80.7%</a:t>
               </a:r>
             </a:p>
           </p:txBody>
@@ -7426,7 +7426,7 @@
           </p:nvSpPr>
           <p:spPr>
             <a:xfrm>
-              <a:off x="4812817" y="2765397"/>
+              <a:off x="4769467" y="2765397"/>
               <a:ext cx="49651" cy="49651"/>
             </a:xfrm>
             <a:prstGeom prst="ellipse">
@@ -7461,7 +7461,7 @@
           </p:nvSpPr>
           <p:spPr>
             <a:xfrm>
-              <a:off x="4746544" y="2790222"/>
+              <a:off x="4703195" y="2790222"/>
               <a:ext cx="182196" cy="0"/>
             </a:xfrm>
             <a:custGeom>
@@ -7501,7 +7501,7 @@
           </p:nvSpPr>
           <p:spPr>
             <a:xfrm>
-              <a:off x="4798655" y="2764413"/>
+              <a:off x="4755306" y="2764413"/>
               <a:ext cx="77974" cy="75989"/>
             </a:xfrm>
             <a:prstGeom prst="rect">
@@ -7548,7 +7548,7 @@
           <p:spPr>
             <a:xfrm>
               <a:off x="3678661" y="2726003"/>
-              <a:ext cx="950213" cy="124883"/>
+              <a:ext cx="906864" cy="124883"/>
             </a:xfrm>
             <a:prstGeom prst="rect">
               <a:avLst/>
@@ -7580,7 +7580,7 @@
                   <a:latin typeface="Lato"/>
                   <a:cs typeface="Lato"/>
                 </a:rPr>
-                <a:t>Costa Ricans</a:t>
+                <a:t>CostaRicans</a:t>
               </a:r>
             </a:p>
           </p:txBody>
@@ -7593,7 +7593,7 @@
           </p:nvSpPr>
           <p:spPr>
             <a:xfrm>
-              <a:off x="5046410" y="2696454"/>
+              <a:off x="5003060" y="2696454"/>
               <a:ext cx="915161" cy="154432"/>
             </a:xfrm>
             <a:prstGeom prst="rect">
@@ -7640,7 +7640,7 @@
           <p:spPr>
             <a:xfrm>
               <a:off x="418388" y="2213463"/>
-              <a:ext cx="4826889" cy="175069"/>
+              <a:ext cx="4875657" cy="175069"/>
             </a:xfrm>
             <a:prstGeom prst="rect">
               <a:avLst/>
@@ -7672,7 +7672,7 @@
                   <a:latin typeface="Lato"/>
                   <a:cs typeface="Lato"/>
                 </a:rPr>
-                <a:t>Empowering Communities and Achieving Gender Equality</a:t>
+                <a:t> Empowering Communities and Achieving Gender Equality</a:t>
               </a:r>
             </a:p>
           </p:txBody>
@@ -8184,7 +8184,112 @@
           </p:nvSpPr>
           <p:spPr>
             <a:xfrm>
-              <a:off x="11077750" y="3128428"/>
+              <a:off x="10142139" y="3776406"/>
+              <a:ext cx="49651" cy="49651"/>
+            </a:xfrm>
+            <a:prstGeom prst="ellipse">
+              <a:avLst/>
+            </a:prstGeom>
+            <a:solidFill>
+              <a:srgbClr val="0072BC">
+                <a:alpha val="100000"/>
+              </a:srgbClr>
+            </a:solidFill>
+            <a:ln w="9000" cap="rnd">
+              <a:solidFill>
+                <a:srgbClr val="0072BC">
+                  <a:alpha val="100000"/>
+                </a:srgbClr>
+              </a:solidFill>
+              <a:prstDash val="solid"/>
+              <a:round/>
+            </a:ln>
+          </p:spPr>
+          <p:txBody>
+            <a:bodyPr/>
+            <a:lstStyle/>
+            <a:p/>
+          </p:txBody>
+        </p:sp>
+        <p:sp>
+          <p:nvSpPr>
+            <p:cNvPr id="12" name="pt12"/>
+            <p:cNvSpPr/>
+            <p:nvPr/>
+          </p:nvSpPr>
+          <p:spPr>
+            <a:xfrm>
+              <a:off x="4955235" y="4424384"/>
+              <a:ext cx="49651" cy="49651"/>
+            </a:xfrm>
+            <a:prstGeom prst="ellipse">
+              <a:avLst/>
+            </a:prstGeom>
+            <a:solidFill>
+              <a:srgbClr val="0072BC">
+                <a:alpha val="100000"/>
+              </a:srgbClr>
+            </a:solidFill>
+            <a:ln w="9000" cap="rnd">
+              <a:solidFill>
+                <a:srgbClr val="0072BC">
+                  <a:alpha val="100000"/>
+                </a:srgbClr>
+              </a:solidFill>
+              <a:prstDash val="solid"/>
+              <a:round/>
+            </a:ln>
+          </p:spPr>
+          <p:txBody>
+            <a:bodyPr/>
+            <a:lstStyle/>
+            <a:p/>
+          </p:txBody>
+        </p:sp>
+        <p:sp>
+          <p:nvSpPr>
+            <p:cNvPr id="13" name="pt13"/>
+            <p:cNvSpPr/>
+            <p:nvPr/>
+          </p:nvSpPr>
+          <p:spPr>
+            <a:xfrm>
+              <a:off x="10917164" y="3128428"/>
+              <a:ext cx="49651" cy="49651"/>
+            </a:xfrm>
+            <a:prstGeom prst="ellipse">
+              <a:avLst/>
+            </a:prstGeom>
+            <a:solidFill>
+              <a:srgbClr val="0072BC">
+                <a:alpha val="100000"/>
+              </a:srgbClr>
+            </a:solidFill>
+            <a:ln w="9000" cap="rnd">
+              <a:solidFill>
+                <a:srgbClr val="0072BC">
+                  <a:alpha val="100000"/>
+                </a:srgbClr>
+              </a:solidFill>
+              <a:prstDash val="solid"/>
+              <a:round/>
+            </a:ln>
+          </p:spPr>
+          <p:txBody>
+            <a:bodyPr/>
+            <a:lstStyle/>
+            <a:p/>
+          </p:txBody>
+        </p:sp>
+        <p:sp>
+          <p:nvSpPr>
+            <p:cNvPr id="14" name="pt14"/>
+            <p:cNvSpPr/>
+            <p:nvPr/>
+          </p:nvSpPr>
+          <p:spPr>
+            <a:xfrm>
+              <a:off x="10807727" y="3776406"/>
               <a:ext cx="49651" cy="49651"/>
             </a:xfrm>
             <a:prstGeom prst="ellipse">
@@ -8213,42 +8318,7 @@
         </p:sp>
         <p:sp>
           <p:nvSpPr>
-            <p:cNvPr id="12" name="pt12"/>
-            <p:cNvSpPr/>
-            <p:nvPr/>
-          </p:nvSpPr>
-          <p:spPr>
-            <a:xfrm>
-              <a:off x="10917164" y="3128428"/>
-              <a:ext cx="49651" cy="49651"/>
-            </a:xfrm>
-            <a:prstGeom prst="ellipse">
-              <a:avLst/>
-            </a:prstGeom>
-            <a:solidFill>
-              <a:srgbClr val="0072BC">
-                <a:alpha val="100000"/>
-              </a:srgbClr>
-            </a:solidFill>
-            <a:ln w="9000" cap="rnd">
-              <a:solidFill>
-                <a:srgbClr val="0072BC">
-                  <a:alpha val="100000"/>
-                </a:srgbClr>
-              </a:solidFill>
-              <a:prstDash val="solid"/>
-              <a:round/>
-            </a:ln>
-          </p:spPr>
-          <p:txBody>
-            <a:bodyPr/>
-            <a:lstStyle/>
-            <a:p/>
-          </p:txBody>
-        </p:sp>
-        <p:sp>
-          <p:nvSpPr>
-            <p:cNvPr id="13" name="pt13"/>
+            <p:cNvPr id="15" name="pt15"/>
             <p:cNvSpPr/>
             <p:nvPr/>
           </p:nvSpPr>
@@ -8283,48 +8353,13 @@
         </p:sp>
         <p:sp>
           <p:nvSpPr>
-            <p:cNvPr id="14" name="pt14"/>
-            <p:cNvSpPr/>
-            <p:nvPr/>
-          </p:nvSpPr>
-          <p:spPr>
-            <a:xfrm>
-              <a:off x="4955235" y="4424384"/>
-              <a:ext cx="49651" cy="49651"/>
-            </a:xfrm>
-            <a:prstGeom prst="ellipse">
-              <a:avLst/>
-            </a:prstGeom>
-            <a:solidFill>
-              <a:srgbClr val="0072BC">
-                <a:alpha val="100000"/>
-              </a:srgbClr>
-            </a:solidFill>
-            <a:ln w="9000" cap="rnd">
-              <a:solidFill>
-                <a:srgbClr val="0072BC">
-                  <a:alpha val="100000"/>
-                </a:srgbClr>
-              </a:solidFill>
-              <a:prstDash val="solid"/>
-              <a:round/>
-            </a:ln>
-          </p:spPr>
-          <p:txBody>
-            <a:bodyPr/>
-            <a:lstStyle/>
-            <a:p/>
-          </p:txBody>
-        </p:sp>
-        <p:sp>
-          <p:nvSpPr>
-            <p:cNvPr id="15" name="pt15"/>
-            <p:cNvSpPr/>
-            <p:nvPr/>
-          </p:nvSpPr>
-          <p:spPr>
-            <a:xfrm>
-              <a:off x="10807727" y="3776406"/>
+            <p:cNvPr id="16" name="pt16"/>
+            <p:cNvSpPr/>
+            <p:nvPr/>
+          </p:nvSpPr>
+          <p:spPr>
+            <a:xfrm>
+              <a:off x="11077750" y="3128428"/>
               <a:ext cx="49651" cy="49651"/>
             </a:xfrm>
             <a:prstGeom prst="ellipse">
@@ -8353,24 +8388,29 @@
         </p:sp>
         <p:sp>
           <p:nvSpPr>
-            <p:cNvPr id="16" name="pt16"/>
-            <p:cNvSpPr/>
-            <p:nvPr/>
-          </p:nvSpPr>
-          <p:spPr>
-            <a:xfrm>
-              <a:off x="10142139" y="3776406"/>
-              <a:ext cx="49651" cy="49651"/>
-            </a:xfrm>
-            <a:prstGeom prst="ellipse">
-              <a:avLst/>
-            </a:prstGeom>
-            <a:solidFill>
-              <a:srgbClr val="0072BC">
-                <a:alpha val="100000"/>
-              </a:srgbClr>
-            </a:solidFill>
-            <a:ln w="9000" cap="rnd">
+            <p:cNvPr id="17" name="pl17"/>
+            <p:cNvSpPr/>
+            <p:nvPr/>
+          </p:nvSpPr>
+          <p:spPr>
+            <a:xfrm>
+              <a:off x="10388435" y="3736434"/>
+              <a:ext cx="0" cy="129595"/>
+            </a:xfrm>
+            <a:custGeom>
+              <a:avLst/>
+              <a:pathLst>
+                <a:path w="0" h="129595">
+                  <a:moveTo>
+                    <a:pt x="0" y="129595"/>
+                  </a:moveTo>
+                  <a:lnTo>
+                    <a:pt x="0" y="0"/>
+                  </a:lnTo>
+                </a:path>
+              </a:pathLst>
+            </a:custGeom>
+            <a:ln w="13550" cap="flat">
               <a:solidFill>
                 <a:srgbClr val="0072BC">
                   <a:alpha val="100000"/>
@@ -8388,13 +8428,333 @@
         </p:sp>
         <p:sp>
           <p:nvSpPr>
-            <p:cNvPr id="17" name="pl17"/>
-            <p:cNvSpPr/>
-            <p:nvPr/>
-          </p:nvSpPr>
-          <p:spPr>
-            <a:xfrm>
-              <a:off x="11124563" y="3088456"/>
+            <p:cNvPr id="18" name="pl18"/>
+            <p:cNvSpPr/>
+            <p:nvPr/>
+          </p:nvSpPr>
+          <p:spPr>
+            <a:xfrm>
+              <a:off x="9945496" y="3801232"/>
+              <a:ext cx="442938" cy="0"/>
+            </a:xfrm>
+            <a:custGeom>
+              <a:avLst/>
+              <a:pathLst>
+                <a:path w="442938" h="0">
+                  <a:moveTo>
+                    <a:pt x="442938" y="0"/>
+                  </a:moveTo>
+                  <a:lnTo>
+                    <a:pt x="0" y="0"/>
+                  </a:lnTo>
+                </a:path>
+              </a:pathLst>
+            </a:custGeom>
+            <a:ln w="13550" cap="flat">
+              <a:solidFill>
+                <a:srgbClr val="0072BC">
+                  <a:alpha val="100000"/>
+                </a:srgbClr>
+              </a:solidFill>
+              <a:prstDash val="solid"/>
+              <a:round/>
+            </a:ln>
+          </p:spPr>
+          <p:txBody>
+            <a:bodyPr/>
+            <a:lstStyle/>
+            <a:p/>
+          </p:txBody>
+        </p:sp>
+        <p:sp>
+          <p:nvSpPr>
+            <p:cNvPr id="19" name="pl19"/>
+            <p:cNvSpPr/>
+            <p:nvPr/>
+          </p:nvSpPr>
+          <p:spPr>
+            <a:xfrm>
+              <a:off x="9945496" y="3736434"/>
+              <a:ext cx="0" cy="129595"/>
+            </a:xfrm>
+            <a:custGeom>
+              <a:avLst/>
+              <a:pathLst>
+                <a:path w="0" h="129595">
+                  <a:moveTo>
+                    <a:pt x="0" y="129595"/>
+                  </a:moveTo>
+                  <a:lnTo>
+                    <a:pt x="0" y="0"/>
+                  </a:lnTo>
+                </a:path>
+              </a:pathLst>
+            </a:custGeom>
+            <a:ln w="13550" cap="flat">
+              <a:solidFill>
+                <a:srgbClr val="0072BC">
+                  <a:alpha val="100000"/>
+                </a:srgbClr>
+              </a:solidFill>
+              <a:prstDash val="solid"/>
+              <a:round/>
+            </a:ln>
+          </p:spPr>
+          <p:txBody>
+            <a:bodyPr/>
+            <a:lstStyle/>
+            <a:p/>
+          </p:txBody>
+        </p:sp>
+        <p:sp>
+          <p:nvSpPr>
+            <p:cNvPr id="20" name="pl20"/>
+            <p:cNvSpPr/>
+            <p:nvPr/>
+          </p:nvSpPr>
+          <p:spPr>
+            <a:xfrm>
+              <a:off x="5120415" y="4384412"/>
+              <a:ext cx="0" cy="129595"/>
+            </a:xfrm>
+            <a:custGeom>
+              <a:avLst/>
+              <a:pathLst>
+                <a:path w="0" h="129595">
+                  <a:moveTo>
+                    <a:pt x="0" y="129595"/>
+                  </a:moveTo>
+                  <a:lnTo>
+                    <a:pt x="0" y="0"/>
+                  </a:lnTo>
+                </a:path>
+              </a:pathLst>
+            </a:custGeom>
+            <a:ln w="13550" cap="flat">
+              <a:solidFill>
+                <a:srgbClr val="0072BC">
+                  <a:alpha val="100000"/>
+                </a:srgbClr>
+              </a:solidFill>
+              <a:prstDash val="solid"/>
+              <a:round/>
+            </a:ln>
+          </p:spPr>
+          <p:txBody>
+            <a:bodyPr/>
+            <a:lstStyle/>
+            <a:p/>
+          </p:txBody>
+        </p:sp>
+        <p:sp>
+          <p:nvSpPr>
+            <p:cNvPr id="21" name="pl21"/>
+            <p:cNvSpPr/>
+            <p:nvPr/>
+          </p:nvSpPr>
+          <p:spPr>
+            <a:xfrm>
+              <a:off x="4839706" y="4449210"/>
+              <a:ext cx="280709" cy="0"/>
+            </a:xfrm>
+            <a:custGeom>
+              <a:avLst/>
+              <a:pathLst>
+                <a:path w="280709" h="0">
+                  <a:moveTo>
+                    <a:pt x="280709" y="0"/>
+                  </a:moveTo>
+                  <a:lnTo>
+                    <a:pt x="0" y="0"/>
+                  </a:lnTo>
+                </a:path>
+              </a:pathLst>
+            </a:custGeom>
+            <a:ln w="13550" cap="flat">
+              <a:solidFill>
+                <a:srgbClr val="0072BC">
+                  <a:alpha val="100000"/>
+                </a:srgbClr>
+              </a:solidFill>
+              <a:prstDash val="solid"/>
+              <a:round/>
+            </a:ln>
+          </p:spPr>
+          <p:txBody>
+            <a:bodyPr/>
+            <a:lstStyle/>
+            <a:p/>
+          </p:txBody>
+        </p:sp>
+        <p:sp>
+          <p:nvSpPr>
+            <p:cNvPr id="22" name="pl22"/>
+            <p:cNvSpPr/>
+            <p:nvPr/>
+          </p:nvSpPr>
+          <p:spPr>
+            <a:xfrm>
+              <a:off x="4839706" y="4384412"/>
+              <a:ext cx="0" cy="129595"/>
+            </a:xfrm>
+            <a:custGeom>
+              <a:avLst/>
+              <a:pathLst>
+                <a:path w="0" h="129595">
+                  <a:moveTo>
+                    <a:pt x="0" y="129595"/>
+                  </a:moveTo>
+                  <a:lnTo>
+                    <a:pt x="0" y="0"/>
+                  </a:lnTo>
+                </a:path>
+              </a:pathLst>
+            </a:custGeom>
+            <a:ln w="13550" cap="flat">
+              <a:solidFill>
+                <a:srgbClr val="0072BC">
+                  <a:alpha val="100000"/>
+                </a:srgbClr>
+              </a:solidFill>
+              <a:prstDash val="solid"/>
+              <a:round/>
+            </a:ln>
+          </p:spPr>
+          <p:txBody>
+            <a:bodyPr/>
+            <a:lstStyle/>
+            <a:p/>
+          </p:txBody>
+        </p:sp>
+        <p:sp>
+          <p:nvSpPr>
+            <p:cNvPr id="23" name="pl23"/>
+            <p:cNvSpPr/>
+            <p:nvPr/>
+          </p:nvSpPr>
+          <p:spPr>
+            <a:xfrm>
+              <a:off x="11093267" y="3088456"/>
+              <a:ext cx="0" cy="129595"/>
+            </a:xfrm>
+            <a:custGeom>
+              <a:avLst/>
+              <a:pathLst>
+                <a:path w="0" h="129595">
+                  <a:moveTo>
+                    <a:pt x="0" y="129595"/>
+                  </a:moveTo>
+                  <a:lnTo>
+                    <a:pt x="0" y="0"/>
+                  </a:lnTo>
+                </a:path>
+              </a:pathLst>
+            </a:custGeom>
+            <a:ln w="13550" cap="flat">
+              <a:solidFill>
+                <a:srgbClr val="0072BC">
+                  <a:alpha val="100000"/>
+                </a:srgbClr>
+              </a:solidFill>
+              <a:prstDash val="solid"/>
+              <a:round/>
+            </a:ln>
+          </p:spPr>
+          <p:txBody>
+            <a:bodyPr/>
+            <a:lstStyle/>
+            <a:p/>
+          </p:txBody>
+        </p:sp>
+        <p:sp>
+          <p:nvSpPr>
+            <p:cNvPr id="24" name="pl24"/>
+            <p:cNvSpPr/>
+            <p:nvPr/>
+          </p:nvSpPr>
+          <p:spPr>
+            <a:xfrm>
+              <a:off x="10790713" y="3153254"/>
+              <a:ext cx="302554" cy="0"/>
+            </a:xfrm>
+            <a:custGeom>
+              <a:avLst/>
+              <a:pathLst>
+                <a:path w="302554" h="0">
+                  <a:moveTo>
+                    <a:pt x="302554" y="0"/>
+                  </a:moveTo>
+                  <a:lnTo>
+                    <a:pt x="0" y="0"/>
+                  </a:lnTo>
+                </a:path>
+              </a:pathLst>
+            </a:custGeom>
+            <a:ln w="13550" cap="flat">
+              <a:solidFill>
+                <a:srgbClr val="0072BC">
+                  <a:alpha val="100000"/>
+                </a:srgbClr>
+              </a:solidFill>
+              <a:prstDash val="solid"/>
+              <a:round/>
+            </a:ln>
+          </p:spPr>
+          <p:txBody>
+            <a:bodyPr/>
+            <a:lstStyle/>
+            <a:p/>
+          </p:txBody>
+        </p:sp>
+        <p:sp>
+          <p:nvSpPr>
+            <p:cNvPr id="25" name="pl25"/>
+            <p:cNvSpPr/>
+            <p:nvPr/>
+          </p:nvSpPr>
+          <p:spPr>
+            <a:xfrm>
+              <a:off x="10790713" y="3088456"/>
+              <a:ext cx="0" cy="129595"/>
+            </a:xfrm>
+            <a:custGeom>
+              <a:avLst/>
+              <a:pathLst>
+                <a:path w="0" h="129595">
+                  <a:moveTo>
+                    <a:pt x="0" y="129595"/>
+                  </a:moveTo>
+                  <a:lnTo>
+                    <a:pt x="0" y="0"/>
+                  </a:lnTo>
+                </a:path>
+              </a:pathLst>
+            </a:custGeom>
+            <a:ln w="13550" cap="flat">
+              <a:solidFill>
+                <a:srgbClr val="0072BC">
+                  <a:alpha val="100000"/>
+                </a:srgbClr>
+              </a:solidFill>
+              <a:prstDash val="solid"/>
+              <a:round/>
+            </a:ln>
+          </p:spPr>
+          <p:txBody>
+            <a:bodyPr/>
+            <a:lstStyle/>
+            <a:p/>
+          </p:txBody>
+        </p:sp>
+        <p:sp>
+          <p:nvSpPr>
+            <p:cNvPr id="26" name="pl26"/>
+            <p:cNvSpPr/>
+            <p:nvPr/>
+          </p:nvSpPr>
+          <p:spPr>
+            <a:xfrm>
+              <a:off x="10888161" y="3736434"/>
               <a:ext cx="0" cy="129595"/>
             </a:xfrm>
             <a:custGeom>
@@ -8428,21 +8788,21 @@
         </p:sp>
         <p:sp>
           <p:nvSpPr>
-            <p:cNvPr id="18" name="pl18"/>
-            <p:cNvSpPr/>
-            <p:nvPr/>
-          </p:nvSpPr>
-          <p:spPr>
-            <a:xfrm>
-              <a:off x="11080588" y="3153254"/>
-              <a:ext cx="43975" cy="0"/>
+            <p:cNvPr id="27" name="pl27"/>
+            <p:cNvSpPr/>
+            <p:nvPr/>
+          </p:nvSpPr>
+          <p:spPr>
+            <a:xfrm>
+              <a:off x="10776945" y="3801232"/>
+              <a:ext cx="111215" cy="0"/>
             </a:xfrm>
             <a:custGeom>
               <a:avLst/>
               <a:pathLst>
-                <a:path w="43975" h="0">
+                <a:path w="111215" h="0">
                   <a:moveTo>
-                    <a:pt x="43975" y="0"/>
+                    <a:pt x="111215" y="0"/>
                   </a:moveTo>
                   <a:lnTo>
                     <a:pt x="0" y="0"/>
@@ -8468,13 +8828,13 @@
         </p:sp>
         <p:sp>
           <p:nvSpPr>
-            <p:cNvPr id="19" name="pl19"/>
-            <p:cNvSpPr/>
-            <p:nvPr/>
-          </p:nvSpPr>
-          <p:spPr>
-            <a:xfrm>
-              <a:off x="11080588" y="3088456"/>
+            <p:cNvPr id="28" name="pl28"/>
+            <p:cNvSpPr/>
+            <p:nvPr/>
+          </p:nvSpPr>
+          <p:spPr>
+            <a:xfrm>
+              <a:off x="10776945" y="3736434"/>
               <a:ext cx="0" cy="129595"/>
             </a:xfrm>
             <a:custGeom>
@@ -8508,133 +8868,13 @@
         </p:sp>
         <p:sp>
           <p:nvSpPr>
-            <p:cNvPr id="20" name="pl20"/>
-            <p:cNvSpPr/>
-            <p:nvPr/>
-          </p:nvSpPr>
-          <p:spPr>
-            <a:xfrm>
-              <a:off x="11024362" y="3088456"/>
-              <a:ext cx="0" cy="129595"/>
-            </a:xfrm>
-            <a:custGeom>
-              <a:avLst/>
-              <a:pathLst>
-                <a:path w="0" h="129595">
-                  <a:moveTo>
-                    <a:pt x="0" y="129595"/>
-                  </a:moveTo>
-                  <a:lnTo>
-                    <a:pt x="0" y="0"/>
-                  </a:lnTo>
-                </a:path>
-              </a:pathLst>
-            </a:custGeom>
-            <a:ln w="13550" cap="flat">
-              <a:solidFill>
-                <a:srgbClr val="0072BC">
-                  <a:alpha val="100000"/>
-                </a:srgbClr>
-              </a:solidFill>
-              <a:prstDash val="solid"/>
-              <a:round/>
-            </a:ln>
-          </p:spPr>
-          <p:txBody>
-            <a:bodyPr/>
-            <a:lstStyle/>
-            <a:p/>
-          </p:txBody>
-        </p:sp>
-        <p:sp>
-          <p:nvSpPr>
-            <p:cNvPr id="21" name="pl21"/>
-            <p:cNvSpPr/>
-            <p:nvPr/>
-          </p:nvSpPr>
-          <p:spPr>
-            <a:xfrm>
-              <a:off x="10859618" y="3153254"/>
-              <a:ext cx="164743" cy="0"/>
-            </a:xfrm>
-            <a:custGeom>
-              <a:avLst/>
-              <a:pathLst>
-                <a:path w="164743" h="0">
-                  <a:moveTo>
-                    <a:pt x="164743" y="0"/>
-                  </a:moveTo>
-                  <a:lnTo>
-                    <a:pt x="0" y="0"/>
-                  </a:lnTo>
-                </a:path>
-              </a:pathLst>
-            </a:custGeom>
-            <a:ln w="13550" cap="flat">
-              <a:solidFill>
-                <a:srgbClr val="0072BC">
-                  <a:alpha val="100000"/>
-                </a:srgbClr>
-              </a:solidFill>
-              <a:prstDash val="solid"/>
-              <a:round/>
-            </a:ln>
-          </p:spPr>
-          <p:txBody>
-            <a:bodyPr/>
-            <a:lstStyle/>
-            <a:p/>
-          </p:txBody>
-        </p:sp>
-        <p:sp>
-          <p:nvSpPr>
-            <p:cNvPr id="22" name="pl22"/>
-            <p:cNvSpPr/>
-            <p:nvPr/>
-          </p:nvSpPr>
-          <p:spPr>
-            <a:xfrm>
-              <a:off x="10859618" y="3088456"/>
-              <a:ext cx="0" cy="129595"/>
-            </a:xfrm>
-            <a:custGeom>
-              <a:avLst/>
-              <a:pathLst>
-                <a:path w="0" h="129595">
-                  <a:moveTo>
-                    <a:pt x="0" y="129595"/>
-                  </a:moveTo>
-                  <a:lnTo>
-                    <a:pt x="0" y="0"/>
-                  </a:lnTo>
-                </a:path>
-              </a:pathLst>
-            </a:custGeom>
-            <a:ln w="13550" cap="flat">
-              <a:solidFill>
-                <a:srgbClr val="0072BC">
-                  <a:alpha val="100000"/>
-                </a:srgbClr>
-              </a:solidFill>
-              <a:prstDash val="solid"/>
-              <a:round/>
-            </a:ln>
-          </p:spPr>
-          <p:txBody>
-            <a:bodyPr/>
-            <a:lstStyle/>
-            <a:p/>
-          </p:txBody>
-        </p:sp>
-        <p:sp>
-          <p:nvSpPr>
-            <p:cNvPr id="23" name="pl23"/>
-            <p:cNvSpPr/>
-            <p:nvPr/>
-          </p:nvSpPr>
-          <p:spPr>
-            <a:xfrm>
-              <a:off x="5223691" y="4384412"/>
+            <p:cNvPr id="29" name="pl29"/>
+            <p:cNvSpPr/>
+            <p:nvPr/>
+          </p:nvSpPr>
+          <p:spPr>
+            <a:xfrm>
+              <a:off x="5055550" y="4384412"/>
               <a:ext cx="0" cy="129595"/>
             </a:xfrm>
             <a:custGeom>
@@ -8668,21 +8908,21 @@
         </p:sp>
         <p:sp>
           <p:nvSpPr>
-            <p:cNvPr id="24" name="pl24"/>
-            <p:cNvSpPr/>
-            <p:nvPr/>
-          </p:nvSpPr>
-          <p:spPr>
-            <a:xfrm>
-              <a:off x="4792955" y="4449210"/>
-              <a:ext cx="430736" cy="0"/>
+            <p:cNvPr id="30" name="pl30"/>
+            <p:cNvSpPr/>
+            <p:nvPr/>
+          </p:nvSpPr>
+          <p:spPr>
+            <a:xfrm>
+              <a:off x="4961096" y="4449210"/>
+              <a:ext cx="94454" cy="0"/>
             </a:xfrm>
             <a:custGeom>
               <a:avLst/>
               <a:pathLst>
-                <a:path w="430736" h="0">
+                <a:path w="94454" h="0">
                   <a:moveTo>
-                    <a:pt x="430736" y="0"/>
+                    <a:pt x="94454" y="0"/>
                   </a:moveTo>
                   <a:lnTo>
                     <a:pt x="0" y="0"/>
@@ -8708,13 +8948,13 @@
         </p:sp>
         <p:sp>
           <p:nvSpPr>
-            <p:cNvPr id="25" name="pl25"/>
-            <p:cNvSpPr/>
-            <p:nvPr/>
-          </p:nvSpPr>
-          <p:spPr>
-            <a:xfrm>
-              <a:off x="4792955" y="4384412"/>
+            <p:cNvPr id="31" name="pl31"/>
+            <p:cNvSpPr/>
+            <p:nvPr/>
+          </p:nvSpPr>
+          <p:spPr>
+            <a:xfrm>
+              <a:off x="4961096" y="4384412"/>
               <a:ext cx="0" cy="129595"/>
             </a:xfrm>
             <a:custGeom>
@@ -8748,133 +8988,13 @@
         </p:sp>
         <p:sp>
           <p:nvSpPr>
-            <p:cNvPr id="26" name="pl26"/>
-            <p:cNvSpPr/>
-            <p:nvPr/>
-          </p:nvSpPr>
-          <p:spPr>
-            <a:xfrm>
-              <a:off x="5642708" y="4384412"/>
-              <a:ext cx="0" cy="129595"/>
-            </a:xfrm>
-            <a:custGeom>
-              <a:avLst/>
-              <a:pathLst>
-                <a:path w="0" h="129595">
-                  <a:moveTo>
-                    <a:pt x="0" y="129595"/>
-                  </a:moveTo>
-                  <a:lnTo>
-                    <a:pt x="0" y="0"/>
-                  </a:lnTo>
-                </a:path>
-              </a:pathLst>
-            </a:custGeom>
-            <a:ln w="13550" cap="flat">
-              <a:solidFill>
-                <a:srgbClr val="0072BC">
-                  <a:alpha val="100000"/>
-                </a:srgbClr>
-              </a:solidFill>
-              <a:prstDash val="solid"/>
-              <a:round/>
-            </a:ln>
-          </p:spPr>
-          <p:txBody>
-            <a:bodyPr/>
-            <a:lstStyle/>
-            <a:p/>
-          </p:txBody>
-        </p:sp>
-        <p:sp>
-          <p:nvSpPr>
-            <p:cNvPr id="27" name="pl27"/>
-            <p:cNvSpPr/>
-            <p:nvPr/>
-          </p:nvSpPr>
-          <p:spPr>
-            <a:xfrm>
-              <a:off x="4317413" y="4449210"/>
-              <a:ext cx="1325294" cy="0"/>
-            </a:xfrm>
-            <a:custGeom>
-              <a:avLst/>
-              <a:pathLst>
-                <a:path w="1325294" h="0">
-                  <a:moveTo>
-                    <a:pt x="1325294" y="0"/>
-                  </a:moveTo>
-                  <a:lnTo>
-                    <a:pt x="0" y="0"/>
-                  </a:lnTo>
-                </a:path>
-              </a:pathLst>
-            </a:custGeom>
-            <a:ln w="13550" cap="flat">
-              <a:solidFill>
-                <a:srgbClr val="0072BC">
-                  <a:alpha val="100000"/>
-                </a:srgbClr>
-              </a:solidFill>
-              <a:prstDash val="solid"/>
-              <a:round/>
-            </a:ln>
-          </p:spPr>
-          <p:txBody>
-            <a:bodyPr/>
-            <a:lstStyle/>
-            <a:p/>
-          </p:txBody>
-        </p:sp>
-        <p:sp>
-          <p:nvSpPr>
-            <p:cNvPr id="28" name="pl28"/>
-            <p:cNvSpPr/>
-            <p:nvPr/>
-          </p:nvSpPr>
-          <p:spPr>
-            <a:xfrm>
-              <a:off x="4317413" y="4384412"/>
-              <a:ext cx="0" cy="129595"/>
-            </a:xfrm>
-            <a:custGeom>
-              <a:avLst/>
-              <a:pathLst>
-                <a:path w="0" h="129595">
-                  <a:moveTo>
-                    <a:pt x="0" y="129595"/>
-                  </a:moveTo>
-                  <a:lnTo>
-                    <a:pt x="0" y="0"/>
-                  </a:lnTo>
-                </a:path>
-              </a:pathLst>
-            </a:custGeom>
-            <a:ln w="13550" cap="flat">
-              <a:solidFill>
-                <a:srgbClr val="0072BC">
-                  <a:alpha val="100000"/>
-                </a:srgbClr>
-              </a:solidFill>
-              <a:prstDash val="solid"/>
-              <a:round/>
-            </a:ln>
-          </p:spPr>
-          <p:txBody>
-            <a:bodyPr/>
-            <a:lstStyle/>
-            <a:p/>
-          </p:txBody>
-        </p:sp>
-        <p:sp>
-          <p:nvSpPr>
-            <p:cNvPr id="29" name="pl29"/>
-            <p:cNvSpPr/>
-            <p:nvPr/>
-          </p:nvSpPr>
-          <p:spPr>
-            <a:xfrm>
-              <a:off x="10863363" y="3736434"/>
+            <p:cNvPr id="32" name="pl32"/>
+            <p:cNvSpPr/>
+            <p:nvPr/>
+          </p:nvSpPr>
+          <p:spPr>
+            <a:xfrm>
+              <a:off x="11143876" y="3088456"/>
               <a:ext cx="0" cy="129595"/>
             </a:xfrm>
             <a:custGeom>
@@ -8908,21 +9028,21 @@
         </p:sp>
         <p:sp>
           <p:nvSpPr>
-            <p:cNvPr id="30" name="pl30"/>
-            <p:cNvSpPr/>
-            <p:nvPr/>
-          </p:nvSpPr>
-          <p:spPr>
-            <a:xfrm>
-              <a:off x="10801742" y="3801232"/>
-              <a:ext cx="61620" cy="0"/>
+            <p:cNvPr id="33" name="pl33"/>
+            <p:cNvSpPr/>
+            <p:nvPr/>
+          </p:nvSpPr>
+          <p:spPr>
+            <a:xfrm>
+              <a:off x="11061275" y="3153254"/>
+              <a:ext cx="82601" cy="0"/>
             </a:xfrm>
             <a:custGeom>
               <a:avLst/>
               <a:pathLst>
-                <a:path w="61620" h="0">
+                <a:path w="82601" h="0">
                   <a:moveTo>
-                    <a:pt x="61620" y="0"/>
+                    <a:pt x="82601" y="0"/>
                   </a:moveTo>
                   <a:lnTo>
                     <a:pt x="0" y="0"/>
@@ -8948,13 +9068,13 @@
         </p:sp>
         <p:sp>
           <p:nvSpPr>
-            <p:cNvPr id="31" name="pl31"/>
-            <p:cNvSpPr/>
-            <p:nvPr/>
-          </p:nvSpPr>
-          <p:spPr>
-            <a:xfrm>
-              <a:off x="10801742" y="3736434"/>
+            <p:cNvPr id="34" name="pl34"/>
+            <p:cNvSpPr/>
+            <p:nvPr/>
+          </p:nvSpPr>
+          <p:spPr>
+            <a:xfrm>
+              <a:off x="11061275" y="3088456"/>
               <a:ext cx="0" cy="129595"/>
             </a:xfrm>
             <a:custGeom>
@@ -8988,127 +9108,237 @@
         </p:sp>
         <p:sp>
           <p:nvSpPr>
-            <p:cNvPr id="32" name="pl32"/>
-            <p:cNvSpPr/>
-            <p:nvPr/>
-          </p:nvSpPr>
-          <p:spPr>
-            <a:xfrm>
-              <a:off x="10303228" y="3736434"/>
-              <a:ext cx="0" cy="129595"/>
-            </a:xfrm>
-            <a:custGeom>
-              <a:avLst/>
-              <a:pathLst>
-                <a:path w="0" h="129595">
-                  <a:moveTo>
-                    <a:pt x="0" y="129595"/>
-                  </a:moveTo>
-                  <a:lnTo>
-                    <a:pt x="0" y="0"/>
-                  </a:lnTo>
-                </a:path>
-              </a:pathLst>
-            </a:custGeom>
-            <a:ln w="13550" cap="flat">
-              <a:solidFill>
-                <a:srgbClr val="0072BC">
-                  <a:alpha val="100000"/>
-                </a:srgbClr>
-              </a:solidFill>
-              <a:prstDash val="solid"/>
-              <a:round/>
-            </a:ln>
-          </p:spPr>
-          <p:txBody>
-            <a:bodyPr/>
-            <a:lstStyle/>
-            <a:p/>
-          </p:txBody>
-        </p:sp>
-        <p:sp>
-          <p:nvSpPr>
-            <p:cNvPr id="33" name="pl33"/>
-            <p:cNvSpPr/>
-            <p:nvPr/>
-          </p:nvSpPr>
-          <p:spPr>
-            <a:xfrm>
-              <a:off x="10030703" y="3801232"/>
-              <a:ext cx="272525" cy="0"/>
-            </a:xfrm>
-            <a:custGeom>
-              <a:avLst/>
-              <a:pathLst>
-                <a:path w="272525" h="0">
-                  <a:moveTo>
-                    <a:pt x="272525" y="0"/>
-                  </a:moveTo>
-                  <a:lnTo>
-                    <a:pt x="0" y="0"/>
-                  </a:lnTo>
-                </a:path>
-              </a:pathLst>
-            </a:custGeom>
-            <a:ln w="13550" cap="flat">
-              <a:solidFill>
-                <a:srgbClr val="0072BC">
-                  <a:alpha val="100000"/>
-                </a:srgbClr>
-              </a:solidFill>
-              <a:prstDash val="solid"/>
-              <a:round/>
-            </a:ln>
-          </p:spPr>
-          <p:txBody>
-            <a:bodyPr/>
-            <a:lstStyle/>
-            <a:p/>
-          </p:txBody>
-        </p:sp>
-        <p:sp>
-          <p:nvSpPr>
-            <p:cNvPr id="34" name="pl34"/>
-            <p:cNvSpPr/>
-            <p:nvPr/>
-          </p:nvSpPr>
-          <p:spPr>
-            <a:xfrm>
-              <a:off x="10030703" y="3736434"/>
-              <a:ext cx="0" cy="129595"/>
-            </a:xfrm>
-            <a:custGeom>
-              <a:avLst/>
-              <a:pathLst>
-                <a:path w="0" h="129595">
-                  <a:moveTo>
-                    <a:pt x="0" y="129595"/>
-                  </a:moveTo>
-                  <a:lnTo>
-                    <a:pt x="0" y="0"/>
-                  </a:lnTo>
-                </a:path>
-              </a:pathLst>
-            </a:custGeom>
-            <a:ln w="13550" cap="flat">
-              <a:solidFill>
-                <a:srgbClr val="0072BC">
-                  <a:alpha val="100000"/>
-                </a:srgbClr>
-              </a:solidFill>
-              <a:prstDash val="solid"/>
-              <a:round/>
-            </a:ln>
-          </p:spPr>
-          <p:txBody>
-            <a:bodyPr/>
-            <a:lstStyle/>
-            <a:p/>
-          </p:txBody>
-        </p:sp>
-        <p:sp>
-          <p:nvSpPr>
             <p:cNvPr id="35" name="tx35"/>
+            <p:cNvSpPr/>
+            <p:nvPr/>
+          </p:nvSpPr>
+          <p:spPr>
+            <a:xfrm>
+              <a:off x="9968195" y="3570012"/>
+              <a:ext cx="397540" cy="105768"/>
+            </a:xfrm>
+            <a:prstGeom prst="rect">
+              <a:avLst/>
+            </a:prstGeom>
+            <a:noFill/>
+          </p:spPr>
+          <p:txBody>
+            <a:bodyPr lIns="0" rIns="0" tIns="0" bIns="0" anchorCtr="1" anchor="ctr" wrap="none"/>
+            <a:lstStyle/>
+            <a:p>
+              <a:pPr algn="l" marL="0" marR="0" indent="0">
+                <a:lnSpc>
+                  <a:spcPts val="1103"/>
+                </a:lnSpc>
+                <a:spcBef>
+                  <a:spcPts val="0"/>
+                </a:spcBef>
+                <a:spcAft>
+                  <a:spcPts val="0"/>
+                </a:spcAft>
+              </a:pPr>
+              <a:r>
+                <a:rPr sz="1103">
+                  <a:solidFill>
+                    <a:srgbClr val="0072BC">
+                      <a:alpha val="100000"/>
+                    </a:srgbClr>
+                  </a:solidFill>
+                  <a:latin typeface="Arial"/>
+                  <a:cs typeface="Arial"/>
+                </a:rPr>
+                <a:t>82.8%</a:t>
+              </a:r>
+            </a:p>
+          </p:txBody>
+        </p:sp>
+        <p:sp>
+          <p:nvSpPr>
+            <p:cNvPr id="36" name="tx36"/>
+            <p:cNvSpPr/>
+            <p:nvPr/>
+          </p:nvSpPr>
+          <p:spPr>
+            <a:xfrm>
+              <a:off x="4781290" y="4217990"/>
+              <a:ext cx="397540" cy="105768"/>
+            </a:xfrm>
+            <a:prstGeom prst="rect">
+              <a:avLst/>
+            </a:prstGeom>
+            <a:noFill/>
+          </p:spPr>
+          <p:txBody>
+            <a:bodyPr lIns="0" rIns="0" tIns="0" bIns="0" anchorCtr="1" anchor="ctr" wrap="none"/>
+            <a:lstStyle/>
+            <a:p>
+              <a:pPr algn="l" marL="0" marR="0" indent="0">
+                <a:lnSpc>
+                  <a:spcPts val="1103"/>
+                </a:lnSpc>
+                <a:spcBef>
+                  <a:spcPts val="0"/>
+                </a:spcBef>
+                <a:spcAft>
+                  <a:spcPts val="0"/>
+                </a:spcAft>
+              </a:pPr>
+              <a:r>
+                <a:rPr sz="1103">
+                  <a:solidFill>
+                    <a:srgbClr val="0072BC">
+                      <a:alpha val="100000"/>
+                    </a:srgbClr>
+                  </a:solidFill>
+                  <a:latin typeface="Arial"/>
+                  <a:cs typeface="Arial"/>
+                </a:rPr>
+                <a:t>10.8%</a:t>
+              </a:r>
+            </a:p>
+          </p:txBody>
+        </p:sp>
+        <p:sp>
+          <p:nvSpPr>
+            <p:cNvPr id="37" name="tx37"/>
+            <p:cNvSpPr/>
+            <p:nvPr/>
+          </p:nvSpPr>
+          <p:spPr>
+            <a:xfrm>
+              <a:off x="10743220" y="2922034"/>
+              <a:ext cx="397540" cy="105768"/>
+            </a:xfrm>
+            <a:prstGeom prst="rect">
+              <a:avLst/>
+            </a:prstGeom>
+            <a:noFill/>
+          </p:spPr>
+          <p:txBody>
+            <a:bodyPr lIns="0" rIns="0" tIns="0" bIns="0" anchorCtr="1" anchor="ctr" wrap="none"/>
+            <a:lstStyle/>
+            <a:p>
+              <a:pPr algn="l" marL="0" marR="0" indent="0">
+                <a:lnSpc>
+                  <a:spcPts val="1103"/>
+                </a:lnSpc>
+                <a:spcBef>
+                  <a:spcPts val="0"/>
+                </a:spcBef>
+                <a:spcAft>
+                  <a:spcPts val="0"/>
+                </a:spcAft>
+              </a:pPr>
+              <a:r>
+                <a:rPr sz="1103">
+                  <a:solidFill>
+                    <a:srgbClr val="0072BC">
+                      <a:alpha val="100000"/>
+                    </a:srgbClr>
+                  </a:solidFill>
+                  <a:latin typeface="Arial"/>
+                  <a:cs typeface="Arial"/>
+                </a:rPr>
+                <a:t>93.5%</a:t>
+              </a:r>
+            </a:p>
+          </p:txBody>
+        </p:sp>
+        <p:sp>
+          <p:nvSpPr>
+            <p:cNvPr id="38" name="tx38"/>
+            <p:cNvSpPr/>
+            <p:nvPr/>
+          </p:nvSpPr>
+          <p:spPr>
+            <a:xfrm>
+              <a:off x="10633782" y="3896184"/>
+              <a:ext cx="397540" cy="105768"/>
+            </a:xfrm>
+            <a:prstGeom prst="rect">
+              <a:avLst/>
+            </a:prstGeom>
+            <a:noFill/>
+          </p:spPr>
+          <p:txBody>
+            <a:bodyPr lIns="0" rIns="0" tIns="0" bIns="0" anchorCtr="1" anchor="ctr" wrap="none"/>
+            <a:lstStyle/>
+            <a:p>
+              <a:pPr algn="l" marL="0" marR="0" indent="0">
+                <a:lnSpc>
+                  <a:spcPts val="1103"/>
+                </a:lnSpc>
+                <a:spcBef>
+                  <a:spcPts val="0"/>
+                </a:spcBef>
+                <a:spcAft>
+                  <a:spcPts val="0"/>
+                </a:spcAft>
+              </a:pPr>
+              <a:r>
+                <a:rPr sz="1103">
+                  <a:solidFill>
+                    <a:srgbClr val="666666">
+                      <a:alpha val="100000"/>
+                    </a:srgbClr>
+                  </a:solidFill>
+                  <a:latin typeface="Arial"/>
+                  <a:cs typeface="Arial"/>
+                </a:rPr>
+                <a:t>92.0%</a:t>
+              </a:r>
+            </a:p>
+          </p:txBody>
+        </p:sp>
+        <p:sp>
+          <p:nvSpPr>
+            <p:cNvPr id="39" name="tx39"/>
+            <p:cNvSpPr/>
+            <p:nvPr/>
+          </p:nvSpPr>
+          <p:spPr>
+            <a:xfrm>
+              <a:off x="4809553" y="4544162"/>
+              <a:ext cx="397540" cy="105768"/>
+            </a:xfrm>
+            <a:prstGeom prst="rect">
+              <a:avLst/>
+            </a:prstGeom>
+            <a:noFill/>
+          </p:spPr>
+          <p:txBody>
+            <a:bodyPr lIns="0" rIns="0" tIns="0" bIns="0" anchorCtr="1" anchor="ctr" wrap="none"/>
+            <a:lstStyle/>
+            <a:p>
+              <a:pPr algn="l" marL="0" marR="0" indent="0">
+                <a:lnSpc>
+                  <a:spcPts val="1103"/>
+                </a:lnSpc>
+                <a:spcBef>
+                  <a:spcPts val="0"/>
+                </a:spcBef>
+                <a:spcAft>
+                  <a:spcPts val="0"/>
+                </a:spcAft>
+              </a:pPr>
+              <a:r>
+                <a:rPr sz="1103">
+                  <a:solidFill>
+                    <a:srgbClr val="666666">
+                      <a:alpha val="100000"/>
+                    </a:srgbClr>
+                  </a:solidFill>
+                  <a:latin typeface="Arial"/>
+                  <a:cs typeface="Arial"/>
+                </a:rPr>
+                <a:t>11.2%</a:t>
+              </a:r>
+            </a:p>
+          </p:txBody>
+        </p:sp>
+        <p:sp>
+          <p:nvSpPr>
+            <p:cNvPr id="40" name="tx40"/>
             <p:cNvSpPr/>
             <p:nvPr/>
           </p:nvSpPr>
@@ -9154,236 +9384,6 @@
         </p:sp>
         <p:sp>
           <p:nvSpPr>
-            <p:cNvPr id="36" name="tx36"/>
-            <p:cNvSpPr/>
-            <p:nvPr/>
-          </p:nvSpPr>
-          <p:spPr>
-            <a:xfrm>
-              <a:off x="10743220" y="2922034"/>
-              <a:ext cx="397540" cy="105768"/>
-            </a:xfrm>
-            <a:prstGeom prst="rect">
-              <a:avLst/>
-            </a:prstGeom>
-            <a:noFill/>
-          </p:spPr>
-          <p:txBody>
-            <a:bodyPr lIns="0" rIns="0" tIns="0" bIns="0" anchorCtr="1" anchor="ctr" wrap="none"/>
-            <a:lstStyle/>
-            <a:p>
-              <a:pPr algn="l" marL="0" marR="0" indent="0">
-                <a:lnSpc>
-                  <a:spcPts val="1103"/>
-                </a:lnSpc>
-                <a:spcBef>
-                  <a:spcPts val="0"/>
-                </a:spcBef>
-                <a:spcAft>
-                  <a:spcPts val="0"/>
-                </a:spcAft>
-              </a:pPr>
-              <a:r>
-                <a:rPr sz="1103">
-                  <a:solidFill>
-                    <a:srgbClr val="0072BC">
-                      <a:alpha val="100000"/>
-                    </a:srgbClr>
-                  </a:solidFill>
-                  <a:latin typeface="Arial"/>
-                  <a:cs typeface="Arial"/>
-                </a:rPr>
-                <a:t>93.5%</a:t>
-              </a:r>
-            </a:p>
-          </p:txBody>
-        </p:sp>
-        <p:sp>
-          <p:nvSpPr>
-            <p:cNvPr id="37" name="tx37"/>
-            <p:cNvSpPr/>
-            <p:nvPr/>
-          </p:nvSpPr>
-          <p:spPr>
-            <a:xfrm>
-              <a:off x="4809553" y="4544162"/>
-              <a:ext cx="397540" cy="105768"/>
-            </a:xfrm>
-            <a:prstGeom prst="rect">
-              <a:avLst/>
-            </a:prstGeom>
-            <a:noFill/>
-          </p:spPr>
-          <p:txBody>
-            <a:bodyPr lIns="0" rIns="0" tIns="0" bIns="0" anchorCtr="1" anchor="ctr" wrap="none"/>
-            <a:lstStyle/>
-            <a:p>
-              <a:pPr algn="l" marL="0" marR="0" indent="0">
-                <a:lnSpc>
-                  <a:spcPts val="1103"/>
-                </a:lnSpc>
-                <a:spcBef>
-                  <a:spcPts val="0"/>
-                </a:spcBef>
-                <a:spcAft>
-                  <a:spcPts val="0"/>
-                </a:spcAft>
-              </a:pPr>
-              <a:r>
-                <a:rPr sz="1103">
-                  <a:solidFill>
-                    <a:srgbClr val="666666">
-                      <a:alpha val="100000"/>
-                    </a:srgbClr>
-                  </a:solidFill>
-                  <a:latin typeface="Arial"/>
-                  <a:cs typeface="Arial"/>
-                </a:rPr>
-                <a:t>11.2%</a:t>
-              </a:r>
-            </a:p>
-          </p:txBody>
-        </p:sp>
-        <p:sp>
-          <p:nvSpPr>
-            <p:cNvPr id="38" name="tx38"/>
-            <p:cNvSpPr/>
-            <p:nvPr/>
-          </p:nvSpPr>
-          <p:spPr>
-            <a:xfrm>
-              <a:off x="4781290" y="4217990"/>
-              <a:ext cx="397540" cy="105768"/>
-            </a:xfrm>
-            <a:prstGeom prst="rect">
-              <a:avLst/>
-            </a:prstGeom>
-            <a:noFill/>
-          </p:spPr>
-          <p:txBody>
-            <a:bodyPr lIns="0" rIns="0" tIns="0" bIns="0" anchorCtr="1" anchor="ctr" wrap="none"/>
-            <a:lstStyle/>
-            <a:p>
-              <a:pPr algn="l" marL="0" marR="0" indent="0">
-                <a:lnSpc>
-                  <a:spcPts val="1103"/>
-                </a:lnSpc>
-                <a:spcBef>
-                  <a:spcPts val="0"/>
-                </a:spcBef>
-                <a:spcAft>
-                  <a:spcPts val="0"/>
-                </a:spcAft>
-              </a:pPr>
-              <a:r>
-                <a:rPr sz="1103">
-                  <a:solidFill>
-                    <a:srgbClr val="0072BC">
-                      <a:alpha val="100000"/>
-                    </a:srgbClr>
-                  </a:solidFill>
-                  <a:latin typeface="Arial"/>
-                  <a:cs typeface="Arial"/>
-                </a:rPr>
-                <a:t>10.8%</a:t>
-              </a:r>
-            </a:p>
-          </p:txBody>
-        </p:sp>
-        <p:sp>
-          <p:nvSpPr>
-            <p:cNvPr id="39" name="tx39"/>
-            <p:cNvSpPr/>
-            <p:nvPr/>
-          </p:nvSpPr>
-          <p:spPr>
-            <a:xfrm>
-              <a:off x="10633782" y="3896184"/>
-              <a:ext cx="397540" cy="105768"/>
-            </a:xfrm>
-            <a:prstGeom prst="rect">
-              <a:avLst/>
-            </a:prstGeom>
-            <a:noFill/>
-          </p:spPr>
-          <p:txBody>
-            <a:bodyPr lIns="0" rIns="0" tIns="0" bIns="0" anchorCtr="1" anchor="ctr" wrap="none"/>
-            <a:lstStyle/>
-            <a:p>
-              <a:pPr algn="l" marL="0" marR="0" indent="0">
-                <a:lnSpc>
-                  <a:spcPts val="1103"/>
-                </a:lnSpc>
-                <a:spcBef>
-                  <a:spcPts val="0"/>
-                </a:spcBef>
-                <a:spcAft>
-                  <a:spcPts val="0"/>
-                </a:spcAft>
-              </a:pPr>
-              <a:r>
-                <a:rPr sz="1103">
-                  <a:solidFill>
-                    <a:srgbClr val="666666">
-                      <a:alpha val="100000"/>
-                    </a:srgbClr>
-                  </a:solidFill>
-                  <a:latin typeface="Arial"/>
-                  <a:cs typeface="Arial"/>
-                </a:rPr>
-                <a:t>92.0%</a:t>
-              </a:r>
-            </a:p>
-          </p:txBody>
-        </p:sp>
-        <p:sp>
-          <p:nvSpPr>
-            <p:cNvPr id="40" name="tx40"/>
-            <p:cNvSpPr/>
-            <p:nvPr/>
-          </p:nvSpPr>
-          <p:spPr>
-            <a:xfrm>
-              <a:off x="9968195" y="3570012"/>
-              <a:ext cx="397540" cy="105768"/>
-            </a:xfrm>
-            <a:prstGeom prst="rect">
-              <a:avLst/>
-            </a:prstGeom>
-            <a:noFill/>
-          </p:spPr>
-          <p:txBody>
-            <a:bodyPr lIns="0" rIns="0" tIns="0" bIns="0" anchorCtr="1" anchor="ctr" wrap="none"/>
-            <a:lstStyle/>
-            <a:p>
-              <a:pPr algn="l" marL="0" marR="0" indent="0">
-                <a:lnSpc>
-                  <a:spcPts val="1103"/>
-                </a:lnSpc>
-                <a:spcBef>
-                  <a:spcPts val="0"/>
-                </a:spcBef>
-                <a:spcAft>
-                  <a:spcPts val="0"/>
-                </a:spcAft>
-              </a:pPr>
-              <a:r>
-                <a:rPr sz="1103">
-                  <a:solidFill>
-                    <a:srgbClr val="0072BC">
-                      <a:alpha val="100000"/>
-                    </a:srgbClr>
-                  </a:solidFill>
-                  <a:latin typeface="Arial"/>
-                  <a:cs typeface="Arial"/>
-                </a:rPr>
-                <a:t>82.8%</a:t>
-              </a:r>
-            </a:p>
-          </p:txBody>
-        </p:sp>
-        <p:sp>
-          <p:nvSpPr>
             <p:cNvPr id="41" name="tx41"/>
             <p:cNvSpPr/>
             <p:nvPr/>
@@ -9436,8 +9436,8 @@
           </p:nvSpPr>
           <p:spPr>
             <a:xfrm>
-              <a:off x="2514322" y="4447559"/>
-              <a:ext cx="1238504" cy="153754"/>
+              <a:off x="2554285" y="4447559"/>
+              <a:ext cx="1198541" cy="153754"/>
             </a:xfrm>
             <a:prstGeom prst="rect">
               <a:avLst/>
@@ -9469,7 +9469,7 @@
                   <a:latin typeface="Lato"/>
                   <a:cs typeface="Lato"/>
                 </a:rPr>
-                <a:t>are unemployed.</a:t>
+                <a:t>are unemployed</a:t>
               </a:r>
             </a:p>
           </p:txBody>
@@ -10149,7 +10149,7 @@
           </p:nvSpPr>
           <p:spPr>
             <a:xfrm>
-              <a:off x="5394138" y="2435980"/>
+              <a:off x="5350789" y="2435980"/>
               <a:ext cx="49651" cy="49651"/>
             </a:xfrm>
             <a:prstGeom prst="ellipse">
@@ -10184,7 +10184,7 @@
           </p:nvSpPr>
           <p:spPr>
             <a:xfrm>
-              <a:off x="5327866" y="2460806"/>
+              <a:off x="5284516" y="2460806"/>
               <a:ext cx="182196" cy="0"/>
             </a:xfrm>
             <a:custGeom>
@@ -10224,7 +10224,7 @@
           </p:nvSpPr>
           <p:spPr>
             <a:xfrm>
-              <a:off x="5379977" y="2434997"/>
+              <a:off x="5336627" y="2434997"/>
               <a:ext cx="77974" cy="75989"/>
             </a:xfrm>
             <a:prstGeom prst="rect">
@@ -10271,7 +10271,7 @@
           <p:spPr>
             <a:xfrm>
               <a:off x="4259983" y="2396586"/>
-              <a:ext cx="950213" cy="124883"/>
+              <a:ext cx="906864" cy="124883"/>
             </a:xfrm>
             <a:prstGeom prst="rect">
               <a:avLst/>
@@ -10303,7 +10303,7 @@
                   <a:latin typeface="Lato"/>
                   <a:cs typeface="Lato"/>
                 </a:rPr>
-                <a:t>Costa Ricans</a:t>
+                <a:t>CostaRicans</a:t>
               </a:r>
             </a:p>
           </p:txBody>
@@ -10316,7 +10316,7 @@
           </p:nvSpPr>
           <p:spPr>
             <a:xfrm>
-              <a:off x="5627731" y="2367038"/>
+              <a:off x="5584382" y="2367038"/>
               <a:ext cx="915161" cy="154432"/>
             </a:xfrm>
             <a:prstGeom prst="rect">

</xml_diff>